<commit_message>
Last updates before team meeting
</commit_message>
<xml_diff>
--- a/Slide Deck Skeleton.pptx
+++ b/Slide Deck Skeleton.pptx
@@ -6,17 +6,18 @@
   </p:sldMasterIdLst>
   <p:sldIdLst>
     <p:sldId id="256" r:id="rId2"/>
-    <p:sldId id="261" r:id="rId3"/>
-    <p:sldId id="262" r:id="rId4"/>
-    <p:sldId id="258" r:id="rId5"/>
-    <p:sldId id="257" r:id="rId6"/>
-    <p:sldId id="263" r:id="rId7"/>
-    <p:sldId id="264" r:id="rId8"/>
-    <p:sldId id="259" r:id="rId9"/>
-    <p:sldId id="265" r:id="rId10"/>
-    <p:sldId id="266" r:id="rId11"/>
-    <p:sldId id="267" r:id="rId12"/>
-    <p:sldId id="260" r:id="rId13"/>
+    <p:sldId id="268" r:id="rId3"/>
+    <p:sldId id="261" r:id="rId4"/>
+    <p:sldId id="262" r:id="rId5"/>
+    <p:sldId id="258" r:id="rId6"/>
+    <p:sldId id="257" r:id="rId7"/>
+    <p:sldId id="263" r:id="rId8"/>
+    <p:sldId id="264" r:id="rId9"/>
+    <p:sldId id="259" r:id="rId10"/>
+    <p:sldId id="265" r:id="rId11"/>
+    <p:sldId id="266" r:id="rId12"/>
+    <p:sldId id="267" r:id="rId13"/>
+    <p:sldId id="260" r:id="rId14"/>
   </p:sldIdLst>
   <p:sldSz cx="12192000" cy="6858000"/>
   <p:notesSz cx="6858000" cy="9144000"/>
@@ -2629,7 +2630,7 @@
           <a:lstStyle/>
           <a:p>
             <a:pPr>
-              <a:defRPr sz="1400" b="0" i="0" u="none" strike="noStrike" kern="1200" spc="0" baseline="0">
+              <a:defRPr sz="1800" b="0" i="0" u="none" strike="noStrike" kern="1200" spc="0" baseline="0">
                 <a:solidFill>
                   <a:schemeClr val="tx1">
                     <a:lumMod val="65000"/>
@@ -2642,7 +2643,7 @@
               </a:defRPr>
             </a:pPr>
             <a:r>
-              <a:rPr lang="en-US" sz="1400" b="0" i="0" u="none" strike="noStrike" kern="1200" spc="0" baseline="0" dirty="0">
+              <a:rPr lang="en-US" sz="1800" b="0" i="0" u="none" strike="noStrike" kern="1200" spc="0" baseline="0" dirty="0">
                 <a:solidFill>
                   <a:prstClr val="black">
                     <a:lumMod val="65000"/>
@@ -2668,7 +2669,7 @@
         <a:lstStyle/>
         <a:p>
           <a:pPr>
-            <a:defRPr sz="1400" b="0" i="0" u="none" strike="noStrike" kern="1200" spc="0" baseline="0">
+            <a:defRPr sz="1800" b="0" i="0" u="none" strike="noStrike" kern="1200" spc="0" baseline="0">
               <a:solidFill>
                 <a:schemeClr val="tx1">
                   <a:lumMod val="65000"/>
@@ -5486,7 +5487,7 @@
               <a:lstStyle/>
               <a:p>
                 <a:pPr>
-                  <a:defRPr sz="1000" b="0" i="0" u="none" strike="noStrike" kern="1200" baseline="0">
+                  <a:defRPr sz="1200" b="0" i="0" u="none" strike="noStrike" kern="1200" baseline="0">
                     <a:solidFill>
                       <a:schemeClr val="tx1">
                         <a:lumMod val="65000"/>
@@ -5499,7 +5500,7 @@
                   </a:defRPr>
                 </a:pPr>
                 <a:r>
-                  <a:rPr lang="en-US"/>
+                  <a:rPr lang="en-US" sz="1200"/>
                   <a:t>After n Strikes</a:t>
                 </a:r>
               </a:p>
@@ -5518,7 +5519,7 @@
             <a:lstStyle/>
             <a:p>
               <a:pPr>
-                <a:defRPr sz="1000" b="0" i="0" u="none" strike="noStrike" kern="1200" baseline="0">
+                <a:defRPr sz="1200" b="0" i="0" u="none" strike="noStrike" kern="1200" baseline="0">
                   <a:solidFill>
                     <a:schemeClr val="tx1">
                       <a:lumMod val="65000"/>
@@ -5607,7 +5608,7 @@
               <a:lstStyle/>
               <a:p>
                 <a:pPr>
-                  <a:defRPr sz="1000" b="0" i="0" u="none" strike="noStrike" kern="1200" baseline="0">
+                  <a:defRPr sz="1200" b="0" i="0" u="none" strike="noStrike" kern="1200" baseline="0">
                     <a:solidFill>
                       <a:schemeClr val="tx1">
                         <a:lumMod val="65000"/>
@@ -5620,14 +5621,14 @@
                   </a:defRPr>
                 </a:pPr>
                 <a:r>
-                  <a:rPr lang="en-US"/>
+                  <a:rPr lang="en-US" sz="1200"/>
                   <a:t>Probability</a:t>
                 </a:r>
                 <a:r>
-                  <a:rPr lang="en-US" baseline="0"/>
+                  <a:rPr lang="en-US" sz="1200" baseline="0"/>
                   <a:t> of Strike Agaisnt End State</a:t>
                 </a:r>
-                <a:endParaRPr lang="en-US"/>
+                <a:endParaRPr lang="en-US" sz="1200"/>
               </a:p>
             </c:rich>
           </c:tx>
@@ -5644,7 +5645,7 @@
             <a:lstStyle/>
             <a:p>
               <a:pPr>
-                <a:defRPr sz="1000" b="0" i="0" u="none" strike="noStrike" kern="1200" baseline="0">
+                <a:defRPr sz="1200" b="0" i="0" u="none" strike="noStrike" kern="1200" baseline="0">
                   <a:solidFill>
                     <a:schemeClr val="tx1">
                       <a:lumMod val="65000"/>
@@ -5706,6 +5707,16 @@
     </c:plotArea>
     <c:legend>
       <c:legendPos val="r"/>
+      <c:layout>
+        <c:manualLayout>
+          <c:xMode val="edge"/>
+          <c:yMode val="edge"/>
+          <c:x val="0.76608622254006953"/>
+          <c:y val="2.6389577180574421E-2"/>
+          <c:w val="0.22381703677216436"/>
+          <c:h val="0.95706816684974072"/>
+        </c:manualLayout>
+      </c:layout>
       <c:overlay val="0"/>
       <c:spPr>
         <a:noFill/>
@@ -5790,7 +5801,7 @@
           <a:lstStyle/>
           <a:p>
             <a:pPr>
-              <a:defRPr sz="1400" b="0" i="0" u="none" strike="noStrike" kern="1200" spc="0" baseline="0">
+              <a:defRPr sz="1800" b="0" i="0" u="none" strike="noStrike" kern="1200" spc="0" baseline="0">
                 <a:solidFill>
                   <a:schemeClr val="tx1">
                     <a:lumMod val="65000"/>
@@ -5803,14 +5814,14 @@
               </a:defRPr>
             </a:pPr>
             <a:r>
-              <a:rPr lang="en-US" dirty="0"/>
+              <a:rPr lang="en-US" sz="1800" dirty="0"/>
               <a:t>Markov</a:t>
             </a:r>
             <a:r>
-              <a:rPr lang="en-US" baseline="0" dirty="0"/>
+              <a:rPr lang="en-US" sz="1800" baseline="0" dirty="0"/>
               <a:t> Projections for "Collapsed" Infrastructure</a:t>
             </a:r>
-            <a:endParaRPr lang="en-US" dirty="0"/>
+            <a:endParaRPr lang="en-US" sz="1800" dirty="0"/>
           </a:p>
         </c:rich>
       </c:tx>
@@ -5827,7 +5838,7 @@
         <a:lstStyle/>
         <a:p>
           <a:pPr>
-            <a:defRPr sz="1400" b="0" i="0" u="none" strike="noStrike" kern="1200" spc="0" baseline="0">
+            <a:defRPr sz="1800" b="0" i="0" u="none" strike="noStrike" kern="1200" spc="0" baseline="0">
               <a:solidFill>
                 <a:schemeClr val="tx1">
                   <a:lumMod val="65000"/>
@@ -6815,7 +6826,7 @@
               <a:lstStyle/>
               <a:p>
                 <a:pPr>
-                  <a:defRPr sz="1000" b="0" i="0" u="none" strike="noStrike" kern="1200" baseline="0">
+                  <a:defRPr sz="1200" b="0" i="0" u="none" strike="noStrike" kern="1200" baseline="0">
                     <a:solidFill>
                       <a:schemeClr val="tx1">
                         <a:lumMod val="65000"/>
@@ -6828,14 +6839,14 @@
                   </a:defRPr>
                 </a:pPr>
                 <a:r>
-                  <a:rPr lang="en-US"/>
+                  <a:rPr lang="en-US" sz="1200"/>
                   <a:t>After</a:t>
                 </a:r>
                 <a:r>
-                  <a:rPr lang="en-US" baseline="0"/>
+                  <a:rPr lang="en-US" sz="1200" baseline="0"/>
                   <a:t> n Strikes</a:t>
                 </a:r>
-                <a:endParaRPr lang="en-US"/>
+                <a:endParaRPr lang="en-US" sz="1200"/>
               </a:p>
             </c:rich>
           </c:tx>
@@ -6852,7 +6863,7 @@
             <a:lstStyle/>
             <a:p>
               <a:pPr>
-                <a:defRPr sz="1000" b="0" i="0" u="none" strike="noStrike" kern="1200" baseline="0">
+                <a:defRPr sz="1200" b="0" i="0" u="none" strike="noStrike" kern="1200" baseline="0">
                   <a:solidFill>
                     <a:schemeClr val="tx1">
                       <a:lumMod val="65000"/>
@@ -6941,7 +6952,7 @@
               <a:lstStyle/>
               <a:p>
                 <a:pPr>
-                  <a:defRPr sz="1000" b="0" i="0" u="none" strike="noStrike" kern="1200" baseline="0">
+                  <a:defRPr sz="1200" b="0" i="0" u="none" strike="noStrike" kern="1200" baseline="0">
                     <a:solidFill>
                       <a:schemeClr val="tx1">
                         <a:lumMod val="65000"/>
@@ -6954,7 +6965,7 @@
                   </a:defRPr>
                 </a:pPr>
                 <a:r>
-                  <a:rPr lang="en-US"/>
+                  <a:rPr lang="en-US" sz="1200"/>
                   <a:t>Probability of Strike Agasint End State</a:t>
                 </a:r>
               </a:p>
@@ -6973,7 +6984,7 @@
             <a:lstStyle/>
             <a:p>
               <a:pPr>
-                <a:defRPr sz="1000" b="0" i="0" u="none" strike="noStrike" kern="1200" baseline="0">
+                <a:defRPr sz="1200" b="0" i="0" u="none" strike="noStrike" kern="1200" baseline="0">
                   <a:solidFill>
                     <a:schemeClr val="tx1">
                       <a:lumMod val="65000"/>
@@ -13618,7 +13629,7 @@
           <a:p>
             <a:r>
               <a:rPr lang="en-US" dirty="0"/>
-              <a:t>Projecting Infrastructure Strikes in Ukraine</a:t>
+              <a:t>Project NOBLE</a:t>
             </a:r>
           </a:p>
         </p:txBody>
@@ -13641,8 +13652,35 @@
         </p:nvSpPr>
         <p:spPr/>
         <p:txBody>
-          <a:bodyPr/>
+          <a:bodyPr>
+            <a:normAutofit fontScale="92500"/>
+          </a:bodyPr>
           <a:lstStyle/>
+          <a:p>
+            <a:endParaRPr lang="en-US" dirty="0"/>
+          </a:p>
+          <a:p>
+            <a:r>
+              <a:rPr lang="en-US" dirty="0"/>
+              <a:t>Projecting Strikes Against Ukrainian Infrastructure with Markov Transitions</a:t>
+            </a:r>
+          </a:p>
+          <a:p>
+            <a:r>
+              <a:rPr lang="en-US" sz="1700" dirty="0"/>
+              <a:t>Earp, Mason, Dallas, Ryan</a:t>
+            </a:r>
+          </a:p>
+          <a:p>
+            <a:r>
+              <a:rPr lang="en-US" sz="1700" dirty="0" err="1"/>
+              <a:t>Egl</a:t>
+            </a:r>
+            <a:r>
+              <a:rPr lang="en-US" sz="1700" dirty="0"/>
+              <a:t>, Hannah Lumpkin, Bree</a:t>
+            </a:r>
+          </a:p>
           <a:p>
             <a:endParaRPr lang="en-US" dirty="0"/>
           </a:p>
@@ -13662,6 +13700,130 @@
 </file>
 
 <file path=ppt/slides/slide10.xml><?xml version="1.0" encoding="utf-8"?>
+<p:sld xmlns:a="http://schemas.openxmlformats.org/drawingml/2006/main" xmlns:r="http://schemas.openxmlformats.org/officeDocument/2006/relationships" xmlns:p="http://schemas.openxmlformats.org/presentationml/2006/main">
+  <p:cSld>
+    <p:spTree>
+      <p:nvGrpSpPr>
+        <p:cNvPr id="1" name="">
+          <a:extLst>
+            <a:ext uri="{FF2B5EF4-FFF2-40B4-BE49-F238E27FC236}">
+              <a16:creationId xmlns:a16="http://schemas.microsoft.com/office/drawing/2014/main" id="{B7900459-5ED7-B99A-0340-CA6C04C100A6}"/>
+            </a:ext>
+          </a:extLst>
+        </p:cNvPr>
+        <p:cNvGrpSpPr/>
+        <p:nvPr/>
+      </p:nvGrpSpPr>
+      <p:grpSpPr>
+        <a:xfrm>
+          <a:off x="0" y="0"/>
+          <a:ext cx="0" cy="0"/>
+          <a:chOff x="0" y="0"/>
+          <a:chExt cx="0" cy="0"/>
+        </a:xfrm>
+      </p:grpSpPr>
+      <p:sp>
+        <p:nvSpPr>
+          <p:cNvPr id="2" name="Title 1">
+            <a:extLst>
+              <a:ext uri="{FF2B5EF4-FFF2-40B4-BE49-F238E27FC236}">
+                <a16:creationId xmlns:a16="http://schemas.microsoft.com/office/drawing/2014/main" id="{8892132C-BC48-CBBB-2B5C-6FB5B2036612}"/>
+              </a:ext>
+            </a:extLst>
+          </p:cNvPr>
+          <p:cNvSpPr>
+            <a:spLocks noGrp="1"/>
+          </p:cNvSpPr>
+          <p:nvPr>
+            <p:ph type="title"/>
+          </p:nvPr>
+        </p:nvSpPr>
+        <p:spPr/>
+        <p:txBody>
+          <a:bodyPr/>
+          <a:lstStyle/>
+          <a:p>
+            <a:r>
+              <a:rPr lang="en-US" dirty="0"/>
+              <a:t>Results (3) - Rayons</a:t>
+            </a:r>
+          </a:p>
+        </p:txBody>
+      </p:sp>
+      <p:graphicFrame>
+        <p:nvGraphicFramePr>
+          <p:cNvPr id="3" name="Chart 2">
+            <a:extLst>
+              <a:ext uri="{FF2B5EF4-FFF2-40B4-BE49-F238E27FC236}">
+                <a16:creationId xmlns:a16="http://schemas.microsoft.com/office/drawing/2014/main" id="{05EF74E2-1F95-99E4-7804-3A2BDDBEC031}"/>
+              </a:ext>
+            </a:extLst>
+          </p:cNvPr>
+          <p:cNvGraphicFramePr>
+            <a:graphicFrameLocks/>
+          </p:cNvGraphicFramePr>
+          <p:nvPr>
+            <p:extLst>
+              <p:ext uri="{D42A27DB-BD31-4B8C-83A1-F6EECF244321}">
+                <p14:modId xmlns:p14="http://schemas.microsoft.com/office/powerpoint/2010/main" val="688001188"/>
+              </p:ext>
+            </p:extLst>
+          </p:nvPr>
+        </p:nvGraphicFramePr>
+        <p:xfrm>
+          <a:off x="504963" y="1690688"/>
+          <a:ext cx="4660926" cy="4514850"/>
+        </p:xfrm>
+        <a:graphic>
+          <a:graphicData uri="http://schemas.openxmlformats.org/drawingml/2006/chart">
+            <c:chart xmlns:c="http://schemas.openxmlformats.org/drawingml/2006/chart" xmlns:r="http://schemas.openxmlformats.org/officeDocument/2006/relationships" r:id="rId2"/>
+          </a:graphicData>
+        </a:graphic>
+      </p:graphicFrame>
+      <p:graphicFrame>
+        <p:nvGraphicFramePr>
+          <p:cNvPr id="4" name="Chart 3">
+            <a:extLst>
+              <a:ext uri="{FF2B5EF4-FFF2-40B4-BE49-F238E27FC236}">
+                <a16:creationId xmlns:a16="http://schemas.microsoft.com/office/drawing/2014/main" id="{F5E82E27-8092-2828-D2C5-98A54CF897CF}"/>
+              </a:ext>
+            </a:extLst>
+          </p:cNvPr>
+          <p:cNvGraphicFramePr>
+            <a:graphicFrameLocks/>
+          </p:cNvGraphicFramePr>
+          <p:nvPr>
+            <p:extLst>
+              <p:ext uri="{D42A27DB-BD31-4B8C-83A1-F6EECF244321}">
+                <p14:modId xmlns:p14="http://schemas.microsoft.com/office/powerpoint/2010/main" val="1538997175"/>
+              </p:ext>
+            </p:extLst>
+          </p:nvPr>
+        </p:nvGraphicFramePr>
+        <p:xfrm>
+          <a:off x="5552388" y="1828800"/>
+          <a:ext cx="5801412" cy="4103016"/>
+        </p:xfrm>
+        <a:graphic>
+          <a:graphicData uri="http://schemas.openxmlformats.org/drawingml/2006/chart">
+            <c:chart xmlns:c="http://schemas.openxmlformats.org/drawingml/2006/chart" xmlns:r="http://schemas.openxmlformats.org/officeDocument/2006/relationships" r:id="rId3"/>
+          </a:graphicData>
+        </a:graphic>
+      </p:graphicFrame>
+    </p:spTree>
+    <p:extLst>
+      <p:ext uri="{BB962C8B-B14F-4D97-AF65-F5344CB8AC3E}">
+        <p14:creationId xmlns:p14="http://schemas.microsoft.com/office/powerpoint/2010/main" val="2009642762"/>
+      </p:ext>
+    </p:extLst>
+  </p:cSld>
+  <p:clrMapOvr>
+    <a:masterClrMapping/>
+  </p:clrMapOvr>
+</p:sld>
+</file>
+
+<file path=ppt/slides/slide11.xml><?xml version="1.0" encoding="utf-8"?>
 <p:sld xmlns:a="http://schemas.openxmlformats.org/drawingml/2006/main" xmlns:r="http://schemas.openxmlformats.org/officeDocument/2006/relationships" xmlns:p="http://schemas.openxmlformats.org/presentationml/2006/main">
   <p:cSld>
     <p:spTree>
@@ -13727,14 +13889,14 @@
           <p:nvPr>
             <p:extLst>
               <p:ext uri="{D42A27DB-BD31-4B8C-83A1-F6EECF244321}">
-                <p14:modId xmlns:p14="http://schemas.microsoft.com/office/powerpoint/2010/main" val="1662128841"/>
+                <p14:modId xmlns:p14="http://schemas.microsoft.com/office/powerpoint/2010/main" val="3813885642"/>
               </p:ext>
             </p:extLst>
           </p:nvPr>
         </p:nvGraphicFramePr>
         <p:xfrm>
-          <a:off x="3140075" y="1506008"/>
-          <a:ext cx="6426200" cy="5274734"/>
+          <a:off x="904875" y="1305983"/>
+          <a:ext cx="10277475" cy="5274734"/>
         </p:xfrm>
         <a:graphic>
           <a:graphicData uri="http://schemas.openxmlformats.org/drawingml/2006/chart">
@@ -13742,6 +13904,250 @@
           </a:graphicData>
         </a:graphic>
       </p:graphicFrame>
+      <p:cxnSp>
+        <p:nvCxnSpPr>
+          <p:cNvPr id="5" name="Straight Connector 4">
+            <a:extLst>
+              <a:ext uri="{FF2B5EF4-FFF2-40B4-BE49-F238E27FC236}">
+                <a16:creationId xmlns:a16="http://schemas.microsoft.com/office/drawing/2014/main" id="{8A9FF67B-6F7F-7385-DB53-6A9A20D8D7CE}"/>
+              </a:ext>
+            </a:extLst>
+          </p:cNvPr>
+          <p:cNvCxnSpPr>
+            <a:cxnSpLocks/>
+          </p:cNvCxnSpPr>
+          <p:nvPr/>
+        </p:nvCxnSpPr>
+        <p:spPr>
+          <a:xfrm flipV="1">
+            <a:off x="3940404" y="3566148"/>
+            <a:ext cx="423014" cy="1533753"/>
+          </a:xfrm>
+          <a:prstGeom prst="line">
+            <a:avLst/>
+          </a:prstGeom>
+          <a:ln w="12700">
+            <a:solidFill>
+              <a:schemeClr val="tx1"/>
+            </a:solidFill>
+          </a:ln>
+        </p:spPr>
+        <p:style>
+          <a:lnRef idx="1">
+            <a:schemeClr val="accent1"/>
+          </a:lnRef>
+          <a:fillRef idx="0">
+            <a:schemeClr val="accent1"/>
+          </a:fillRef>
+          <a:effectRef idx="0">
+            <a:schemeClr val="accent1"/>
+          </a:effectRef>
+          <a:fontRef idx="minor">
+            <a:schemeClr val="tx1"/>
+          </a:fontRef>
+        </p:style>
+      </p:cxnSp>
+      <p:cxnSp>
+        <p:nvCxnSpPr>
+          <p:cNvPr id="6" name="Straight Connector 5">
+            <a:extLst>
+              <a:ext uri="{FF2B5EF4-FFF2-40B4-BE49-F238E27FC236}">
+                <a16:creationId xmlns:a16="http://schemas.microsoft.com/office/drawing/2014/main" id="{15A207D4-B534-A76C-4051-DCF6208B5497}"/>
+              </a:ext>
+            </a:extLst>
+          </p:cNvPr>
+          <p:cNvCxnSpPr>
+            <a:cxnSpLocks/>
+          </p:cNvCxnSpPr>
+          <p:nvPr/>
+        </p:nvCxnSpPr>
+        <p:spPr>
+          <a:xfrm flipV="1">
+            <a:off x="3940404" y="4138367"/>
+            <a:ext cx="1134940" cy="1291472"/>
+          </a:xfrm>
+          <a:prstGeom prst="line">
+            <a:avLst/>
+          </a:prstGeom>
+          <a:ln w="12700">
+            <a:solidFill>
+              <a:schemeClr val="tx1"/>
+            </a:solidFill>
+          </a:ln>
+        </p:spPr>
+        <p:style>
+          <a:lnRef idx="1">
+            <a:schemeClr val="accent1"/>
+          </a:lnRef>
+          <a:fillRef idx="0">
+            <a:schemeClr val="accent1"/>
+          </a:fillRef>
+          <a:effectRef idx="0">
+            <a:schemeClr val="accent1"/>
+          </a:effectRef>
+          <a:fontRef idx="minor">
+            <a:schemeClr val="tx1"/>
+          </a:fontRef>
+        </p:style>
+      </p:cxnSp>
+      <p:cxnSp>
+        <p:nvCxnSpPr>
+          <p:cNvPr id="7" name="Straight Connector 6">
+            <a:extLst>
+              <a:ext uri="{FF2B5EF4-FFF2-40B4-BE49-F238E27FC236}">
+                <a16:creationId xmlns:a16="http://schemas.microsoft.com/office/drawing/2014/main" id="{E14CE2F3-04E5-3D43-8AC6-2E7F08418C7C}"/>
+              </a:ext>
+            </a:extLst>
+          </p:cNvPr>
+          <p:cNvCxnSpPr>
+            <a:cxnSpLocks/>
+          </p:cNvCxnSpPr>
+          <p:nvPr/>
+        </p:nvCxnSpPr>
+        <p:spPr>
+          <a:xfrm flipV="1">
+            <a:off x="3836709" y="4685122"/>
+            <a:ext cx="1651647" cy="933253"/>
+          </a:xfrm>
+          <a:prstGeom prst="line">
+            <a:avLst/>
+          </a:prstGeom>
+          <a:ln w="12700">
+            <a:solidFill>
+              <a:schemeClr val="tx1"/>
+            </a:solidFill>
+          </a:ln>
+        </p:spPr>
+        <p:style>
+          <a:lnRef idx="1">
+            <a:schemeClr val="accent1"/>
+          </a:lnRef>
+          <a:fillRef idx="0">
+            <a:schemeClr val="accent1"/>
+          </a:fillRef>
+          <a:effectRef idx="0">
+            <a:schemeClr val="accent1"/>
+          </a:effectRef>
+          <a:fontRef idx="minor">
+            <a:schemeClr val="tx1"/>
+          </a:fontRef>
+        </p:style>
+      </p:cxnSp>
+      <p:sp>
+        <p:nvSpPr>
+          <p:cNvPr id="8" name="TextBox 7">
+            <a:extLst>
+              <a:ext uri="{FF2B5EF4-FFF2-40B4-BE49-F238E27FC236}">
+                <a16:creationId xmlns:a16="http://schemas.microsoft.com/office/drawing/2014/main" id="{6FCED498-9C3C-96A0-86A1-67FA14995865}"/>
+              </a:ext>
+            </a:extLst>
+          </p:cNvPr>
+          <p:cNvSpPr txBox="1"/>
+          <p:nvPr/>
+        </p:nvSpPr>
+        <p:spPr>
+          <a:xfrm>
+            <a:off x="3987535" y="2827484"/>
+            <a:ext cx="3044860" cy="738664"/>
+          </a:xfrm>
+          <a:prstGeom prst="rect">
+            <a:avLst/>
+          </a:prstGeom>
+          <a:noFill/>
+        </p:spPr>
+        <p:txBody>
+          <a:bodyPr wrap="square" rtlCol="0">
+            <a:spAutoFit/>
+          </a:bodyPr>
+          <a:lstStyle/>
+          <a:p>
+            <a:pPr algn="ctr"/>
+            <a:r>
+              <a:rPr lang="en-US" sz="1400" dirty="0"/>
+              <a:t>After approx. 25 strikes, Industrial targets settle out to 0.2084, Educational Facilities to 0.2069</a:t>
+            </a:r>
+          </a:p>
+        </p:txBody>
+      </p:sp>
+      <p:sp>
+        <p:nvSpPr>
+          <p:cNvPr id="9" name="TextBox 8">
+            <a:extLst>
+              <a:ext uri="{FF2B5EF4-FFF2-40B4-BE49-F238E27FC236}">
+                <a16:creationId xmlns:a16="http://schemas.microsoft.com/office/drawing/2014/main" id="{9F8A0C80-CB44-AB2F-5CCC-FDA079517310}"/>
+              </a:ext>
+            </a:extLst>
+          </p:cNvPr>
+          <p:cNvSpPr txBox="1"/>
+          <p:nvPr/>
+        </p:nvSpPr>
+        <p:spPr>
+          <a:xfrm>
+            <a:off x="4776430" y="3886635"/>
+            <a:ext cx="2934987" cy="307777"/>
+          </a:xfrm>
+          <a:prstGeom prst="rect">
+            <a:avLst/>
+          </a:prstGeom>
+          <a:noFill/>
+        </p:spPr>
+        <p:txBody>
+          <a:bodyPr wrap="square" rtlCol="0">
+            <a:spAutoFit/>
+          </a:bodyPr>
+          <a:lstStyle/>
+          <a:p>
+            <a:pPr algn="ctr"/>
+            <a:r>
+              <a:rPr lang="en-US" sz="1400" dirty="0"/>
+              <a:t>Electricity Supply targets: 0.1243</a:t>
+            </a:r>
+          </a:p>
+        </p:txBody>
+      </p:sp>
+      <p:sp>
+        <p:nvSpPr>
+          <p:cNvPr id="10" name="TextBox 9">
+            <a:extLst>
+              <a:ext uri="{FF2B5EF4-FFF2-40B4-BE49-F238E27FC236}">
+                <a16:creationId xmlns:a16="http://schemas.microsoft.com/office/drawing/2014/main" id="{33FABA17-65A6-9E18-E6CE-59EE9E54C5FC}"/>
+              </a:ext>
+            </a:extLst>
+          </p:cNvPr>
+          <p:cNvSpPr txBox="1"/>
+          <p:nvPr/>
+        </p:nvSpPr>
+        <p:spPr>
+          <a:xfrm>
+            <a:off x="5084771" y="4447126"/>
+            <a:ext cx="2934987" cy="523220"/>
+          </a:xfrm>
+          <a:prstGeom prst="rect">
+            <a:avLst/>
+          </a:prstGeom>
+          <a:noFill/>
+        </p:spPr>
+        <p:txBody>
+          <a:bodyPr wrap="square" rtlCol="0">
+            <a:spAutoFit/>
+          </a:bodyPr>
+          <a:lstStyle/>
+          <a:p>
+            <a:pPr algn="ctr"/>
+            <a:r>
+              <a:rPr lang="en-US" sz="1400" dirty="0"/>
+              <a:t>Government targets: 0.0849,</a:t>
+            </a:r>
+          </a:p>
+          <a:p>
+            <a:pPr algn="ctr"/>
+            <a:r>
+              <a:rPr lang="en-US" sz="1400" dirty="0"/>
+              <a:t>Gas Supply targets: 0.0811</a:t>
+            </a:r>
+          </a:p>
+        </p:txBody>
+      </p:sp>
     </p:spTree>
     <p:extLst>
       <p:ext uri="{BB962C8B-B14F-4D97-AF65-F5344CB8AC3E}">
@@ -13755,7 +14161,7 @@
 </p:sld>
 </file>
 
-<file path=ppt/slides/slide11.xml><?xml version="1.0" encoding="utf-8"?>
+<file path=ppt/slides/slide12.xml><?xml version="1.0" encoding="utf-8"?>
 <p:sld xmlns:a="http://schemas.openxmlformats.org/drawingml/2006/main" xmlns:r="http://schemas.openxmlformats.org/officeDocument/2006/relationships" xmlns:p="http://schemas.openxmlformats.org/presentationml/2006/main">
   <p:cSld>
     <p:spTree>
@@ -13818,11 +14224,17 @@
           <p:cNvGraphicFramePr>
             <a:graphicFrameLocks/>
           </p:cNvGraphicFramePr>
-          <p:nvPr/>
+          <p:nvPr>
+            <p:extLst>
+              <p:ext uri="{D42A27DB-BD31-4B8C-83A1-F6EECF244321}">
+                <p14:modId xmlns:p14="http://schemas.microsoft.com/office/powerpoint/2010/main" val="1994951120"/>
+              </p:ext>
+            </p:extLst>
+          </p:nvPr>
         </p:nvGraphicFramePr>
         <p:xfrm>
-          <a:off x="2926080" y="1421130"/>
-          <a:ext cx="6339840" cy="4015740"/>
+          <a:off x="905256" y="1307592"/>
+          <a:ext cx="10277856" cy="5276088"/>
         </p:xfrm>
         <a:graphic>
           <a:graphicData uri="http://schemas.openxmlformats.org/drawingml/2006/chart">
@@ -13830,6 +14242,243 @@
           </a:graphicData>
         </a:graphic>
       </p:graphicFrame>
+      <p:cxnSp>
+        <p:nvCxnSpPr>
+          <p:cNvPr id="5" name="Straight Connector 4">
+            <a:extLst>
+              <a:ext uri="{FF2B5EF4-FFF2-40B4-BE49-F238E27FC236}">
+                <a16:creationId xmlns:a16="http://schemas.microsoft.com/office/drawing/2014/main" id="{D1BACA1A-075F-A304-ECAE-DD84825181CE}"/>
+              </a:ext>
+            </a:extLst>
+          </p:cNvPr>
+          <p:cNvCxnSpPr>
+            <a:cxnSpLocks/>
+          </p:cNvCxnSpPr>
+          <p:nvPr/>
+        </p:nvCxnSpPr>
+        <p:spPr>
+          <a:xfrm flipV="1">
+            <a:off x="4166647" y="3512738"/>
+            <a:ext cx="512065" cy="1143606"/>
+          </a:xfrm>
+          <a:prstGeom prst="line">
+            <a:avLst/>
+          </a:prstGeom>
+          <a:ln w="12700">
+            <a:solidFill>
+              <a:schemeClr val="tx1"/>
+            </a:solidFill>
+          </a:ln>
+        </p:spPr>
+        <p:style>
+          <a:lnRef idx="1">
+            <a:schemeClr val="accent1"/>
+          </a:lnRef>
+          <a:fillRef idx="0">
+            <a:schemeClr val="accent1"/>
+          </a:fillRef>
+          <a:effectRef idx="0">
+            <a:schemeClr val="accent1"/>
+          </a:effectRef>
+          <a:fontRef idx="minor">
+            <a:schemeClr val="tx1"/>
+          </a:fontRef>
+        </p:style>
+      </p:cxnSp>
+      <p:cxnSp>
+        <p:nvCxnSpPr>
+          <p:cNvPr id="7" name="Straight Connector 6">
+            <a:extLst>
+              <a:ext uri="{FF2B5EF4-FFF2-40B4-BE49-F238E27FC236}">
+                <a16:creationId xmlns:a16="http://schemas.microsoft.com/office/drawing/2014/main" id="{95A97BB8-335D-D269-171B-C26666D1F3AC}"/>
+              </a:ext>
+            </a:extLst>
+          </p:cNvPr>
+          <p:cNvCxnSpPr>
+            <a:cxnSpLocks/>
+          </p:cNvCxnSpPr>
+          <p:nvPr/>
+        </p:nvCxnSpPr>
+        <p:spPr>
+          <a:xfrm flipV="1">
+            <a:off x="4119514" y="3812143"/>
+            <a:ext cx="1380224" cy="1155783"/>
+          </a:xfrm>
+          <a:prstGeom prst="line">
+            <a:avLst/>
+          </a:prstGeom>
+          <a:ln w="12700">
+            <a:solidFill>
+              <a:schemeClr val="tx1"/>
+            </a:solidFill>
+          </a:ln>
+        </p:spPr>
+        <p:style>
+          <a:lnRef idx="1">
+            <a:schemeClr val="accent1"/>
+          </a:lnRef>
+          <a:fillRef idx="0">
+            <a:schemeClr val="accent1"/>
+          </a:fillRef>
+          <a:effectRef idx="0">
+            <a:schemeClr val="accent1"/>
+          </a:effectRef>
+          <a:fontRef idx="minor">
+            <a:schemeClr val="tx1"/>
+          </a:fontRef>
+        </p:style>
+      </p:cxnSp>
+      <p:cxnSp>
+        <p:nvCxnSpPr>
+          <p:cNvPr id="9" name="Straight Connector 8">
+            <a:extLst>
+              <a:ext uri="{FF2B5EF4-FFF2-40B4-BE49-F238E27FC236}">
+                <a16:creationId xmlns:a16="http://schemas.microsoft.com/office/drawing/2014/main" id="{A4262014-84E7-F267-FE07-8B0DD3D31EF6}"/>
+              </a:ext>
+            </a:extLst>
+          </p:cNvPr>
+          <p:cNvCxnSpPr>
+            <a:cxnSpLocks/>
+          </p:cNvCxnSpPr>
+          <p:nvPr/>
+        </p:nvCxnSpPr>
+        <p:spPr>
+          <a:xfrm flipV="1">
+            <a:off x="4110087" y="4290919"/>
+            <a:ext cx="1838226" cy="798583"/>
+          </a:xfrm>
+          <a:prstGeom prst="line">
+            <a:avLst/>
+          </a:prstGeom>
+          <a:ln w="12700">
+            <a:solidFill>
+              <a:schemeClr val="tx1"/>
+            </a:solidFill>
+          </a:ln>
+        </p:spPr>
+        <p:style>
+          <a:lnRef idx="1">
+            <a:schemeClr val="accent1"/>
+          </a:lnRef>
+          <a:fillRef idx="0">
+            <a:schemeClr val="accent1"/>
+          </a:fillRef>
+          <a:effectRef idx="0">
+            <a:schemeClr val="accent1"/>
+          </a:effectRef>
+          <a:fontRef idx="minor">
+            <a:schemeClr val="tx1"/>
+          </a:fontRef>
+        </p:style>
+      </p:cxnSp>
+      <p:sp>
+        <p:nvSpPr>
+          <p:cNvPr id="14" name="TextBox 13">
+            <a:extLst>
+              <a:ext uri="{FF2B5EF4-FFF2-40B4-BE49-F238E27FC236}">
+                <a16:creationId xmlns:a16="http://schemas.microsoft.com/office/drawing/2014/main" id="{A6E14A3C-0B5B-0FB8-BB11-165D1D4DBD68}"/>
+              </a:ext>
+            </a:extLst>
+          </p:cNvPr>
+          <p:cNvSpPr txBox="1"/>
+          <p:nvPr/>
+        </p:nvSpPr>
+        <p:spPr>
+          <a:xfrm>
+            <a:off x="4295335" y="3036740"/>
+            <a:ext cx="2609621" cy="523220"/>
+          </a:xfrm>
+          <a:prstGeom prst="rect">
+            <a:avLst/>
+          </a:prstGeom>
+          <a:noFill/>
+        </p:spPr>
+        <p:txBody>
+          <a:bodyPr wrap="square" rtlCol="0">
+            <a:spAutoFit/>
+          </a:bodyPr>
+          <a:lstStyle/>
+          <a:p>
+            <a:pPr algn="ctr"/>
+            <a:r>
+              <a:rPr lang="en-US" sz="1400" dirty="0"/>
+              <a:t>After approx. 15 strikes, Civilian targets settle out to 0.3234</a:t>
+            </a:r>
+          </a:p>
+        </p:txBody>
+      </p:sp>
+      <p:sp>
+        <p:nvSpPr>
+          <p:cNvPr id="20" name="TextBox 19">
+            <a:extLst>
+              <a:ext uri="{FF2B5EF4-FFF2-40B4-BE49-F238E27FC236}">
+                <a16:creationId xmlns:a16="http://schemas.microsoft.com/office/drawing/2014/main" id="{ABA3E727-06D7-7764-F8D2-C9F35219F96C}"/>
+              </a:ext>
+            </a:extLst>
+          </p:cNvPr>
+          <p:cNvSpPr txBox="1"/>
+          <p:nvPr/>
+        </p:nvSpPr>
+        <p:spPr>
+          <a:xfrm>
+            <a:off x="4915715" y="3578421"/>
+            <a:ext cx="2934987" cy="307777"/>
+          </a:xfrm>
+          <a:prstGeom prst="rect">
+            <a:avLst/>
+          </a:prstGeom>
+          <a:noFill/>
+        </p:spPr>
+        <p:txBody>
+          <a:bodyPr wrap="square" rtlCol="0">
+            <a:spAutoFit/>
+          </a:bodyPr>
+          <a:lstStyle/>
+          <a:p>
+            <a:pPr algn="ctr"/>
+            <a:r>
+              <a:rPr lang="en-US" sz="1400" dirty="0"/>
+              <a:t>Business targets: 0.2427</a:t>
+            </a:r>
+          </a:p>
+        </p:txBody>
+      </p:sp>
+      <p:sp>
+        <p:nvSpPr>
+          <p:cNvPr id="23" name="TextBox 22">
+            <a:extLst>
+              <a:ext uri="{FF2B5EF4-FFF2-40B4-BE49-F238E27FC236}">
+                <a16:creationId xmlns:a16="http://schemas.microsoft.com/office/drawing/2014/main" id="{F3D2008E-3E91-11CF-5AF5-C785D29967BE}"/>
+              </a:ext>
+            </a:extLst>
+          </p:cNvPr>
+          <p:cNvSpPr txBox="1"/>
+          <p:nvPr/>
+        </p:nvSpPr>
+        <p:spPr>
+          <a:xfrm>
+            <a:off x="5593817" y="4035122"/>
+            <a:ext cx="2934987" cy="307777"/>
+          </a:xfrm>
+          <a:prstGeom prst="rect">
+            <a:avLst/>
+          </a:prstGeom>
+          <a:noFill/>
+        </p:spPr>
+        <p:txBody>
+          <a:bodyPr wrap="square" rtlCol="0">
+            <a:spAutoFit/>
+          </a:bodyPr>
+          <a:lstStyle/>
+          <a:p>
+            <a:pPr algn="ctr"/>
+            <a:r>
+              <a:rPr lang="en-US" sz="1400" dirty="0"/>
+              <a:t>Power &amp; Fuel targets: 0.2427</a:t>
+            </a:r>
+          </a:p>
+        </p:txBody>
+      </p:sp>
     </p:spTree>
     <p:extLst>
       <p:ext uri="{BB962C8B-B14F-4D97-AF65-F5344CB8AC3E}">
@@ -13843,7 +14492,7 @@
 </p:sld>
 </file>
 
-<file path=ppt/slides/slide12.xml><?xml version="1.0" encoding="utf-8"?>
+<file path=ppt/slides/slide13.xml><?xml version="1.0" encoding="utf-8"?>
 <p:sld xmlns:a="http://schemas.openxmlformats.org/drawingml/2006/main" xmlns:r="http://schemas.openxmlformats.org/officeDocument/2006/relationships" xmlns:p="http://schemas.openxmlformats.org/presentationml/2006/main">
   <p:cSld>
     <p:spTree>
@@ -13927,6 +14576,111 @@
 </file>
 
 <file path=ppt/slides/slide2.xml><?xml version="1.0" encoding="utf-8"?>
+<p:sld xmlns:a="http://schemas.openxmlformats.org/drawingml/2006/main" xmlns:r="http://schemas.openxmlformats.org/officeDocument/2006/relationships" xmlns:p="http://schemas.openxmlformats.org/presentationml/2006/main">
+  <p:cSld>
+    <p:spTree>
+      <p:nvGrpSpPr>
+        <p:cNvPr id="1" name=""/>
+        <p:cNvGrpSpPr/>
+        <p:nvPr/>
+      </p:nvGrpSpPr>
+      <p:grpSpPr>
+        <a:xfrm>
+          <a:off x="0" y="0"/>
+          <a:ext cx="0" cy="0"/>
+          <a:chOff x="0" y="0"/>
+          <a:chExt cx="0" cy="0"/>
+        </a:xfrm>
+      </p:grpSpPr>
+      <p:sp>
+        <p:nvSpPr>
+          <p:cNvPr id="2" name="Title 1">
+            <a:extLst>
+              <a:ext uri="{FF2B5EF4-FFF2-40B4-BE49-F238E27FC236}">
+                <a16:creationId xmlns:a16="http://schemas.microsoft.com/office/drawing/2014/main" id="{BEC0930C-05F1-2507-08E4-4319DE0F279E}"/>
+              </a:ext>
+            </a:extLst>
+          </p:cNvPr>
+          <p:cNvSpPr>
+            <a:spLocks noGrp="1"/>
+          </p:cNvSpPr>
+          <p:nvPr>
+            <p:ph type="title"/>
+          </p:nvPr>
+        </p:nvSpPr>
+        <p:spPr/>
+        <p:txBody>
+          <a:bodyPr/>
+          <a:lstStyle/>
+          <a:p>
+            <a:r>
+              <a:rPr lang="en-US" dirty="0"/>
+              <a:t>Notes</a:t>
+            </a:r>
+          </a:p>
+        </p:txBody>
+      </p:sp>
+      <p:sp>
+        <p:nvSpPr>
+          <p:cNvPr id="3" name="Content Placeholder 2">
+            <a:extLst>
+              <a:ext uri="{FF2B5EF4-FFF2-40B4-BE49-F238E27FC236}">
+                <a16:creationId xmlns:a16="http://schemas.microsoft.com/office/drawing/2014/main" id="{A2BD7EE3-4D24-89C5-E7D1-FE2734F58EBF}"/>
+              </a:ext>
+            </a:extLst>
+          </p:cNvPr>
+          <p:cNvSpPr>
+            <a:spLocks noGrp="1"/>
+          </p:cNvSpPr>
+          <p:nvPr>
+            <p:ph idx="1"/>
+          </p:nvPr>
+        </p:nvSpPr>
+        <p:spPr/>
+        <p:txBody>
+          <a:bodyPr>
+            <a:normAutofit/>
+          </a:bodyPr>
+          <a:lstStyle/>
+          <a:p>
+            <a:r>
+              <a:rPr lang="en-US" sz="2400" dirty="0"/>
+              <a:t>The full code, all matrices and tables, and answers to the prompted questions can be found in the accompanying </a:t>
+            </a:r>
+            <a:r>
+              <a:rPr lang="en-US" sz="2400" dirty="0" err="1"/>
+              <a:t>Jupyter</a:t>
+            </a:r>
+            <a:r>
+              <a:rPr lang="en-US" sz="2400" dirty="0"/>
+              <a:t> notebook.</a:t>
+            </a:r>
+          </a:p>
+          <a:p>
+            <a:endParaRPr lang="en-US" sz="2400" dirty="0"/>
+          </a:p>
+          <a:p>
+            <a:r>
+              <a:rPr lang="en-US" sz="2400" dirty="0"/>
+              <a:t>Claude was used to troubleshoot code, but no code written by Claude was used for the simulation (i.e., code written by Claude for troubleshooting was removed after bugs were identified).  Therefore, Claude’s only influence is the adjustment of pre-existing code originally based on Assignment 5 and course content downloaded from the course GitHub.</a:t>
+            </a:r>
+          </a:p>
+        </p:txBody>
+      </p:sp>
+    </p:spTree>
+    <p:extLst>
+      <p:ext uri="{BB962C8B-B14F-4D97-AF65-F5344CB8AC3E}">
+        <p14:creationId xmlns:p14="http://schemas.microsoft.com/office/powerpoint/2010/main" val="3747026330"/>
+      </p:ext>
+    </p:extLst>
+  </p:cSld>
+  <p:clrMapOvr>
+    <a:masterClrMapping/>
+  </p:clrMapOvr>
+</p:sld>
+</file>
+
+<file path=ppt/slides/slide3.xml><?xml version="1.0" encoding="utf-8"?>
 <p:sld xmlns:a="http://schemas.openxmlformats.org/drawingml/2006/main" xmlns:r="http://schemas.openxmlformats.org/officeDocument/2006/relationships" xmlns:p="http://schemas.openxmlformats.org/presentationml/2006/main">
   <p:cSld>
     <p:spTree>
@@ -14543,7 +15297,7 @@
 </p:sld>
 </file>
 
-<file path=ppt/slides/slide3.xml><?xml version="1.0" encoding="utf-8"?>
+<file path=ppt/slides/slide4.xml><?xml version="1.0" encoding="utf-8"?>
 <p:sld xmlns:a="http://schemas.openxmlformats.org/drawingml/2006/main" xmlns:r="http://schemas.openxmlformats.org/officeDocument/2006/relationships" xmlns:p="http://schemas.openxmlformats.org/presentationml/2006/main">
   <p:cSld>
     <p:spTree>
@@ -15161,7 +15915,7 @@
 </p:sld>
 </file>
 
-<file path=ppt/slides/slide4.xml><?xml version="1.0" encoding="utf-8"?>
+<file path=ppt/slides/slide5.xml><?xml version="1.0" encoding="utf-8"?>
 <p:sld xmlns:a="http://schemas.openxmlformats.org/drawingml/2006/main" xmlns:r="http://schemas.openxmlformats.org/officeDocument/2006/relationships" xmlns:p="http://schemas.openxmlformats.org/presentationml/2006/main">
   <p:cSld>
     <p:spTree>
@@ -15259,7 +16013,7 @@
 </p:sld>
 </file>
 
-<file path=ppt/slides/slide5.xml><?xml version="1.0" encoding="utf-8"?>
+<file path=ppt/slides/slide6.xml><?xml version="1.0" encoding="utf-8"?>
 <p:sld xmlns:a="http://schemas.openxmlformats.org/drawingml/2006/main" xmlns:r="http://schemas.openxmlformats.org/officeDocument/2006/relationships" xmlns:p="http://schemas.openxmlformats.org/presentationml/2006/main">
   <p:cSld>
     <p:spTree>
@@ -15354,7 +16108,7 @@
 </p:sld>
 </file>
 
-<file path=ppt/slides/slide6.xml><?xml version="1.0" encoding="utf-8"?>
+<file path=ppt/slides/slide7.xml><?xml version="1.0" encoding="utf-8"?>
 <p:sld xmlns:a="http://schemas.openxmlformats.org/drawingml/2006/main" xmlns:r="http://schemas.openxmlformats.org/officeDocument/2006/relationships" xmlns:p="http://schemas.openxmlformats.org/presentationml/2006/main">
   <p:cSld>
     <p:spTree>
@@ -15474,7 +16228,7 @@
 </p:sld>
 </file>
 
-<file path=ppt/slides/slide7.xml><?xml version="1.0" encoding="utf-8"?>
+<file path=ppt/slides/slide8.xml><?xml version="1.0" encoding="utf-8"?>
 <p:sld xmlns:a="http://schemas.openxmlformats.org/drawingml/2006/main" xmlns:r="http://schemas.openxmlformats.org/officeDocument/2006/relationships" xmlns:p="http://schemas.openxmlformats.org/presentationml/2006/main">
   <p:cSld>
     <p:spTree>
@@ -15547,8 +16301,8 @@
         </p:blipFill>
         <p:spPr>
           <a:xfrm>
-            <a:off x="2780907" y="203757"/>
-            <a:ext cx="9178613" cy="5451895"/>
+            <a:off x="4505325" y="403783"/>
+            <a:ext cx="7454195" cy="4427628"/>
           </a:xfrm>
           <a:prstGeom prst="rect">
             <a:avLst/>
@@ -15569,8 +16323,8 @@
         </p:nvSpPr>
         <p:spPr>
           <a:xfrm>
-            <a:off x="4939645" y="5910606"/>
-            <a:ext cx="4159216" cy="369332"/>
+            <a:off x="586720" y="2481606"/>
+            <a:ext cx="3632855" cy="1477328"/>
           </a:xfrm>
           <a:prstGeom prst="rect">
             <a:avLst/>
@@ -15578,7 +16332,7 @@
           <a:noFill/>
         </p:spPr>
         <p:txBody>
-          <a:bodyPr wrap="none" rtlCol="0">
+          <a:bodyPr wrap="square" rtlCol="0">
             <a:spAutoFit/>
           </a:bodyPr>
           <a:lstStyle/>
@@ -15586,6 +16340,15 @@
             <a:r>
               <a:rPr lang="en-US" dirty="0"/>
               <a:t>Infrastructure Markov Projection Numbers</a:t>
+            </a:r>
+          </a:p>
+          <a:p>
+            <a:endParaRPr lang="en-US" dirty="0"/>
+          </a:p>
+          <a:p>
+            <a:r>
+              <a:rPr lang="en-US" dirty="0"/>
+              <a:t>Full tables can be found in the accompanying notebook</a:t>
             </a:r>
           </a:p>
         </p:txBody>
@@ -15603,7 +16366,7 @@
 </p:sld>
 </file>
 
-<file path=ppt/slides/slide8.xml><?xml version="1.0" encoding="utf-8"?>
+<file path=ppt/slides/slide9.xml><?xml version="1.0" encoding="utf-8"?>
 <p:sld xmlns:a="http://schemas.openxmlformats.org/drawingml/2006/main" xmlns:r="http://schemas.openxmlformats.org/officeDocument/2006/relationships" xmlns:p="http://schemas.openxmlformats.org/presentationml/2006/main">
   <p:cSld>
     <p:spTree>
@@ -15712,130 +16475,6 @@
     <p:extLst>
       <p:ext uri="{BB962C8B-B14F-4D97-AF65-F5344CB8AC3E}">
         <p14:creationId xmlns:p14="http://schemas.microsoft.com/office/powerpoint/2010/main" val="378392346"/>
-      </p:ext>
-    </p:extLst>
-  </p:cSld>
-  <p:clrMapOvr>
-    <a:masterClrMapping/>
-  </p:clrMapOvr>
-</p:sld>
-</file>
-
-<file path=ppt/slides/slide9.xml><?xml version="1.0" encoding="utf-8"?>
-<p:sld xmlns:a="http://schemas.openxmlformats.org/drawingml/2006/main" xmlns:r="http://schemas.openxmlformats.org/officeDocument/2006/relationships" xmlns:p="http://schemas.openxmlformats.org/presentationml/2006/main">
-  <p:cSld>
-    <p:spTree>
-      <p:nvGrpSpPr>
-        <p:cNvPr id="1" name="">
-          <a:extLst>
-            <a:ext uri="{FF2B5EF4-FFF2-40B4-BE49-F238E27FC236}">
-              <a16:creationId xmlns:a16="http://schemas.microsoft.com/office/drawing/2014/main" id="{B7900459-5ED7-B99A-0340-CA6C04C100A6}"/>
-            </a:ext>
-          </a:extLst>
-        </p:cNvPr>
-        <p:cNvGrpSpPr/>
-        <p:nvPr/>
-      </p:nvGrpSpPr>
-      <p:grpSpPr>
-        <a:xfrm>
-          <a:off x="0" y="0"/>
-          <a:ext cx="0" cy="0"/>
-          <a:chOff x="0" y="0"/>
-          <a:chExt cx="0" cy="0"/>
-        </a:xfrm>
-      </p:grpSpPr>
-      <p:sp>
-        <p:nvSpPr>
-          <p:cNvPr id="2" name="Title 1">
-            <a:extLst>
-              <a:ext uri="{FF2B5EF4-FFF2-40B4-BE49-F238E27FC236}">
-                <a16:creationId xmlns:a16="http://schemas.microsoft.com/office/drawing/2014/main" id="{8892132C-BC48-CBBB-2B5C-6FB5B2036612}"/>
-              </a:ext>
-            </a:extLst>
-          </p:cNvPr>
-          <p:cNvSpPr>
-            <a:spLocks noGrp="1"/>
-          </p:cNvSpPr>
-          <p:nvPr>
-            <p:ph type="title"/>
-          </p:nvPr>
-        </p:nvSpPr>
-        <p:spPr/>
-        <p:txBody>
-          <a:bodyPr/>
-          <a:lstStyle/>
-          <a:p>
-            <a:r>
-              <a:rPr lang="en-US" dirty="0"/>
-              <a:t>Results (3) - Rayons</a:t>
-            </a:r>
-          </a:p>
-        </p:txBody>
-      </p:sp>
-      <p:graphicFrame>
-        <p:nvGraphicFramePr>
-          <p:cNvPr id="3" name="Chart 2">
-            <a:extLst>
-              <a:ext uri="{FF2B5EF4-FFF2-40B4-BE49-F238E27FC236}">
-                <a16:creationId xmlns:a16="http://schemas.microsoft.com/office/drawing/2014/main" id="{05EF74E2-1F95-99E4-7804-3A2BDDBEC031}"/>
-              </a:ext>
-            </a:extLst>
-          </p:cNvPr>
-          <p:cNvGraphicFramePr>
-            <a:graphicFrameLocks/>
-          </p:cNvGraphicFramePr>
-          <p:nvPr>
-            <p:extLst>
-              <p:ext uri="{D42A27DB-BD31-4B8C-83A1-F6EECF244321}">
-                <p14:modId xmlns:p14="http://schemas.microsoft.com/office/powerpoint/2010/main" val="688001188"/>
-              </p:ext>
-            </p:extLst>
-          </p:nvPr>
-        </p:nvGraphicFramePr>
-        <p:xfrm>
-          <a:off x="504963" y="1690688"/>
-          <a:ext cx="4660926" cy="4514850"/>
-        </p:xfrm>
-        <a:graphic>
-          <a:graphicData uri="http://schemas.openxmlformats.org/drawingml/2006/chart">
-            <c:chart xmlns:c="http://schemas.openxmlformats.org/drawingml/2006/chart" xmlns:r="http://schemas.openxmlformats.org/officeDocument/2006/relationships" r:id="rId2"/>
-          </a:graphicData>
-        </a:graphic>
-      </p:graphicFrame>
-      <p:graphicFrame>
-        <p:nvGraphicFramePr>
-          <p:cNvPr id="4" name="Chart 3">
-            <a:extLst>
-              <a:ext uri="{FF2B5EF4-FFF2-40B4-BE49-F238E27FC236}">
-                <a16:creationId xmlns:a16="http://schemas.microsoft.com/office/drawing/2014/main" id="{F5E82E27-8092-2828-D2C5-98A54CF897CF}"/>
-              </a:ext>
-            </a:extLst>
-          </p:cNvPr>
-          <p:cNvGraphicFramePr>
-            <a:graphicFrameLocks/>
-          </p:cNvGraphicFramePr>
-          <p:nvPr>
-            <p:extLst>
-              <p:ext uri="{D42A27DB-BD31-4B8C-83A1-F6EECF244321}">
-                <p14:modId xmlns:p14="http://schemas.microsoft.com/office/powerpoint/2010/main" val="1538997175"/>
-              </p:ext>
-            </p:extLst>
-          </p:nvPr>
-        </p:nvGraphicFramePr>
-        <p:xfrm>
-          <a:off x="5552388" y="1828800"/>
-          <a:ext cx="5801412" cy="4103016"/>
-        </p:xfrm>
-        <a:graphic>
-          <a:graphicData uri="http://schemas.openxmlformats.org/drawingml/2006/chart">
-            <c:chart xmlns:c="http://schemas.openxmlformats.org/drawingml/2006/chart" xmlns:r="http://schemas.openxmlformats.org/officeDocument/2006/relationships" r:id="rId3"/>
-          </a:graphicData>
-        </a:graphic>
-      </p:graphicFrame>
-    </p:spTree>
-    <p:extLst>
-      <p:ext uri="{BB962C8B-B14F-4D97-AF65-F5344CB8AC3E}">
-        <p14:creationId xmlns:p14="http://schemas.microsoft.com/office/powerpoint/2010/main" val="2009642762"/>
       </p:ext>
     </p:extLst>
   </p:cSld>

</xml_diff>

<commit_message>
Finished my annotations, incorporated Mason's
</commit_message>
<xml_diff>
--- a/Slide Deck Skeleton.pptx
+++ b/Slide Deck Skeleton.pptx
@@ -7,17 +7,15 @@
   <p:sldIdLst>
     <p:sldId id="256" r:id="rId2"/>
     <p:sldId id="268" r:id="rId3"/>
-    <p:sldId id="261" r:id="rId4"/>
-    <p:sldId id="262" r:id="rId5"/>
-    <p:sldId id="258" r:id="rId6"/>
-    <p:sldId id="257" r:id="rId7"/>
-    <p:sldId id="263" r:id="rId8"/>
-    <p:sldId id="264" r:id="rId9"/>
-    <p:sldId id="259" r:id="rId10"/>
-    <p:sldId id="265" r:id="rId11"/>
-    <p:sldId id="266" r:id="rId12"/>
-    <p:sldId id="267" r:id="rId13"/>
-    <p:sldId id="260" r:id="rId14"/>
+    <p:sldId id="258" r:id="rId4"/>
+    <p:sldId id="257" r:id="rId5"/>
+    <p:sldId id="263" r:id="rId6"/>
+    <p:sldId id="264" r:id="rId7"/>
+    <p:sldId id="259" r:id="rId8"/>
+    <p:sldId id="265" r:id="rId9"/>
+    <p:sldId id="266" r:id="rId10"/>
+    <p:sldId id="267" r:id="rId11"/>
+    <p:sldId id="260" r:id="rId12"/>
   </p:sldIdLst>
   <p:sldSz cx="12192000" cy="6858000"/>
   <p:notesSz cx="6858000" cy="9144000"/>
@@ -116,6 +114,11 @@
       </a:defRPr>
     </a:lvl9pPr>
   </p:defaultTextStyle>
+  <p:extLst>
+    <p:ext uri="{EFAFB233-063F-42B5-8137-9DF3F51BA10A}">
+      <p15:sldGuideLst xmlns:p15="http://schemas.microsoft.com/office/powerpoint/2012/main"/>
+    </p:ext>
+  </p:extLst>
 </p:presentation>
 </file>
 
@@ -140,7 +143,7 @@
           <a:lstStyle/>
           <a:p>
             <a:pPr>
-              <a:defRPr sz="1400" b="0" i="0" u="none" strike="noStrike" kern="1200" spc="0" baseline="0">
+              <a:defRPr sz="1800" b="0" i="0" u="none" strike="noStrike" kern="1200" spc="0" baseline="0">
                 <a:solidFill>
                   <a:schemeClr val="tx1">
                     <a:lumMod val="65000"/>
@@ -153,7 +156,7 @@
               </a:defRPr>
             </a:pPr>
             <a:r>
-              <a:rPr lang="en-US" sz="1400" b="0" i="0" u="none" strike="noStrike" kern="1200" spc="0" baseline="0" dirty="0">
+              <a:rPr lang="en-US" sz="1800" b="0" i="0" u="none" strike="noStrike" kern="1200" spc="0" baseline="0" dirty="0">
                 <a:solidFill>
                   <a:prstClr val="black">
                     <a:lumMod val="65000"/>
@@ -179,7 +182,7 @@
         <a:lstStyle/>
         <a:p>
           <a:pPr>
-            <a:defRPr sz="1400" b="0" i="0" u="none" strike="noStrike" kern="1200" spc="0" baseline="0">
+            <a:defRPr sz="1800" b="0" i="0" u="none" strike="noStrike" kern="1200" spc="0" baseline="0">
               <a:solidFill>
                 <a:schemeClr val="tx1">
                   <a:lumMod val="65000"/>
@@ -344,7 +347,7 @@
               <a:lstStyle/>
               <a:p>
                 <a:pPr>
-                  <a:defRPr sz="1000" b="0" i="0" u="none" strike="noStrike" kern="1200" baseline="0">
+                  <a:defRPr sz="1200" b="0" i="0" u="none" strike="noStrike" kern="1200" baseline="0">
                     <a:solidFill>
                       <a:schemeClr val="tx1">
                         <a:lumMod val="65000"/>
@@ -357,7 +360,7 @@
                   </a:defRPr>
                 </a:pPr>
                 <a:r>
-                  <a:rPr lang="en-US"/>
+                  <a:rPr lang="en-US" sz="1200"/>
                   <a:t>Oblasts (Regions/States)</a:t>
                 </a:r>
               </a:p>
@@ -376,7 +379,7 @@
             <a:lstStyle/>
             <a:p>
               <a:pPr>
-                <a:defRPr sz="1000" b="0" i="0" u="none" strike="noStrike" kern="1200" baseline="0">
+                <a:defRPr sz="1200" b="0" i="0" u="none" strike="noStrike" kern="1200" baseline="0">
                   <a:solidFill>
                     <a:schemeClr val="tx1">
                       <a:lumMod val="65000"/>
@@ -463,7 +466,7 @@
               <a:lstStyle/>
               <a:p>
                 <a:pPr>
-                  <a:defRPr sz="1000" b="0" i="0" u="none" strike="noStrike" kern="1200" baseline="0">
+                  <a:defRPr sz="1200" b="0" i="0" u="none" strike="noStrike" kern="1200" baseline="0">
                     <a:solidFill>
                       <a:schemeClr val="tx1">
                         <a:lumMod val="65000"/>
@@ -476,7 +479,7 @@
                   </a:defRPr>
                 </a:pPr>
                 <a:r>
-                  <a:rPr lang="en-US"/>
+                  <a:rPr lang="en-US" sz="1200"/>
                   <a:t>Probability of Strike Within Oblast After 25 Strikes</a:t>
                 </a:r>
               </a:p>
@@ -495,7 +498,7 @@
             <a:lstStyle/>
             <a:p>
               <a:pPr>
-                <a:defRPr sz="1000" b="0" i="0" u="none" strike="noStrike" kern="1200" baseline="0">
+                <a:defRPr sz="1200" b="0" i="0" u="none" strike="noStrike" kern="1200" baseline="0">
                   <a:solidFill>
                     <a:schemeClr val="tx1">
                       <a:lumMod val="65000"/>
@@ -623,7 +626,7 @@
               <a:buFontTx/>
               <a:buNone/>
               <a:tabLst/>
-              <a:defRPr sz="1400" b="0" i="0" u="none" strike="noStrike" kern="1200" spc="0" baseline="0">
+              <a:defRPr sz="1800" b="0" i="0" u="none" strike="noStrike" kern="1200" spc="0" baseline="0">
                 <a:solidFill>
                   <a:prstClr val="black">
                     <a:lumMod val="65000"/>
@@ -636,7 +639,7 @@
               </a:defRPr>
             </a:pPr>
             <a:r>
-              <a:rPr lang="en-US" sz="1400" b="0" i="0" u="none" strike="noStrike" kern="1200" spc="0" baseline="0" dirty="0">
+              <a:rPr lang="en-US" sz="1800" b="0" i="0" u="none" strike="noStrike" kern="1200" spc="0" baseline="0" dirty="0">
                 <a:solidFill>
                   <a:prstClr val="black">
                     <a:lumMod val="65000"/>
@@ -647,7 +650,7 @@
               <a:t>Markov Projections for Oblasts After </a:t>
             </a:r>
             <a:r>
-              <a:rPr lang="en-US" dirty="0"/>
+              <a:rPr lang="en-US" sz="1800" dirty="0"/>
               <a:t>2000 Strikes</a:t>
             </a:r>
           </a:p>
@@ -680,7 +683,7 @@
             <a:buFontTx/>
             <a:buNone/>
             <a:tabLst/>
-            <a:defRPr sz="1400" b="0" i="0" u="none" strike="noStrike" kern="1200" spc="0" baseline="0">
+            <a:defRPr sz="1800" b="0" i="0" u="none" strike="noStrike" kern="1200" spc="0" baseline="0">
               <a:solidFill>
                 <a:prstClr val="black">
                   <a:lumMod val="65000"/>
@@ -845,7 +848,7 @@
               <a:lstStyle/>
               <a:p>
                 <a:pPr>
-                  <a:defRPr sz="1000" b="0" i="0" u="none" strike="noStrike" kern="1200" baseline="0">
+                  <a:defRPr sz="1200" b="0" i="0" u="none" strike="noStrike" kern="1200" baseline="0">
                     <a:solidFill>
                       <a:schemeClr val="tx1">
                         <a:lumMod val="65000"/>
@@ -858,7 +861,7 @@
                   </a:defRPr>
                 </a:pPr>
                 <a:r>
-                  <a:rPr lang="en-US" sz="1000" b="0" i="0" u="none" strike="noStrike" kern="1200" baseline="0">
+                  <a:rPr lang="en-US" sz="1200" b="0" i="0" u="none" strike="noStrike" kern="1200" baseline="0">
                     <a:solidFill>
                       <a:sysClr val="windowText" lastClr="000000">
                         <a:lumMod val="65000"/>
@@ -884,7 +887,7 @@
             <a:lstStyle/>
             <a:p>
               <a:pPr>
-                <a:defRPr sz="1000" b="0" i="0" u="none" strike="noStrike" kern="1200" baseline="0">
+                <a:defRPr sz="1200" b="0" i="0" u="none" strike="noStrike" kern="1200" baseline="0">
                   <a:solidFill>
                     <a:schemeClr val="tx1">
                       <a:lumMod val="65000"/>
@@ -971,7 +974,7 @@
               <a:lstStyle/>
               <a:p>
                 <a:pPr>
-                  <a:defRPr sz="1000" b="0" i="0" u="none" strike="noStrike" kern="1200" baseline="0">
+                  <a:defRPr sz="1200" b="0" i="0" u="none" strike="noStrike" kern="1200" baseline="0">
                     <a:solidFill>
                       <a:schemeClr val="tx1">
                         <a:lumMod val="65000"/>
@@ -984,7 +987,7 @@
                   </a:defRPr>
                 </a:pPr>
                 <a:r>
-                  <a:rPr lang="en-US" sz="1000" b="0" i="0" u="none" strike="noStrike" kern="1200" baseline="0">
+                  <a:rPr lang="en-US" sz="1200" b="0" i="0" u="none" strike="noStrike" kern="1200" baseline="0">
                     <a:solidFill>
                       <a:sysClr val="windowText" lastClr="000000">
                         <a:lumMod val="65000"/>
@@ -1010,7 +1013,7 @@
             <a:lstStyle/>
             <a:p>
               <a:pPr>
-                <a:defRPr sz="1000" b="0" i="0" u="none" strike="noStrike" kern="1200" baseline="0">
+                <a:defRPr sz="1200" b="0" i="0" u="none" strike="noStrike" kern="1200" baseline="0">
                   <a:solidFill>
                     <a:schemeClr val="tx1">
                       <a:lumMod val="65000"/>
@@ -1138,7 +1141,7 @@
               <a:buFontTx/>
               <a:buNone/>
               <a:tabLst/>
-              <a:defRPr sz="1400" b="0" i="0" u="none" strike="noStrike" kern="1200" spc="0" baseline="0">
+              <a:defRPr sz="1800" b="0" i="0" u="none" strike="noStrike" kern="1200" spc="0" baseline="0">
                 <a:solidFill>
                   <a:prstClr val="black">
                     <a:lumMod val="65000"/>
@@ -1151,7 +1154,7 @@
               </a:defRPr>
             </a:pPr>
             <a:r>
-              <a:rPr lang="en-US" sz="1400" b="0" i="0" u="none" strike="noStrike" kern="1200" spc="0" baseline="0" dirty="0">
+              <a:rPr lang="en-US" sz="1800" b="0" i="0" u="none" strike="noStrike" kern="1200" spc="0" baseline="0" dirty="0">
                 <a:solidFill>
                   <a:prstClr val="black">
                     <a:lumMod val="65000"/>
@@ -1162,7 +1165,7 @@
               <a:t>Markov Projections for Rayons After </a:t>
             </a:r>
             <a:r>
-              <a:rPr lang="en-US" dirty="0"/>
+              <a:rPr lang="en-US" sz="1800" dirty="0"/>
               <a:t>25 Strikes</a:t>
             </a:r>
           </a:p>
@@ -1195,7 +1198,7 @@
             <a:buFontTx/>
             <a:buNone/>
             <a:tabLst/>
-            <a:defRPr sz="1400" b="0" i="0" u="none" strike="noStrike" kern="1200" spc="0" baseline="0">
+            <a:defRPr sz="1800" b="0" i="0" u="none" strike="noStrike" kern="1200" spc="0" baseline="0">
               <a:solidFill>
                 <a:prstClr val="black">
                   <a:lumMod val="65000"/>
@@ -1213,7 +1216,17 @@
     </c:title>
     <c:autoTitleDeleted val="0"/>
     <c:plotArea>
-      <c:layout/>
+      <c:layout>
+        <c:manualLayout>
+          <c:layoutTarget val="inner"/>
+          <c:xMode val="edge"/>
+          <c:yMode val="edge"/>
+          <c:x val="0.11034368735404138"/>
+          <c:y val="0.11373639398427152"/>
+          <c:w val="0.85684791369582736"/>
+          <c:h val="0.76329850062969318"/>
+        </c:manualLayout>
+      </c:layout>
       <c:barChart>
         <c:barDir val="col"/>
         <c:grouping val="clustered"/>
@@ -1618,7 +1631,7 @@
               <a:lstStyle/>
               <a:p>
                 <a:pPr>
-                  <a:defRPr sz="1000" b="0" i="0" u="none" strike="noStrike" kern="1200" baseline="0">
+                  <a:defRPr sz="1200" b="0" i="0" u="none" strike="noStrike" kern="1200" baseline="0">
                     <a:solidFill>
                       <a:schemeClr val="tx1">
                         <a:lumMod val="65000"/>
@@ -1631,14 +1644,14 @@
                   </a:defRPr>
                 </a:pPr>
                 <a:r>
-                  <a:rPr lang="en-US"/>
+                  <a:rPr lang="en-US" sz="1200"/>
                   <a:t>Rayons</a:t>
                 </a:r>
                 <a:r>
-                  <a:rPr lang="en-US" baseline="0"/>
+                  <a:rPr lang="en-US" sz="1200" baseline="0"/>
                   <a:t> (Districts)</a:t>
                 </a:r>
-                <a:endParaRPr lang="en-US"/>
+                <a:endParaRPr lang="en-US" sz="1200"/>
               </a:p>
             </c:rich>
           </c:tx>
@@ -1655,7 +1668,7 @@
             <a:lstStyle/>
             <a:p>
               <a:pPr>
-                <a:defRPr sz="1000" b="0" i="0" u="none" strike="noStrike" kern="1200" baseline="0">
+                <a:defRPr sz="1200" b="0" i="0" u="none" strike="noStrike" kern="1200" baseline="0">
                   <a:solidFill>
                     <a:schemeClr val="tx1">
                       <a:lumMod val="65000"/>
@@ -1742,7 +1755,7 @@
               <a:lstStyle/>
               <a:p>
                 <a:pPr>
-                  <a:defRPr sz="1000" b="0" i="0" u="none" strike="noStrike" kern="1200" baseline="0">
+                  <a:defRPr sz="1200" b="0" i="0" u="none" strike="noStrike" kern="1200" baseline="0">
                     <a:solidFill>
                       <a:schemeClr val="tx1">
                         <a:lumMod val="65000"/>
@@ -1755,14 +1768,14 @@
                   </a:defRPr>
                 </a:pPr>
                 <a:r>
-                  <a:rPr lang="en-US"/>
+                  <a:rPr lang="en-US" sz="1200"/>
                   <a:t>Probability</a:t>
                 </a:r>
                 <a:r>
-                  <a:rPr lang="en-US" baseline="0"/>
+                  <a:rPr lang="en-US" sz="1200" baseline="0"/>
                   <a:t> of Strike Within RayonAfter 25 Strikes</a:t>
                 </a:r>
-                <a:endParaRPr lang="en-US"/>
+                <a:endParaRPr lang="en-US" sz="1200"/>
               </a:p>
             </c:rich>
           </c:tx>
@@ -1779,7 +1792,7 @@
             <a:lstStyle/>
             <a:p>
               <a:pPr>
-                <a:defRPr sz="1000" b="0" i="0" u="none" strike="noStrike" kern="1200" baseline="0">
+                <a:defRPr sz="1200" b="0" i="0" u="none" strike="noStrike" kern="1200" baseline="0">
                   <a:solidFill>
                     <a:schemeClr val="tx1">
                       <a:lumMod val="65000"/>
@@ -1893,7 +1906,7 @@
           <a:lstStyle/>
           <a:p>
             <a:pPr>
-              <a:defRPr sz="1400" b="0" i="0" u="none" strike="noStrike" kern="1200" spc="0" baseline="0">
+              <a:defRPr sz="1800" b="0" i="0" u="none" strike="noStrike" kern="1200" spc="0" baseline="0">
                 <a:solidFill>
                   <a:schemeClr val="tx1">
                     <a:lumMod val="65000"/>
@@ -1906,7 +1919,7 @@
               </a:defRPr>
             </a:pPr>
             <a:r>
-              <a:rPr lang="en-US" sz="1400" b="0" i="0" u="none" strike="noStrike" kern="1200" spc="0" baseline="0" dirty="0">
+              <a:rPr lang="en-US" sz="1800" b="0" i="0" u="none" strike="noStrike" kern="1200" spc="0" baseline="0" dirty="0">
                 <a:solidFill>
                   <a:prstClr val="black">
                     <a:lumMod val="65000"/>
@@ -1932,7 +1945,7 @@
         <a:lstStyle/>
         <a:p>
           <a:pPr>
-            <a:defRPr sz="1400" b="0" i="0" u="none" strike="noStrike" kern="1200" spc="0" baseline="0">
+            <a:defRPr sz="1800" b="0" i="0" u="none" strike="noStrike" kern="1200" spc="0" baseline="0">
               <a:solidFill>
                 <a:schemeClr val="tx1">
                   <a:lumMod val="65000"/>
@@ -2355,7 +2368,7 @@
               <a:lstStyle/>
               <a:p>
                 <a:pPr>
-                  <a:defRPr sz="1000" b="0" i="0" u="none" strike="noStrike" kern="1200" baseline="0">
+                  <a:defRPr sz="1200" b="0" i="0" u="none" strike="noStrike" kern="1200" baseline="0">
                     <a:solidFill>
                       <a:schemeClr val="tx1">
                         <a:lumMod val="65000"/>
@@ -2368,14 +2381,14 @@
                   </a:defRPr>
                 </a:pPr>
                 <a:r>
-                  <a:rPr lang="en-US"/>
+                  <a:rPr lang="en-US" sz="1200"/>
                   <a:t>Rayons</a:t>
                 </a:r>
                 <a:r>
-                  <a:rPr lang="en-US" baseline="0"/>
+                  <a:rPr lang="en-US" sz="1200" baseline="0"/>
                   <a:t> (Districts)</a:t>
                 </a:r>
-                <a:endParaRPr lang="en-US"/>
+                <a:endParaRPr lang="en-US" sz="1200"/>
               </a:p>
             </c:rich>
           </c:tx>
@@ -2392,7 +2405,7 @@
             <a:lstStyle/>
             <a:p>
               <a:pPr>
-                <a:defRPr sz="1000" b="0" i="0" u="none" strike="noStrike" kern="1200" baseline="0">
+                <a:defRPr sz="1200" b="0" i="0" u="none" strike="noStrike" kern="1200" baseline="0">
                   <a:solidFill>
                     <a:schemeClr val="tx1">
                       <a:lumMod val="65000"/>
@@ -2479,7 +2492,7 @@
               <a:lstStyle/>
               <a:p>
                 <a:pPr>
-                  <a:defRPr sz="1000" b="0" i="0" u="none" strike="noStrike" kern="1200" baseline="0">
+                  <a:defRPr sz="1200" b="0" i="0" u="none" strike="noStrike" kern="1200" baseline="0">
                     <a:solidFill>
                       <a:schemeClr val="tx1">
                         <a:lumMod val="65000"/>
@@ -2492,14 +2505,14 @@
                   </a:defRPr>
                 </a:pPr>
                 <a:r>
-                  <a:rPr lang="en-US"/>
+                  <a:rPr lang="en-US" sz="1200" dirty="0"/>
                   <a:t>Probability of Strike Within</a:t>
                 </a:r>
                 <a:r>
-                  <a:rPr lang="en-US" baseline="0"/>
+                  <a:rPr lang="en-US" sz="1200" baseline="0" dirty="0"/>
                   <a:t> Rayon After 2000 Strikes</a:t>
                 </a:r>
-                <a:endParaRPr lang="en-US"/>
+                <a:endParaRPr lang="en-US" sz="1200" dirty="0"/>
               </a:p>
             </c:rich>
           </c:tx>
@@ -2516,7 +2529,7 @@
             <a:lstStyle/>
             <a:p>
               <a:pPr>
-                <a:defRPr sz="1000" b="0" i="0" u="none" strike="noStrike" kern="1200" baseline="0">
+                <a:defRPr sz="1200" b="0" i="0" u="none" strike="noStrike" kern="1200" baseline="0">
                   <a:solidFill>
                     <a:schemeClr val="tx1">
                       <a:lumMod val="65000"/>
@@ -10539,7 +10552,7 @@
           <a:p>
             <a:fld id="{E05ABFEB-B687-4971-91D1-2F7C75FB417F}" type="datetimeFigureOut">
               <a:rPr lang="en-US" smtClean="0"/>
-              <a:t>11/11/2025</a:t>
+              <a:t>11/13/2025</a:t>
             </a:fld>
             <a:endParaRPr lang="en-US"/>
           </a:p>
@@ -10737,7 +10750,7 @@
           <a:p>
             <a:fld id="{E05ABFEB-B687-4971-91D1-2F7C75FB417F}" type="datetimeFigureOut">
               <a:rPr lang="en-US" smtClean="0"/>
-              <a:t>11/11/2025</a:t>
+              <a:t>11/13/2025</a:t>
             </a:fld>
             <a:endParaRPr lang="en-US"/>
           </a:p>
@@ -10945,7 +10958,7 @@
           <a:p>
             <a:fld id="{E05ABFEB-B687-4971-91D1-2F7C75FB417F}" type="datetimeFigureOut">
               <a:rPr lang="en-US" smtClean="0"/>
-              <a:t>11/11/2025</a:t>
+              <a:t>11/13/2025</a:t>
             </a:fld>
             <a:endParaRPr lang="en-US"/>
           </a:p>
@@ -11143,7 +11156,7 @@
           <a:p>
             <a:fld id="{E05ABFEB-B687-4971-91D1-2F7C75FB417F}" type="datetimeFigureOut">
               <a:rPr lang="en-US" smtClean="0"/>
-              <a:t>11/11/2025</a:t>
+              <a:t>11/13/2025</a:t>
             </a:fld>
             <a:endParaRPr lang="en-US"/>
           </a:p>
@@ -11418,7 +11431,7 @@
           <a:p>
             <a:fld id="{E05ABFEB-B687-4971-91D1-2F7C75FB417F}" type="datetimeFigureOut">
               <a:rPr lang="en-US" smtClean="0"/>
-              <a:t>11/11/2025</a:t>
+              <a:t>11/13/2025</a:t>
             </a:fld>
             <a:endParaRPr lang="en-US"/>
           </a:p>
@@ -11683,7 +11696,7 @@
           <a:p>
             <a:fld id="{E05ABFEB-B687-4971-91D1-2F7C75FB417F}" type="datetimeFigureOut">
               <a:rPr lang="en-US" smtClean="0"/>
-              <a:t>11/11/2025</a:t>
+              <a:t>11/13/2025</a:t>
             </a:fld>
             <a:endParaRPr lang="en-US"/>
           </a:p>
@@ -12095,7 +12108,7 @@
           <a:p>
             <a:fld id="{E05ABFEB-B687-4971-91D1-2F7C75FB417F}" type="datetimeFigureOut">
               <a:rPr lang="en-US" smtClean="0"/>
-              <a:t>11/11/2025</a:t>
+              <a:t>11/13/2025</a:t>
             </a:fld>
             <a:endParaRPr lang="en-US"/>
           </a:p>
@@ -12236,7 +12249,7 @@
           <a:p>
             <a:fld id="{E05ABFEB-B687-4971-91D1-2F7C75FB417F}" type="datetimeFigureOut">
               <a:rPr lang="en-US" smtClean="0"/>
-              <a:t>11/11/2025</a:t>
+              <a:t>11/13/2025</a:t>
             </a:fld>
             <a:endParaRPr lang="en-US"/>
           </a:p>
@@ -12349,7 +12362,7 @@
           <a:p>
             <a:fld id="{E05ABFEB-B687-4971-91D1-2F7C75FB417F}" type="datetimeFigureOut">
               <a:rPr lang="en-US" smtClean="0"/>
-              <a:t>11/11/2025</a:t>
+              <a:t>11/13/2025</a:t>
             </a:fld>
             <a:endParaRPr lang="en-US"/>
           </a:p>
@@ -12660,7 +12673,7 @@
           <a:p>
             <a:fld id="{E05ABFEB-B687-4971-91D1-2F7C75FB417F}" type="datetimeFigureOut">
               <a:rPr lang="en-US" smtClean="0"/>
-              <a:t>11/11/2025</a:t>
+              <a:t>11/13/2025</a:t>
             </a:fld>
             <a:endParaRPr lang="en-US"/>
           </a:p>
@@ -12948,7 +12961,7 @@
           <a:p>
             <a:fld id="{E05ABFEB-B687-4971-91D1-2F7C75FB417F}" type="datetimeFigureOut">
               <a:rPr lang="en-US" smtClean="0"/>
-              <a:t>11/11/2025</a:t>
+              <a:t>11/13/2025</a:t>
             </a:fld>
             <a:endParaRPr lang="en-US"/>
           </a:p>
@@ -13189,7 +13202,7 @@
           <a:p>
             <a:fld id="{E05ABFEB-B687-4971-91D1-2F7C75FB417F}" type="datetimeFigureOut">
               <a:rPr lang="en-US" smtClean="0"/>
-              <a:t>11/11/2025</a:t>
+              <a:t>11/13/2025</a:t>
             </a:fld>
             <a:endParaRPr lang="en-US"/>
           </a:p>
@@ -13707,6 +13720,1614 @@
         <p:cNvPr id="1" name="">
           <a:extLst>
             <a:ext uri="{FF2B5EF4-FFF2-40B4-BE49-F238E27FC236}">
+              <a16:creationId xmlns:a16="http://schemas.microsoft.com/office/drawing/2014/main" id="{421B640E-8E8B-43F5-F171-A6C95073B358}"/>
+            </a:ext>
+          </a:extLst>
+        </p:cNvPr>
+        <p:cNvGrpSpPr/>
+        <p:nvPr/>
+      </p:nvGrpSpPr>
+      <p:grpSpPr>
+        <a:xfrm>
+          <a:off x="0" y="0"/>
+          <a:ext cx="0" cy="0"/>
+          <a:chOff x="0" y="0"/>
+          <a:chExt cx="0" cy="0"/>
+        </a:xfrm>
+      </p:grpSpPr>
+      <p:sp>
+        <p:nvSpPr>
+          <p:cNvPr id="2" name="Title 1">
+            <a:extLst>
+              <a:ext uri="{FF2B5EF4-FFF2-40B4-BE49-F238E27FC236}">
+                <a16:creationId xmlns:a16="http://schemas.microsoft.com/office/drawing/2014/main" id="{979210AF-CA57-E2A9-2193-97FF0F1514DA}"/>
+              </a:ext>
+            </a:extLst>
+          </p:cNvPr>
+          <p:cNvSpPr>
+            <a:spLocks noGrp="1"/>
+          </p:cNvSpPr>
+          <p:nvPr>
+            <p:ph type="title"/>
+          </p:nvPr>
+        </p:nvSpPr>
+        <p:spPr/>
+        <p:txBody>
+          <a:bodyPr/>
+          <a:lstStyle/>
+          <a:p>
+            <a:r>
+              <a:rPr lang="en-US" dirty="0"/>
+              <a:t>Results (5) – Infrastructure, Recoded</a:t>
+            </a:r>
+          </a:p>
+        </p:txBody>
+      </p:sp>
+      <p:graphicFrame>
+        <p:nvGraphicFramePr>
+          <p:cNvPr id="3" name="Chart 2">
+            <a:extLst>
+              <a:ext uri="{FF2B5EF4-FFF2-40B4-BE49-F238E27FC236}">
+                <a16:creationId xmlns:a16="http://schemas.microsoft.com/office/drawing/2014/main" id="{FDEF4C9D-22C3-4B3D-F90C-A1D2D78FBD2F}"/>
+              </a:ext>
+            </a:extLst>
+          </p:cNvPr>
+          <p:cNvGraphicFramePr>
+            <a:graphicFrameLocks/>
+          </p:cNvGraphicFramePr>
+          <p:nvPr>
+            <p:extLst>
+              <p:ext uri="{D42A27DB-BD31-4B8C-83A1-F6EECF244321}">
+                <p14:modId xmlns:p14="http://schemas.microsoft.com/office/powerpoint/2010/main" val="1994951120"/>
+              </p:ext>
+            </p:extLst>
+          </p:nvPr>
+        </p:nvGraphicFramePr>
+        <p:xfrm>
+          <a:off x="905256" y="1307592"/>
+          <a:ext cx="10277856" cy="5276088"/>
+        </p:xfrm>
+        <a:graphic>
+          <a:graphicData uri="http://schemas.openxmlformats.org/drawingml/2006/chart">
+            <c:chart xmlns:c="http://schemas.openxmlformats.org/drawingml/2006/chart" xmlns:r="http://schemas.openxmlformats.org/officeDocument/2006/relationships" r:id="rId2"/>
+          </a:graphicData>
+        </a:graphic>
+      </p:graphicFrame>
+      <p:cxnSp>
+        <p:nvCxnSpPr>
+          <p:cNvPr id="5" name="Straight Connector 4">
+            <a:extLst>
+              <a:ext uri="{FF2B5EF4-FFF2-40B4-BE49-F238E27FC236}">
+                <a16:creationId xmlns:a16="http://schemas.microsoft.com/office/drawing/2014/main" id="{D1BACA1A-075F-A304-ECAE-DD84825181CE}"/>
+              </a:ext>
+            </a:extLst>
+          </p:cNvPr>
+          <p:cNvCxnSpPr>
+            <a:cxnSpLocks/>
+          </p:cNvCxnSpPr>
+          <p:nvPr/>
+        </p:nvCxnSpPr>
+        <p:spPr>
+          <a:xfrm flipV="1">
+            <a:off x="4166647" y="3512738"/>
+            <a:ext cx="512065" cy="1143606"/>
+          </a:xfrm>
+          <a:prstGeom prst="line">
+            <a:avLst/>
+          </a:prstGeom>
+          <a:ln w="12700">
+            <a:solidFill>
+              <a:schemeClr val="tx1"/>
+            </a:solidFill>
+          </a:ln>
+        </p:spPr>
+        <p:style>
+          <a:lnRef idx="1">
+            <a:schemeClr val="accent1"/>
+          </a:lnRef>
+          <a:fillRef idx="0">
+            <a:schemeClr val="accent1"/>
+          </a:fillRef>
+          <a:effectRef idx="0">
+            <a:schemeClr val="accent1"/>
+          </a:effectRef>
+          <a:fontRef idx="minor">
+            <a:schemeClr val="tx1"/>
+          </a:fontRef>
+        </p:style>
+      </p:cxnSp>
+      <p:cxnSp>
+        <p:nvCxnSpPr>
+          <p:cNvPr id="7" name="Straight Connector 6">
+            <a:extLst>
+              <a:ext uri="{FF2B5EF4-FFF2-40B4-BE49-F238E27FC236}">
+                <a16:creationId xmlns:a16="http://schemas.microsoft.com/office/drawing/2014/main" id="{95A97BB8-335D-D269-171B-C26666D1F3AC}"/>
+              </a:ext>
+            </a:extLst>
+          </p:cNvPr>
+          <p:cNvCxnSpPr>
+            <a:cxnSpLocks/>
+          </p:cNvCxnSpPr>
+          <p:nvPr/>
+        </p:nvCxnSpPr>
+        <p:spPr>
+          <a:xfrm flipV="1">
+            <a:off x="4119514" y="3812143"/>
+            <a:ext cx="1380224" cy="1155783"/>
+          </a:xfrm>
+          <a:prstGeom prst="line">
+            <a:avLst/>
+          </a:prstGeom>
+          <a:ln w="12700">
+            <a:solidFill>
+              <a:schemeClr val="tx1"/>
+            </a:solidFill>
+          </a:ln>
+        </p:spPr>
+        <p:style>
+          <a:lnRef idx="1">
+            <a:schemeClr val="accent1"/>
+          </a:lnRef>
+          <a:fillRef idx="0">
+            <a:schemeClr val="accent1"/>
+          </a:fillRef>
+          <a:effectRef idx="0">
+            <a:schemeClr val="accent1"/>
+          </a:effectRef>
+          <a:fontRef idx="minor">
+            <a:schemeClr val="tx1"/>
+          </a:fontRef>
+        </p:style>
+      </p:cxnSp>
+      <p:cxnSp>
+        <p:nvCxnSpPr>
+          <p:cNvPr id="9" name="Straight Connector 8">
+            <a:extLst>
+              <a:ext uri="{FF2B5EF4-FFF2-40B4-BE49-F238E27FC236}">
+                <a16:creationId xmlns:a16="http://schemas.microsoft.com/office/drawing/2014/main" id="{A4262014-84E7-F267-FE07-8B0DD3D31EF6}"/>
+              </a:ext>
+            </a:extLst>
+          </p:cNvPr>
+          <p:cNvCxnSpPr>
+            <a:cxnSpLocks/>
+          </p:cNvCxnSpPr>
+          <p:nvPr/>
+        </p:nvCxnSpPr>
+        <p:spPr>
+          <a:xfrm flipV="1">
+            <a:off x="4110087" y="4290919"/>
+            <a:ext cx="1838226" cy="798583"/>
+          </a:xfrm>
+          <a:prstGeom prst="line">
+            <a:avLst/>
+          </a:prstGeom>
+          <a:ln w="12700">
+            <a:solidFill>
+              <a:schemeClr val="tx1"/>
+            </a:solidFill>
+          </a:ln>
+        </p:spPr>
+        <p:style>
+          <a:lnRef idx="1">
+            <a:schemeClr val="accent1"/>
+          </a:lnRef>
+          <a:fillRef idx="0">
+            <a:schemeClr val="accent1"/>
+          </a:fillRef>
+          <a:effectRef idx="0">
+            <a:schemeClr val="accent1"/>
+          </a:effectRef>
+          <a:fontRef idx="minor">
+            <a:schemeClr val="tx1"/>
+          </a:fontRef>
+        </p:style>
+      </p:cxnSp>
+      <p:sp>
+        <p:nvSpPr>
+          <p:cNvPr id="14" name="TextBox 13">
+            <a:extLst>
+              <a:ext uri="{FF2B5EF4-FFF2-40B4-BE49-F238E27FC236}">
+                <a16:creationId xmlns:a16="http://schemas.microsoft.com/office/drawing/2014/main" id="{A6E14A3C-0B5B-0FB8-BB11-165D1D4DBD68}"/>
+              </a:ext>
+            </a:extLst>
+          </p:cNvPr>
+          <p:cNvSpPr txBox="1"/>
+          <p:nvPr/>
+        </p:nvSpPr>
+        <p:spPr>
+          <a:xfrm>
+            <a:off x="4295335" y="3036740"/>
+            <a:ext cx="2609621" cy="523220"/>
+          </a:xfrm>
+          <a:prstGeom prst="rect">
+            <a:avLst/>
+          </a:prstGeom>
+          <a:noFill/>
+        </p:spPr>
+        <p:txBody>
+          <a:bodyPr wrap="square" rtlCol="0">
+            <a:spAutoFit/>
+          </a:bodyPr>
+          <a:lstStyle/>
+          <a:p>
+            <a:pPr algn="ctr"/>
+            <a:r>
+              <a:rPr lang="en-US" sz="1400" dirty="0"/>
+              <a:t>After approx. 15 strikes, Civilian targets settle out to 0.3234</a:t>
+            </a:r>
+          </a:p>
+        </p:txBody>
+      </p:sp>
+      <p:sp>
+        <p:nvSpPr>
+          <p:cNvPr id="20" name="TextBox 19">
+            <a:extLst>
+              <a:ext uri="{FF2B5EF4-FFF2-40B4-BE49-F238E27FC236}">
+                <a16:creationId xmlns:a16="http://schemas.microsoft.com/office/drawing/2014/main" id="{ABA3E727-06D7-7764-F8D2-C9F35219F96C}"/>
+              </a:ext>
+            </a:extLst>
+          </p:cNvPr>
+          <p:cNvSpPr txBox="1"/>
+          <p:nvPr/>
+        </p:nvSpPr>
+        <p:spPr>
+          <a:xfrm>
+            <a:off x="4915715" y="3578421"/>
+            <a:ext cx="2934987" cy="307777"/>
+          </a:xfrm>
+          <a:prstGeom prst="rect">
+            <a:avLst/>
+          </a:prstGeom>
+          <a:noFill/>
+        </p:spPr>
+        <p:txBody>
+          <a:bodyPr wrap="square" rtlCol="0">
+            <a:spAutoFit/>
+          </a:bodyPr>
+          <a:lstStyle/>
+          <a:p>
+            <a:pPr algn="ctr"/>
+            <a:r>
+              <a:rPr lang="en-US" sz="1400" dirty="0"/>
+              <a:t>Business targets: 0.2427</a:t>
+            </a:r>
+          </a:p>
+        </p:txBody>
+      </p:sp>
+      <p:sp>
+        <p:nvSpPr>
+          <p:cNvPr id="23" name="TextBox 22">
+            <a:extLst>
+              <a:ext uri="{FF2B5EF4-FFF2-40B4-BE49-F238E27FC236}">
+                <a16:creationId xmlns:a16="http://schemas.microsoft.com/office/drawing/2014/main" id="{F3D2008E-3E91-11CF-5AF5-C785D29967BE}"/>
+              </a:ext>
+            </a:extLst>
+          </p:cNvPr>
+          <p:cNvSpPr txBox="1"/>
+          <p:nvPr/>
+        </p:nvSpPr>
+        <p:spPr>
+          <a:xfrm>
+            <a:off x="5593817" y="4035122"/>
+            <a:ext cx="2934987" cy="307777"/>
+          </a:xfrm>
+          <a:prstGeom prst="rect">
+            <a:avLst/>
+          </a:prstGeom>
+          <a:noFill/>
+        </p:spPr>
+        <p:txBody>
+          <a:bodyPr wrap="square" rtlCol="0">
+            <a:spAutoFit/>
+          </a:bodyPr>
+          <a:lstStyle/>
+          <a:p>
+            <a:pPr algn="ctr"/>
+            <a:r>
+              <a:rPr lang="en-US" sz="1400" dirty="0"/>
+              <a:t>Power &amp; Fuel targets: 0.2427</a:t>
+            </a:r>
+          </a:p>
+        </p:txBody>
+      </p:sp>
+    </p:spTree>
+    <p:extLst>
+      <p:ext uri="{BB962C8B-B14F-4D97-AF65-F5344CB8AC3E}">
+        <p14:creationId xmlns:p14="http://schemas.microsoft.com/office/powerpoint/2010/main" val="3990662772"/>
+      </p:ext>
+    </p:extLst>
+  </p:cSld>
+  <p:clrMapOvr>
+    <a:masterClrMapping/>
+  </p:clrMapOvr>
+</p:sld>
+</file>
+
+<file path=ppt/slides/slide11.xml><?xml version="1.0" encoding="utf-8"?>
+<p:sld xmlns:a="http://schemas.openxmlformats.org/drawingml/2006/main" xmlns:r="http://schemas.openxmlformats.org/officeDocument/2006/relationships" xmlns:p="http://schemas.openxmlformats.org/presentationml/2006/main">
+  <p:cSld>
+    <p:spTree>
+      <p:nvGrpSpPr>
+        <p:cNvPr id="1" name=""/>
+        <p:cNvGrpSpPr/>
+        <p:nvPr/>
+      </p:nvGrpSpPr>
+      <p:grpSpPr>
+        <a:xfrm>
+          <a:off x="0" y="0"/>
+          <a:ext cx="0" cy="0"/>
+          <a:chOff x="0" y="0"/>
+          <a:chExt cx="0" cy="0"/>
+        </a:xfrm>
+      </p:grpSpPr>
+      <p:sp>
+        <p:nvSpPr>
+          <p:cNvPr id="2" name="Title 1">
+            <a:extLst>
+              <a:ext uri="{FF2B5EF4-FFF2-40B4-BE49-F238E27FC236}">
+                <a16:creationId xmlns:a16="http://schemas.microsoft.com/office/drawing/2014/main" id="{5CF0BCC4-D731-9BFE-B53D-C5898A46AD3B}"/>
+              </a:ext>
+            </a:extLst>
+          </p:cNvPr>
+          <p:cNvSpPr>
+            <a:spLocks noGrp="1"/>
+          </p:cNvSpPr>
+          <p:nvPr>
+            <p:ph type="title"/>
+          </p:nvPr>
+        </p:nvSpPr>
+        <p:spPr/>
+        <p:txBody>
+          <a:bodyPr/>
+          <a:lstStyle/>
+          <a:p>
+            <a:r>
+              <a:rPr lang="en-US" dirty="0"/>
+              <a:t>Expansion (geo data)</a:t>
+            </a:r>
+          </a:p>
+        </p:txBody>
+      </p:sp>
+      <p:sp>
+        <p:nvSpPr>
+          <p:cNvPr id="3" name="Content Placeholder 2">
+            <a:extLst>
+              <a:ext uri="{FF2B5EF4-FFF2-40B4-BE49-F238E27FC236}">
+                <a16:creationId xmlns:a16="http://schemas.microsoft.com/office/drawing/2014/main" id="{5C7FB829-E160-ACDE-1ADB-B6AB9B3D8DA0}"/>
+              </a:ext>
+            </a:extLst>
+          </p:cNvPr>
+          <p:cNvSpPr>
+            <a:spLocks noGrp="1"/>
+          </p:cNvSpPr>
+          <p:nvPr>
+            <p:ph idx="1"/>
+          </p:nvPr>
+        </p:nvSpPr>
+        <p:spPr/>
+        <p:txBody>
+          <a:bodyPr/>
+          <a:lstStyle/>
+          <a:p>
+            <a:endParaRPr lang="en-US"/>
+          </a:p>
+        </p:txBody>
+      </p:sp>
+    </p:spTree>
+    <p:extLst>
+      <p:ext uri="{BB962C8B-B14F-4D97-AF65-F5344CB8AC3E}">
+        <p14:creationId xmlns:p14="http://schemas.microsoft.com/office/powerpoint/2010/main" val="1713706811"/>
+      </p:ext>
+    </p:extLst>
+  </p:cSld>
+  <p:clrMapOvr>
+    <a:masterClrMapping/>
+  </p:clrMapOvr>
+</p:sld>
+</file>
+
+<file path=ppt/slides/slide2.xml><?xml version="1.0" encoding="utf-8"?>
+<p:sld xmlns:a="http://schemas.openxmlformats.org/drawingml/2006/main" xmlns:r="http://schemas.openxmlformats.org/officeDocument/2006/relationships" xmlns:p="http://schemas.openxmlformats.org/presentationml/2006/main">
+  <p:cSld>
+    <p:spTree>
+      <p:nvGrpSpPr>
+        <p:cNvPr id="1" name=""/>
+        <p:cNvGrpSpPr/>
+        <p:nvPr/>
+      </p:nvGrpSpPr>
+      <p:grpSpPr>
+        <a:xfrm>
+          <a:off x="0" y="0"/>
+          <a:ext cx="0" cy="0"/>
+          <a:chOff x="0" y="0"/>
+          <a:chExt cx="0" cy="0"/>
+        </a:xfrm>
+      </p:grpSpPr>
+      <p:sp>
+        <p:nvSpPr>
+          <p:cNvPr id="2" name="Title 1">
+            <a:extLst>
+              <a:ext uri="{FF2B5EF4-FFF2-40B4-BE49-F238E27FC236}">
+                <a16:creationId xmlns:a16="http://schemas.microsoft.com/office/drawing/2014/main" id="{BEC0930C-05F1-2507-08E4-4319DE0F279E}"/>
+              </a:ext>
+            </a:extLst>
+          </p:cNvPr>
+          <p:cNvSpPr>
+            <a:spLocks noGrp="1"/>
+          </p:cNvSpPr>
+          <p:nvPr>
+            <p:ph type="title"/>
+          </p:nvPr>
+        </p:nvSpPr>
+        <p:spPr/>
+        <p:txBody>
+          <a:bodyPr/>
+          <a:lstStyle/>
+          <a:p>
+            <a:r>
+              <a:rPr lang="en-US" dirty="0"/>
+              <a:t>Notes</a:t>
+            </a:r>
+          </a:p>
+        </p:txBody>
+      </p:sp>
+      <p:sp>
+        <p:nvSpPr>
+          <p:cNvPr id="3" name="Content Placeholder 2">
+            <a:extLst>
+              <a:ext uri="{FF2B5EF4-FFF2-40B4-BE49-F238E27FC236}">
+                <a16:creationId xmlns:a16="http://schemas.microsoft.com/office/drawing/2014/main" id="{A2BD7EE3-4D24-89C5-E7D1-FE2734F58EBF}"/>
+              </a:ext>
+            </a:extLst>
+          </p:cNvPr>
+          <p:cNvSpPr>
+            <a:spLocks noGrp="1"/>
+          </p:cNvSpPr>
+          <p:nvPr>
+            <p:ph idx="1"/>
+          </p:nvPr>
+        </p:nvSpPr>
+        <p:spPr/>
+        <p:txBody>
+          <a:bodyPr>
+            <a:normAutofit/>
+          </a:bodyPr>
+          <a:lstStyle/>
+          <a:p>
+            <a:r>
+              <a:rPr lang="en-US" sz="2400" dirty="0"/>
+              <a:t>The full code, all matrices and tables, and answers to the prompted questions can be found in the accompanying </a:t>
+            </a:r>
+            <a:r>
+              <a:rPr lang="en-US" sz="2400" dirty="0" err="1"/>
+              <a:t>Jupyter</a:t>
+            </a:r>
+            <a:r>
+              <a:rPr lang="en-US" sz="2400" dirty="0"/>
+              <a:t> notebook.</a:t>
+            </a:r>
+          </a:p>
+          <a:p>
+            <a:endParaRPr lang="en-US" sz="2400" dirty="0"/>
+          </a:p>
+          <a:p>
+            <a:r>
+              <a:rPr lang="en-US" sz="2400" dirty="0"/>
+              <a:t>Claude was used to troubleshoot code, but no code written by Claude was used for the simulation (i.e., code written by Claude for troubleshooting was removed after bugs were identified).  Therefore, Claude’s only influence is the adjustment of pre-existing code originally based on Assignment 5 and course content downloaded from the course GitHub.</a:t>
+            </a:r>
+          </a:p>
+        </p:txBody>
+      </p:sp>
+    </p:spTree>
+    <p:extLst>
+      <p:ext uri="{BB962C8B-B14F-4D97-AF65-F5344CB8AC3E}">
+        <p14:creationId xmlns:p14="http://schemas.microsoft.com/office/powerpoint/2010/main" val="3747026330"/>
+      </p:ext>
+    </p:extLst>
+  </p:cSld>
+  <p:clrMapOvr>
+    <a:masterClrMapping/>
+  </p:clrMapOvr>
+</p:sld>
+</file>
+
+<file path=ppt/slides/slide3.xml><?xml version="1.0" encoding="utf-8"?>
+<p:sld xmlns:a="http://schemas.openxmlformats.org/drawingml/2006/main" xmlns:r="http://schemas.openxmlformats.org/officeDocument/2006/relationships" xmlns:p="http://schemas.openxmlformats.org/presentationml/2006/main">
+  <p:cSld>
+    <p:spTree>
+      <p:nvGrpSpPr>
+        <p:cNvPr id="1" name=""/>
+        <p:cNvGrpSpPr/>
+        <p:nvPr/>
+      </p:nvGrpSpPr>
+      <p:grpSpPr>
+        <a:xfrm>
+          <a:off x="0" y="0"/>
+          <a:ext cx="0" cy="0"/>
+          <a:chOff x="0" y="0"/>
+          <a:chExt cx="0" cy="0"/>
+        </a:xfrm>
+      </p:grpSpPr>
+      <p:sp>
+        <p:nvSpPr>
+          <p:cNvPr id="2" name="Title 1">
+            <a:extLst>
+              <a:ext uri="{FF2B5EF4-FFF2-40B4-BE49-F238E27FC236}">
+                <a16:creationId xmlns:a16="http://schemas.microsoft.com/office/drawing/2014/main" id="{B4BCC579-5CC0-A5BD-3B70-BDF1CB6BFFB8}"/>
+              </a:ext>
+            </a:extLst>
+          </p:cNvPr>
+          <p:cNvSpPr>
+            <a:spLocks noGrp="1"/>
+          </p:cNvSpPr>
+          <p:nvPr>
+            <p:ph type="title"/>
+          </p:nvPr>
+        </p:nvSpPr>
+        <p:spPr/>
+        <p:txBody>
+          <a:bodyPr/>
+          <a:lstStyle/>
+          <a:p>
+            <a:r>
+              <a:rPr lang="en-US" dirty="0"/>
+              <a:t>Target Variables</a:t>
+            </a:r>
+          </a:p>
+        </p:txBody>
+      </p:sp>
+      <p:sp>
+        <p:nvSpPr>
+          <p:cNvPr id="3" name="Content Placeholder 2">
+            <a:extLst>
+              <a:ext uri="{FF2B5EF4-FFF2-40B4-BE49-F238E27FC236}">
+                <a16:creationId xmlns:a16="http://schemas.microsoft.com/office/drawing/2014/main" id="{1FA432B6-2B47-2D08-4D66-59E0E2B0BDE3}"/>
+              </a:ext>
+            </a:extLst>
+          </p:cNvPr>
+          <p:cNvSpPr>
+            <a:spLocks noGrp="1"/>
+          </p:cNvSpPr>
+          <p:nvPr>
+            <p:ph idx="1"/>
+          </p:nvPr>
+        </p:nvSpPr>
+        <p:spPr/>
+        <p:txBody>
+          <a:bodyPr/>
+          <a:lstStyle/>
+          <a:p>
+            <a:r>
+              <a:rPr lang="en-US" dirty="0"/>
+              <a:t>oblast</a:t>
+            </a:r>
+          </a:p>
+          <a:p>
+            <a:r>
+              <a:rPr lang="en-US" dirty="0"/>
+              <a:t>rayon</a:t>
+            </a:r>
+          </a:p>
+          <a:p>
+            <a:r>
+              <a:rPr lang="en-US" dirty="0"/>
+              <a:t>type_of_infrastructure</a:t>
+            </a:r>
+          </a:p>
+        </p:txBody>
+      </p:sp>
+    </p:spTree>
+    <p:extLst>
+      <p:ext uri="{BB962C8B-B14F-4D97-AF65-F5344CB8AC3E}">
+        <p14:creationId xmlns:p14="http://schemas.microsoft.com/office/powerpoint/2010/main" val="64733370"/>
+      </p:ext>
+    </p:extLst>
+  </p:cSld>
+  <p:clrMapOvr>
+    <a:masterClrMapping/>
+  </p:clrMapOvr>
+</p:sld>
+</file>
+
+<file path=ppt/slides/slide4.xml><?xml version="1.0" encoding="utf-8"?>
+<p:sld xmlns:a="http://schemas.openxmlformats.org/drawingml/2006/main" xmlns:r="http://schemas.openxmlformats.org/officeDocument/2006/relationships" xmlns:p="http://schemas.openxmlformats.org/presentationml/2006/main">
+  <p:cSld>
+    <p:spTree>
+      <p:nvGrpSpPr>
+        <p:cNvPr id="1" name=""/>
+        <p:cNvGrpSpPr/>
+        <p:nvPr/>
+      </p:nvGrpSpPr>
+      <p:grpSpPr>
+        <a:xfrm>
+          <a:off x="0" y="0"/>
+          <a:ext cx="0" cy="0"/>
+          <a:chOff x="0" y="0"/>
+          <a:chExt cx="0" cy="0"/>
+        </a:xfrm>
+      </p:grpSpPr>
+      <p:sp>
+        <p:nvSpPr>
+          <p:cNvPr id="2" name="Title 1">
+            <a:extLst>
+              <a:ext uri="{FF2B5EF4-FFF2-40B4-BE49-F238E27FC236}">
+                <a16:creationId xmlns:a16="http://schemas.microsoft.com/office/drawing/2014/main" id="{4243B684-7610-B1D2-CEFC-8BD5C31B7DB9}"/>
+              </a:ext>
+            </a:extLst>
+          </p:cNvPr>
+          <p:cNvSpPr>
+            <a:spLocks noGrp="1"/>
+          </p:cNvSpPr>
+          <p:nvPr>
+            <p:ph type="title"/>
+          </p:nvPr>
+        </p:nvSpPr>
+        <p:spPr>
+          <a:xfrm>
+            <a:off x="154146" y="306846"/>
+            <a:ext cx="5303520" cy="1493982"/>
+          </a:xfrm>
+        </p:spPr>
+        <p:txBody>
+          <a:bodyPr>
+            <a:noAutofit/>
+          </a:bodyPr>
+          <a:lstStyle/>
+          <a:p>
+            <a:r>
+              <a:rPr lang="en-US" sz="5400" b="1" dirty="0"/>
+              <a:t>Markov Transition Heatmap</a:t>
+            </a:r>
+          </a:p>
+        </p:txBody>
+      </p:sp>
+      <p:pic>
+        <p:nvPicPr>
+          <p:cNvPr id="5" name="Content Placeholder 4">
+            <a:extLst>
+              <a:ext uri="{FF2B5EF4-FFF2-40B4-BE49-F238E27FC236}">
+                <a16:creationId xmlns:a16="http://schemas.microsoft.com/office/drawing/2014/main" id="{3E934E2D-DC50-5F05-84D7-445162EBF7EC}"/>
+              </a:ext>
+            </a:extLst>
+          </p:cNvPr>
+          <p:cNvPicPr>
+            <a:picLocks noGrp="1" noChangeAspect="1"/>
+          </p:cNvPicPr>
+          <p:nvPr>
+            <p:ph idx="1"/>
+          </p:nvPr>
+        </p:nvPicPr>
+        <p:blipFill>
+          <a:blip r:embed="rId2"/>
+          <a:stretch>
+            <a:fillRect/>
+          </a:stretch>
+        </p:blipFill>
+        <p:spPr>
+          <a:xfrm>
+            <a:off x="5128816" y="246888"/>
+            <a:ext cx="7063184" cy="6364223"/>
+          </a:xfrm>
+          <a:prstGeom prst="rect">
+            <a:avLst/>
+          </a:prstGeom>
+        </p:spPr>
+      </p:pic>
+      <p:sp>
+        <p:nvSpPr>
+          <p:cNvPr id="3" name="Text Placeholder 2">
+            <a:extLst>
+              <a:ext uri="{FF2B5EF4-FFF2-40B4-BE49-F238E27FC236}">
+                <a16:creationId xmlns:a16="http://schemas.microsoft.com/office/drawing/2014/main" id="{DABC945B-A85F-5464-5FBF-8FEE1E65DEAE}"/>
+              </a:ext>
+            </a:extLst>
+          </p:cNvPr>
+          <p:cNvSpPr>
+            <a:spLocks noGrp="1"/>
+          </p:cNvSpPr>
+          <p:nvPr>
+            <p:ph type="body" sz="half" idx="2"/>
+          </p:nvPr>
+        </p:nvSpPr>
+        <p:spPr>
+          <a:xfrm>
+            <a:off x="839787" y="2694104"/>
+            <a:ext cx="3932237" cy="2874175"/>
+          </a:xfrm>
+        </p:spPr>
+        <p:txBody>
+          <a:bodyPr>
+            <a:normAutofit/>
+          </a:bodyPr>
+          <a:lstStyle/>
+          <a:p>
+            <a:pPr marL="285750" indent="-285750">
+              <a:buFont typeface="Arial" panose="020B0604020202020204" pitchFamily="34" charset="0"/>
+              <a:buChar char="•"/>
+            </a:pPr>
+            <a:r>
+              <a:rPr lang="en-US" sz="2400" dirty="0"/>
+              <a:t>Oblast</a:t>
+            </a:r>
+          </a:p>
+          <a:p>
+            <a:pPr marL="285750" indent="-285750">
+              <a:buFont typeface="Arial" panose="020B0604020202020204" pitchFamily="34" charset="0"/>
+              <a:buChar char="•"/>
+            </a:pPr>
+            <a:r>
+              <a:rPr lang="en-US" sz="2400" dirty="0"/>
+              <a:t>Sources/Origin</a:t>
+            </a:r>
+          </a:p>
+          <a:p>
+            <a:pPr marL="742950" lvl="1" indent="-285750">
+              <a:buFont typeface="Arial" panose="020B0604020202020204" pitchFamily="34" charset="0"/>
+              <a:buChar char="•"/>
+            </a:pPr>
+            <a:r>
+              <a:rPr lang="en-US" sz="2400" dirty="0"/>
+              <a:t>Row of Heatmap</a:t>
+            </a:r>
+          </a:p>
+          <a:p>
+            <a:pPr marL="285750" indent="-285750">
+              <a:buFont typeface="Arial" panose="020B0604020202020204" pitchFamily="34" charset="0"/>
+              <a:buChar char="•"/>
+            </a:pPr>
+            <a:r>
+              <a:rPr lang="en-US" sz="2400" dirty="0"/>
+              <a:t>Destinations</a:t>
+            </a:r>
+          </a:p>
+          <a:p>
+            <a:pPr marL="742950" lvl="1" indent="-285750">
+              <a:buFont typeface="Arial" panose="020B0604020202020204" pitchFamily="34" charset="0"/>
+              <a:buChar char="•"/>
+            </a:pPr>
+            <a:r>
+              <a:rPr lang="en-US" sz="2400" dirty="0"/>
+              <a:t>Column of Heatmap</a:t>
+            </a:r>
+          </a:p>
+        </p:txBody>
+      </p:sp>
+    </p:spTree>
+    <p:extLst>
+      <p:ext uri="{BB962C8B-B14F-4D97-AF65-F5344CB8AC3E}">
+        <p14:creationId xmlns:p14="http://schemas.microsoft.com/office/powerpoint/2010/main" val="3173902929"/>
+      </p:ext>
+    </p:extLst>
+  </p:cSld>
+  <p:clrMapOvr>
+    <a:masterClrMapping/>
+  </p:clrMapOvr>
+</p:sld>
+</file>
+
+<file path=ppt/slides/slide5.xml><?xml version="1.0" encoding="utf-8"?>
+<p:sld xmlns:a="http://schemas.openxmlformats.org/drawingml/2006/main" xmlns:r="http://schemas.openxmlformats.org/officeDocument/2006/relationships" xmlns:p="http://schemas.openxmlformats.org/presentationml/2006/main">
+  <p:cSld>
+    <p:spTree>
+      <p:nvGrpSpPr>
+        <p:cNvPr id="1" name=""/>
+        <p:cNvGrpSpPr/>
+        <p:nvPr/>
+      </p:nvGrpSpPr>
+      <p:grpSpPr>
+        <a:xfrm>
+          <a:off x="0" y="0"/>
+          <a:ext cx="0" cy="0"/>
+          <a:chOff x="0" y="0"/>
+          <a:chExt cx="0" cy="0"/>
+        </a:xfrm>
+      </p:grpSpPr>
+      <p:pic>
+        <p:nvPicPr>
+          <p:cNvPr id="5" name="Content Placeholder 4">
+            <a:extLst>
+              <a:ext uri="{FF2B5EF4-FFF2-40B4-BE49-F238E27FC236}">
+                <a16:creationId xmlns:a16="http://schemas.microsoft.com/office/drawing/2014/main" id="{B87C7871-B3F9-DE91-164C-259656092FF4}"/>
+              </a:ext>
+            </a:extLst>
+          </p:cNvPr>
+          <p:cNvPicPr>
+            <a:picLocks noGrp="1" noChangeAspect="1"/>
+          </p:cNvPicPr>
+          <p:nvPr>
+            <p:ph idx="1"/>
+          </p:nvPr>
+        </p:nvPicPr>
+        <p:blipFill>
+          <a:blip r:embed="rId2"/>
+          <a:stretch>
+            <a:fillRect/>
+          </a:stretch>
+        </p:blipFill>
+        <p:spPr>
+          <a:xfrm>
+            <a:off x="0" y="1160839"/>
+            <a:ext cx="5870008" cy="5697162"/>
+          </a:xfrm>
+          <a:prstGeom prst="rect">
+            <a:avLst/>
+          </a:prstGeom>
+        </p:spPr>
+      </p:pic>
+      <p:pic>
+        <p:nvPicPr>
+          <p:cNvPr id="7" name="Picture 6">
+            <a:extLst>
+              <a:ext uri="{FF2B5EF4-FFF2-40B4-BE49-F238E27FC236}">
+                <a16:creationId xmlns:a16="http://schemas.microsoft.com/office/drawing/2014/main" id="{0C0DDD08-2D09-2B7C-C3E1-3291478D2F6F}"/>
+              </a:ext>
+            </a:extLst>
+          </p:cNvPr>
+          <p:cNvPicPr>
+            <a:picLocks noChangeAspect="1"/>
+          </p:cNvPicPr>
+          <p:nvPr/>
+        </p:nvPicPr>
+        <p:blipFill>
+          <a:blip r:embed="rId3"/>
+          <a:stretch>
+            <a:fillRect/>
+          </a:stretch>
+        </p:blipFill>
+        <p:spPr>
+          <a:xfrm>
+            <a:off x="6096000" y="1169675"/>
+            <a:ext cx="5870008" cy="5688325"/>
+          </a:xfrm>
+          <a:prstGeom prst="rect">
+            <a:avLst/>
+          </a:prstGeom>
+        </p:spPr>
+      </p:pic>
+      <p:sp>
+        <p:nvSpPr>
+          <p:cNvPr id="9" name="Title 1">
+            <a:extLst>
+              <a:ext uri="{FF2B5EF4-FFF2-40B4-BE49-F238E27FC236}">
+                <a16:creationId xmlns:a16="http://schemas.microsoft.com/office/drawing/2014/main" id="{84212A37-ACF6-D218-12F2-52E1D0DA8CBA}"/>
+              </a:ext>
+            </a:extLst>
+          </p:cNvPr>
+          <p:cNvSpPr>
+            <a:spLocks noGrp="1"/>
+          </p:cNvSpPr>
+          <p:nvPr>
+            <p:ph type="title"/>
+          </p:nvPr>
+        </p:nvSpPr>
+        <p:spPr>
+          <a:xfrm>
+            <a:off x="566488" y="125714"/>
+            <a:ext cx="4938323" cy="903427"/>
+          </a:xfrm>
+        </p:spPr>
+        <p:txBody>
+          <a:bodyPr>
+            <a:noAutofit/>
+          </a:bodyPr>
+          <a:lstStyle/>
+          <a:p>
+            <a:r>
+              <a:rPr lang="en-US" sz="5400" b="1" dirty="0"/>
+              <a:t>Rayon Heatmap</a:t>
+            </a:r>
+          </a:p>
+        </p:txBody>
+      </p:sp>
+      <p:sp>
+        <p:nvSpPr>
+          <p:cNvPr id="10" name="Title 1">
+            <a:extLst>
+              <a:ext uri="{FF2B5EF4-FFF2-40B4-BE49-F238E27FC236}">
+                <a16:creationId xmlns:a16="http://schemas.microsoft.com/office/drawing/2014/main" id="{241CF9D6-9CA4-255B-B173-40FC1C120B81}"/>
+              </a:ext>
+            </a:extLst>
+          </p:cNvPr>
+          <p:cNvSpPr txBox="1">
+            <a:spLocks/>
+          </p:cNvSpPr>
+          <p:nvPr/>
+        </p:nvSpPr>
+        <p:spPr>
+          <a:xfrm>
+            <a:off x="5437305" y="174809"/>
+            <a:ext cx="6528703" cy="903427"/>
+          </a:xfrm>
+          <a:prstGeom prst="rect">
+            <a:avLst/>
+          </a:prstGeom>
+        </p:spPr>
+        <p:txBody>
+          <a:bodyPr vert="horz" lIns="91440" tIns="45720" rIns="91440" bIns="45720" rtlCol="0" anchor="ctr">
+            <a:noAutofit/>
+          </a:bodyPr>
+          <a:lstStyle>
+            <a:lvl1pPr algn="l" defTabSz="914400" rtl="0" eaLnBrk="1" latinLnBrk="0" hangingPunct="1">
+              <a:lnSpc>
+                <a:spcPct val="90000"/>
+              </a:lnSpc>
+              <a:spcBef>
+                <a:spcPct val="0"/>
+              </a:spcBef>
+              <a:buNone/>
+              <a:defRPr sz="4400" kern="1200">
+                <a:solidFill>
+                  <a:schemeClr val="tx1"/>
+                </a:solidFill>
+                <a:latin typeface="+mj-lt"/>
+                <a:ea typeface="+mj-ea"/>
+                <a:cs typeface="+mj-cs"/>
+              </a:defRPr>
+            </a:lvl1pPr>
+          </a:lstStyle>
+          <a:p>
+            <a:r>
+              <a:rPr lang="en-US" sz="5400" b="1" dirty="0"/>
+              <a:t>Infrastructure Heatmap</a:t>
+            </a:r>
+          </a:p>
+        </p:txBody>
+      </p:sp>
+    </p:spTree>
+    <p:extLst>
+      <p:ext uri="{BB962C8B-B14F-4D97-AF65-F5344CB8AC3E}">
+        <p14:creationId xmlns:p14="http://schemas.microsoft.com/office/powerpoint/2010/main" val="4208236196"/>
+      </p:ext>
+    </p:extLst>
+  </p:cSld>
+  <p:clrMapOvr>
+    <a:masterClrMapping/>
+  </p:clrMapOvr>
+</p:sld>
+</file>
+
+<file path=ppt/slides/slide6.xml><?xml version="1.0" encoding="utf-8"?>
+<p:sld xmlns:a="http://schemas.openxmlformats.org/drawingml/2006/main" xmlns:r="http://schemas.openxmlformats.org/officeDocument/2006/relationships" xmlns:p="http://schemas.openxmlformats.org/presentationml/2006/main">
+  <p:cSld>
+    <p:spTree>
+      <p:nvGrpSpPr>
+        <p:cNvPr id="1" name="">
+          <a:extLst>
+            <a:ext uri="{FF2B5EF4-FFF2-40B4-BE49-F238E27FC236}">
+              <a16:creationId xmlns:a16="http://schemas.microsoft.com/office/drawing/2014/main" id="{2BDFEB94-5D1E-3A75-E13F-030411C94441}"/>
+            </a:ext>
+          </a:extLst>
+        </p:cNvPr>
+        <p:cNvGrpSpPr/>
+        <p:nvPr/>
+      </p:nvGrpSpPr>
+      <p:grpSpPr>
+        <a:xfrm>
+          <a:off x="0" y="0"/>
+          <a:ext cx="0" cy="0"/>
+          <a:chOff x="0" y="0"/>
+          <a:chExt cx="0" cy="0"/>
+        </a:xfrm>
+      </p:grpSpPr>
+      <p:sp>
+        <p:nvSpPr>
+          <p:cNvPr id="2" name="Title 1">
+            <a:extLst>
+              <a:ext uri="{FF2B5EF4-FFF2-40B4-BE49-F238E27FC236}">
+                <a16:creationId xmlns:a16="http://schemas.microsoft.com/office/drawing/2014/main" id="{5E419E64-E93C-6697-672B-EBB1B7C4BDA1}"/>
+              </a:ext>
+            </a:extLst>
+          </p:cNvPr>
+          <p:cNvSpPr>
+            <a:spLocks noGrp="1"/>
+          </p:cNvSpPr>
+          <p:nvPr>
+            <p:ph type="title"/>
+          </p:nvPr>
+        </p:nvSpPr>
+        <p:spPr/>
+        <p:txBody>
+          <a:bodyPr/>
+          <a:lstStyle/>
+          <a:p>
+            <a:r>
+              <a:rPr lang="en-US" dirty="0"/>
+              <a:t>Results</a:t>
+            </a:r>
+          </a:p>
+        </p:txBody>
+      </p:sp>
+      <p:pic>
+        <p:nvPicPr>
+          <p:cNvPr id="7" name="Picture 6">
+            <a:extLst>
+              <a:ext uri="{FF2B5EF4-FFF2-40B4-BE49-F238E27FC236}">
+                <a16:creationId xmlns:a16="http://schemas.microsoft.com/office/drawing/2014/main" id="{9EEB8E65-4BC0-AC59-C502-845B9EF5D5FD}"/>
+              </a:ext>
+            </a:extLst>
+          </p:cNvPr>
+          <p:cNvPicPr>
+            <a:picLocks noChangeAspect="1"/>
+          </p:cNvPicPr>
+          <p:nvPr/>
+        </p:nvPicPr>
+        <p:blipFill>
+          <a:blip r:embed="rId2"/>
+          <a:stretch>
+            <a:fillRect/>
+          </a:stretch>
+        </p:blipFill>
+        <p:spPr>
+          <a:xfrm>
+            <a:off x="3819545" y="403782"/>
+            <a:ext cx="8139976" cy="4834967"/>
+          </a:xfrm>
+          <a:prstGeom prst="rect">
+            <a:avLst/>
+          </a:prstGeom>
+        </p:spPr>
+      </p:pic>
+      <p:sp>
+        <p:nvSpPr>
+          <p:cNvPr id="3" name="TextBox 2">
+            <a:extLst>
+              <a:ext uri="{FF2B5EF4-FFF2-40B4-BE49-F238E27FC236}">
+                <a16:creationId xmlns:a16="http://schemas.microsoft.com/office/drawing/2014/main" id="{63F63EBA-1769-C297-231A-FC16492186EB}"/>
+              </a:ext>
+            </a:extLst>
+          </p:cNvPr>
+          <p:cNvSpPr txBox="1"/>
+          <p:nvPr/>
+        </p:nvSpPr>
+        <p:spPr>
+          <a:xfrm>
+            <a:off x="586720" y="2481606"/>
+            <a:ext cx="3632855" cy="1477328"/>
+          </a:xfrm>
+          <a:prstGeom prst="rect">
+            <a:avLst/>
+          </a:prstGeom>
+          <a:noFill/>
+        </p:spPr>
+        <p:txBody>
+          <a:bodyPr wrap="square" rtlCol="0">
+            <a:spAutoFit/>
+          </a:bodyPr>
+          <a:lstStyle/>
+          <a:p>
+            <a:r>
+              <a:rPr lang="en-US" dirty="0"/>
+              <a:t>Infrastructure Markov Projection Numbers</a:t>
+            </a:r>
+          </a:p>
+          <a:p>
+            <a:endParaRPr lang="en-US" dirty="0"/>
+          </a:p>
+          <a:p>
+            <a:r>
+              <a:rPr lang="en-US" dirty="0"/>
+              <a:t>Full tables can be found in the accompanying notebook</a:t>
+            </a:r>
+          </a:p>
+        </p:txBody>
+      </p:sp>
+      <p:sp>
+        <p:nvSpPr>
+          <p:cNvPr id="4" name="Rectangle 3">
+            <a:extLst>
+              <a:ext uri="{FF2B5EF4-FFF2-40B4-BE49-F238E27FC236}">
+                <a16:creationId xmlns:a16="http://schemas.microsoft.com/office/drawing/2014/main" id="{C1BB0765-1462-CAB4-D9F5-F58F3E90CF97}"/>
+              </a:ext>
+            </a:extLst>
+          </p:cNvPr>
+          <p:cNvSpPr/>
+          <p:nvPr/>
+        </p:nvSpPr>
+        <p:spPr>
+          <a:xfrm>
+            <a:off x="3886200" y="2257425"/>
+            <a:ext cx="8029575" cy="152400"/>
+          </a:xfrm>
+          <a:prstGeom prst="rect">
+            <a:avLst/>
+          </a:prstGeom>
+          <a:solidFill>
+            <a:srgbClr val="92D050">
+              <a:alpha val="50000"/>
+            </a:srgbClr>
+          </a:solidFill>
+          <a:ln>
+            <a:noFill/>
+          </a:ln>
+        </p:spPr>
+        <p:style>
+          <a:lnRef idx="2">
+            <a:schemeClr val="accent1">
+              <a:shade val="15000"/>
+            </a:schemeClr>
+          </a:lnRef>
+          <a:fillRef idx="1">
+            <a:schemeClr val="accent1"/>
+          </a:fillRef>
+          <a:effectRef idx="0">
+            <a:schemeClr val="accent1"/>
+          </a:effectRef>
+          <a:fontRef idx="minor">
+            <a:schemeClr val="lt1"/>
+          </a:fontRef>
+        </p:style>
+        <p:txBody>
+          <a:bodyPr rtlCol="0" anchor="ctr"/>
+          <a:lstStyle/>
+          <a:p>
+            <a:pPr algn="ctr"/>
+            <a:endParaRPr lang="en-US"/>
+          </a:p>
+        </p:txBody>
+      </p:sp>
+      <p:sp>
+        <p:nvSpPr>
+          <p:cNvPr id="5" name="Rectangle 4">
+            <a:extLst>
+              <a:ext uri="{FF2B5EF4-FFF2-40B4-BE49-F238E27FC236}">
+                <a16:creationId xmlns:a16="http://schemas.microsoft.com/office/drawing/2014/main" id="{6F6E9A91-FE45-4E3C-994A-67D4870D96EB}"/>
+              </a:ext>
+            </a:extLst>
+          </p:cNvPr>
+          <p:cNvSpPr/>
+          <p:nvPr/>
+        </p:nvSpPr>
+        <p:spPr>
+          <a:xfrm>
+            <a:off x="3895725" y="3238500"/>
+            <a:ext cx="8029575" cy="152400"/>
+          </a:xfrm>
+          <a:prstGeom prst="rect">
+            <a:avLst/>
+          </a:prstGeom>
+          <a:solidFill>
+            <a:srgbClr val="92D050">
+              <a:alpha val="50000"/>
+            </a:srgbClr>
+          </a:solidFill>
+          <a:ln>
+            <a:noFill/>
+          </a:ln>
+        </p:spPr>
+        <p:style>
+          <a:lnRef idx="2">
+            <a:schemeClr val="accent1">
+              <a:shade val="15000"/>
+            </a:schemeClr>
+          </a:lnRef>
+          <a:fillRef idx="1">
+            <a:schemeClr val="accent1"/>
+          </a:fillRef>
+          <a:effectRef idx="0">
+            <a:schemeClr val="accent1"/>
+          </a:effectRef>
+          <a:fontRef idx="minor">
+            <a:schemeClr val="lt1"/>
+          </a:fontRef>
+        </p:style>
+        <p:txBody>
+          <a:bodyPr rtlCol="0" anchor="ctr"/>
+          <a:lstStyle/>
+          <a:p>
+            <a:pPr algn="ctr"/>
+            <a:endParaRPr lang="en-US"/>
+          </a:p>
+        </p:txBody>
+      </p:sp>
+      <p:sp>
+        <p:nvSpPr>
+          <p:cNvPr id="6" name="Rectangle 5">
+            <a:extLst>
+              <a:ext uri="{FF2B5EF4-FFF2-40B4-BE49-F238E27FC236}">
+                <a16:creationId xmlns:a16="http://schemas.microsoft.com/office/drawing/2014/main" id="{12903F4D-CFB3-F5F8-75F7-4E7BB1B897A7}"/>
+              </a:ext>
+            </a:extLst>
+          </p:cNvPr>
+          <p:cNvSpPr/>
+          <p:nvPr/>
+        </p:nvSpPr>
+        <p:spPr>
+          <a:xfrm>
+            <a:off x="3895725" y="3390900"/>
+            <a:ext cx="8029575" cy="152400"/>
+          </a:xfrm>
+          <a:prstGeom prst="rect">
+            <a:avLst/>
+          </a:prstGeom>
+          <a:solidFill>
+            <a:srgbClr val="92D050">
+              <a:alpha val="50000"/>
+            </a:srgbClr>
+          </a:solidFill>
+          <a:ln>
+            <a:noFill/>
+          </a:ln>
+        </p:spPr>
+        <p:style>
+          <a:lnRef idx="2">
+            <a:schemeClr val="accent1">
+              <a:shade val="15000"/>
+            </a:schemeClr>
+          </a:lnRef>
+          <a:fillRef idx="1">
+            <a:schemeClr val="accent1"/>
+          </a:fillRef>
+          <a:effectRef idx="0">
+            <a:schemeClr val="accent1"/>
+          </a:effectRef>
+          <a:fontRef idx="minor">
+            <a:schemeClr val="lt1"/>
+          </a:fontRef>
+        </p:style>
+        <p:txBody>
+          <a:bodyPr rtlCol="0" anchor="ctr"/>
+          <a:lstStyle/>
+          <a:p>
+            <a:pPr algn="ctr"/>
+            <a:endParaRPr lang="en-US"/>
+          </a:p>
+        </p:txBody>
+      </p:sp>
+    </p:spTree>
+    <p:extLst>
+      <p:ext uri="{BB962C8B-B14F-4D97-AF65-F5344CB8AC3E}">
+        <p14:creationId xmlns:p14="http://schemas.microsoft.com/office/powerpoint/2010/main" val="2130951316"/>
+      </p:ext>
+    </p:extLst>
+  </p:cSld>
+  <p:clrMapOvr>
+    <a:masterClrMapping/>
+  </p:clrMapOvr>
+</p:sld>
+</file>
+
+<file path=ppt/slides/slide7.xml><?xml version="1.0" encoding="utf-8"?>
+<p:sld xmlns:a="http://schemas.openxmlformats.org/drawingml/2006/main" xmlns:r="http://schemas.openxmlformats.org/officeDocument/2006/relationships" xmlns:p="http://schemas.openxmlformats.org/presentationml/2006/main">
+  <p:cSld>
+    <p:spTree>
+      <p:nvGrpSpPr>
+        <p:cNvPr id="1" name=""/>
+        <p:cNvGrpSpPr/>
+        <p:nvPr/>
+      </p:nvGrpSpPr>
+      <p:grpSpPr>
+        <a:xfrm>
+          <a:off x="0" y="0"/>
+          <a:ext cx="0" cy="0"/>
+          <a:chOff x="0" y="0"/>
+          <a:chExt cx="0" cy="0"/>
+        </a:xfrm>
+      </p:grpSpPr>
+      <p:sp>
+        <p:nvSpPr>
+          <p:cNvPr id="2" name="Title 1">
+            <a:extLst>
+              <a:ext uri="{FF2B5EF4-FFF2-40B4-BE49-F238E27FC236}">
+                <a16:creationId xmlns:a16="http://schemas.microsoft.com/office/drawing/2014/main" id="{111F6826-3B8C-A91B-E256-36B6FCD96B29}"/>
+              </a:ext>
+            </a:extLst>
+          </p:cNvPr>
+          <p:cNvSpPr>
+            <a:spLocks noGrp="1"/>
+          </p:cNvSpPr>
+          <p:nvPr>
+            <p:ph type="title"/>
+          </p:nvPr>
+        </p:nvSpPr>
+        <p:spPr/>
+        <p:txBody>
+          <a:bodyPr/>
+          <a:lstStyle/>
+          <a:p>
+            <a:r>
+              <a:rPr lang="en-US" dirty="0"/>
+              <a:t>Results (2) - Oblasts</a:t>
+            </a:r>
+          </a:p>
+        </p:txBody>
+      </p:sp>
+      <p:graphicFrame>
+        <p:nvGraphicFramePr>
+          <p:cNvPr id="8" name="Chart 7">
+            <a:extLst>
+              <a:ext uri="{FF2B5EF4-FFF2-40B4-BE49-F238E27FC236}">
+                <a16:creationId xmlns:a16="http://schemas.microsoft.com/office/drawing/2014/main" id="{BABE3E7F-A5B9-196D-2B51-2EBCCF3C2A95}"/>
+              </a:ext>
+            </a:extLst>
+          </p:cNvPr>
+          <p:cNvGraphicFramePr>
+            <a:graphicFrameLocks/>
+          </p:cNvGraphicFramePr>
+          <p:nvPr>
+            <p:extLst>
+              <p:ext uri="{D42A27DB-BD31-4B8C-83A1-F6EECF244321}">
+                <p14:modId xmlns:p14="http://schemas.microsoft.com/office/powerpoint/2010/main" val="701245043"/>
+              </p:ext>
+            </p:extLst>
+          </p:nvPr>
+        </p:nvGraphicFramePr>
+        <p:xfrm>
+          <a:off x="201168" y="1499616"/>
+          <a:ext cx="5797296" cy="4910328"/>
+        </p:xfrm>
+        <a:graphic>
+          <a:graphicData uri="http://schemas.openxmlformats.org/drawingml/2006/chart">
+            <c:chart xmlns:c="http://schemas.openxmlformats.org/drawingml/2006/chart" xmlns:r="http://schemas.openxmlformats.org/officeDocument/2006/relationships" r:id="rId2"/>
+          </a:graphicData>
+        </a:graphic>
+      </p:graphicFrame>
+      <p:graphicFrame>
+        <p:nvGraphicFramePr>
+          <p:cNvPr id="9" name="Chart 8">
+            <a:extLst>
+              <a:ext uri="{FF2B5EF4-FFF2-40B4-BE49-F238E27FC236}">
+                <a16:creationId xmlns:a16="http://schemas.microsoft.com/office/drawing/2014/main" id="{2B9AE74C-849B-00FF-50DA-C416037FEEB6}"/>
+              </a:ext>
+            </a:extLst>
+          </p:cNvPr>
+          <p:cNvGraphicFramePr>
+            <a:graphicFrameLocks/>
+          </p:cNvGraphicFramePr>
+          <p:nvPr>
+            <p:extLst>
+              <p:ext uri="{D42A27DB-BD31-4B8C-83A1-F6EECF244321}">
+                <p14:modId xmlns:p14="http://schemas.microsoft.com/office/powerpoint/2010/main" val="1449836172"/>
+              </p:ext>
+            </p:extLst>
+          </p:nvPr>
+        </p:nvGraphicFramePr>
+        <p:xfrm>
+          <a:off x="6099048" y="1499616"/>
+          <a:ext cx="5797296" cy="4910328"/>
+        </p:xfrm>
+        <a:graphic>
+          <a:graphicData uri="http://schemas.openxmlformats.org/drawingml/2006/chart">
+            <c:chart xmlns:c="http://schemas.openxmlformats.org/drawingml/2006/chart" xmlns:r="http://schemas.openxmlformats.org/officeDocument/2006/relationships" r:id="rId3"/>
+          </a:graphicData>
+        </a:graphic>
+      </p:graphicFrame>
+      <p:sp>
+        <p:nvSpPr>
+          <p:cNvPr id="10" name="TextBox 9">
+            <a:extLst>
+              <a:ext uri="{FF2B5EF4-FFF2-40B4-BE49-F238E27FC236}">
+                <a16:creationId xmlns:a16="http://schemas.microsoft.com/office/drawing/2014/main" id="{44D546FA-8662-5310-CAAB-D9D2C8F9886E}"/>
+              </a:ext>
+            </a:extLst>
+          </p:cNvPr>
+          <p:cNvSpPr txBox="1"/>
+          <p:nvPr/>
+        </p:nvSpPr>
+        <p:spPr>
+          <a:xfrm>
+            <a:off x="2999346" y="3429000"/>
+            <a:ext cx="2609621" cy="307777"/>
+          </a:xfrm>
+          <a:prstGeom prst="rect">
+            <a:avLst/>
+          </a:prstGeom>
+          <a:noFill/>
+        </p:spPr>
+        <p:txBody>
+          <a:bodyPr wrap="square" rtlCol="0">
+            <a:spAutoFit/>
+          </a:bodyPr>
+          <a:lstStyle/>
+          <a:p>
+            <a:pPr algn="ctr"/>
+            <a:r>
+              <a:rPr lang="en-US" sz="1400" dirty="0"/>
+              <a:t>Strikes in Dnipopetrovska: 0.1670</a:t>
+            </a:r>
+          </a:p>
+        </p:txBody>
+      </p:sp>
+      <p:sp>
+        <p:nvSpPr>
+          <p:cNvPr id="11" name="TextBox 10">
+            <a:extLst>
+              <a:ext uri="{FF2B5EF4-FFF2-40B4-BE49-F238E27FC236}">
+                <a16:creationId xmlns:a16="http://schemas.microsoft.com/office/drawing/2014/main" id="{FFEB892C-4930-0684-17F3-FD76E1A8E117}"/>
+              </a:ext>
+            </a:extLst>
+          </p:cNvPr>
+          <p:cNvSpPr txBox="1"/>
+          <p:nvPr/>
+        </p:nvSpPr>
+        <p:spPr>
+          <a:xfrm>
+            <a:off x="1601228" y="2389469"/>
+            <a:ext cx="2609621" cy="307777"/>
+          </a:xfrm>
+          <a:prstGeom prst="rect">
+            <a:avLst/>
+          </a:prstGeom>
+          <a:noFill/>
+        </p:spPr>
+        <p:txBody>
+          <a:bodyPr wrap="square" rtlCol="0">
+            <a:spAutoFit/>
+          </a:bodyPr>
+          <a:lstStyle/>
+          <a:p>
+            <a:pPr algn="ctr"/>
+            <a:r>
+              <a:rPr lang="en-US" sz="1400" dirty="0"/>
+              <a:t>Strikes in Donetska: 0.2512</a:t>
+            </a:r>
+          </a:p>
+        </p:txBody>
+      </p:sp>
+      <p:sp>
+        <p:nvSpPr>
+          <p:cNvPr id="12" name="TextBox 11">
+            <a:extLst>
+              <a:ext uri="{FF2B5EF4-FFF2-40B4-BE49-F238E27FC236}">
+                <a16:creationId xmlns:a16="http://schemas.microsoft.com/office/drawing/2014/main" id="{6F78C53A-C933-1B50-8094-5B44E5B9B9BF}"/>
+              </a:ext>
+            </a:extLst>
+          </p:cNvPr>
+          <p:cNvSpPr txBox="1"/>
+          <p:nvPr/>
+        </p:nvSpPr>
+        <p:spPr>
+          <a:xfrm>
+            <a:off x="685800" y="3360905"/>
+            <a:ext cx="1924050" cy="523220"/>
+          </a:xfrm>
+          <a:prstGeom prst="rect">
+            <a:avLst/>
+          </a:prstGeom>
+          <a:noFill/>
+        </p:spPr>
+        <p:txBody>
+          <a:bodyPr wrap="square" rtlCol="0">
+            <a:spAutoFit/>
+          </a:bodyPr>
+          <a:lstStyle/>
+          <a:p>
+            <a:pPr algn="ctr"/>
+            <a:r>
+              <a:rPr lang="en-US" sz="1400" dirty="0"/>
+              <a:t>Strikes in Kharkivska: 0.1398</a:t>
+            </a:r>
+          </a:p>
+        </p:txBody>
+      </p:sp>
+      <p:sp>
+        <p:nvSpPr>
+          <p:cNvPr id="13" name="TextBox 12">
+            <a:extLst>
+              <a:ext uri="{FF2B5EF4-FFF2-40B4-BE49-F238E27FC236}">
+                <a16:creationId xmlns:a16="http://schemas.microsoft.com/office/drawing/2014/main" id="{98833B4B-961A-7381-4422-560B74485C58}"/>
+              </a:ext>
+            </a:extLst>
+          </p:cNvPr>
+          <p:cNvSpPr txBox="1"/>
+          <p:nvPr/>
+        </p:nvSpPr>
+        <p:spPr>
+          <a:xfrm>
+            <a:off x="8942946" y="3429000"/>
+            <a:ext cx="2706129" cy="307777"/>
+          </a:xfrm>
+          <a:prstGeom prst="rect">
+            <a:avLst/>
+          </a:prstGeom>
+          <a:noFill/>
+        </p:spPr>
+        <p:txBody>
+          <a:bodyPr wrap="square" rtlCol="0">
+            <a:spAutoFit/>
+          </a:bodyPr>
+          <a:lstStyle/>
+          <a:p>
+            <a:pPr algn="ctr"/>
+            <a:r>
+              <a:rPr lang="en-US" sz="1400" dirty="0"/>
+              <a:t>Strikes in Dnipopetrovska : 0.1670</a:t>
+            </a:r>
+          </a:p>
+        </p:txBody>
+      </p:sp>
+      <p:sp>
+        <p:nvSpPr>
+          <p:cNvPr id="14" name="TextBox 13">
+            <a:extLst>
+              <a:ext uri="{FF2B5EF4-FFF2-40B4-BE49-F238E27FC236}">
+                <a16:creationId xmlns:a16="http://schemas.microsoft.com/office/drawing/2014/main" id="{E26642C3-D369-5C7A-8278-0372DAB1B084}"/>
+              </a:ext>
+            </a:extLst>
+          </p:cNvPr>
+          <p:cNvSpPr txBox="1"/>
+          <p:nvPr/>
+        </p:nvSpPr>
+        <p:spPr>
+          <a:xfrm>
+            <a:off x="7468628" y="2379944"/>
+            <a:ext cx="2609621" cy="307777"/>
+          </a:xfrm>
+          <a:prstGeom prst="rect">
+            <a:avLst/>
+          </a:prstGeom>
+          <a:noFill/>
+        </p:spPr>
+        <p:txBody>
+          <a:bodyPr wrap="square" rtlCol="0">
+            <a:spAutoFit/>
+          </a:bodyPr>
+          <a:lstStyle/>
+          <a:p>
+            <a:pPr algn="ctr"/>
+            <a:r>
+              <a:rPr lang="en-US" sz="1400" dirty="0"/>
+              <a:t>Strikes in Donetska : 0.2512</a:t>
+            </a:r>
+          </a:p>
+        </p:txBody>
+      </p:sp>
+      <p:sp>
+        <p:nvSpPr>
+          <p:cNvPr id="15" name="TextBox 14">
+            <a:extLst>
+              <a:ext uri="{FF2B5EF4-FFF2-40B4-BE49-F238E27FC236}">
+                <a16:creationId xmlns:a16="http://schemas.microsoft.com/office/drawing/2014/main" id="{20802C12-ADC0-5A9F-F34D-ABA88ACE921B}"/>
+              </a:ext>
+            </a:extLst>
+          </p:cNvPr>
+          <p:cNvSpPr txBox="1"/>
+          <p:nvPr/>
+        </p:nvSpPr>
+        <p:spPr>
+          <a:xfrm>
+            <a:off x="6629400" y="3360905"/>
+            <a:ext cx="1924050" cy="523220"/>
+          </a:xfrm>
+          <a:prstGeom prst="rect">
+            <a:avLst/>
+          </a:prstGeom>
+          <a:noFill/>
+        </p:spPr>
+        <p:txBody>
+          <a:bodyPr wrap="square" rtlCol="0">
+            <a:spAutoFit/>
+          </a:bodyPr>
+          <a:lstStyle/>
+          <a:p>
+            <a:pPr algn="ctr"/>
+            <a:r>
+              <a:rPr lang="en-US" sz="1400" dirty="0"/>
+              <a:t>Strikes in Kharkivska : 0.1398</a:t>
+            </a:r>
+          </a:p>
+        </p:txBody>
+      </p:sp>
+    </p:spTree>
+    <p:extLst>
+      <p:ext uri="{BB962C8B-B14F-4D97-AF65-F5344CB8AC3E}">
+        <p14:creationId xmlns:p14="http://schemas.microsoft.com/office/powerpoint/2010/main" val="378392346"/>
+      </p:ext>
+    </p:extLst>
+  </p:cSld>
+  <p:clrMapOvr>
+    <a:masterClrMapping/>
+  </p:clrMapOvr>
+</p:sld>
+</file>
+
+<file path=ppt/slides/slide8.xml><?xml version="1.0" encoding="utf-8"?>
+<p:sld xmlns:a="http://schemas.openxmlformats.org/drawingml/2006/main" xmlns:r="http://schemas.openxmlformats.org/officeDocument/2006/relationships" xmlns:p="http://schemas.openxmlformats.org/presentationml/2006/main">
+  <p:cSld>
+    <p:spTree>
+      <p:nvGrpSpPr>
+        <p:cNvPr id="1" name="">
+          <a:extLst>
+            <a:ext uri="{FF2B5EF4-FFF2-40B4-BE49-F238E27FC236}">
               <a16:creationId xmlns:a16="http://schemas.microsoft.com/office/drawing/2014/main" id="{B7900459-5ED7-B99A-0340-CA6C04C100A6}"/>
             </a:ext>
           </a:extLst>
@@ -13765,14 +15386,14 @@
           <p:nvPr>
             <p:extLst>
               <p:ext uri="{D42A27DB-BD31-4B8C-83A1-F6EECF244321}">
-                <p14:modId xmlns:p14="http://schemas.microsoft.com/office/powerpoint/2010/main" val="688001188"/>
+                <p14:modId xmlns:p14="http://schemas.microsoft.com/office/powerpoint/2010/main" val="3899568575"/>
               </p:ext>
             </p:extLst>
           </p:nvPr>
         </p:nvGraphicFramePr>
         <p:xfrm>
-          <a:off x="504963" y="1690688"/>
-          <a:ext cx="4660926" cy="4514850"/>
+          <a:off x="197961" y="1499616"/>
+          <a:ext cx="5806440" cy="4910328"/>
         </p:xfrm>
         <a:graphic>
           <a:graphicData uri="http://schemas.openxmlformats.org/drawingml/2006/chart">
@@ -13795,14 +15416,14 @@
           <p:nvPr>
             <p:extLst>
               <p:ext uri="{D42A27DB-BD31-4B8C-83A1-F6EECF244321}">
-                <p14:modId xmlns:p14="http://schemas.microsoft.com/office/powerpoint/2010/main" val="1538997175"/>
+                <p14:modId xmlns:p14="http://schemas.microsoft.com/office/powerpoint/2010/main" val="464268234"/>
               </p:ext>
             </p:extLst>
           </p:nvPr>
         </p:nvGraphicFramePr>
         <p:xfrm>
-          <a:off x="5552388" y="1828800"/>
-          <a:ext cx="5801412" cy="4103016"/>
+          <a:off x="6096000" y="1498862"/>
+          <a:ext cx="5801412" cy="4910776"/>
         </p:xfrm>
         <a:graphic>
           <a:graphicData uri="http://schemas.openxmlformats.org/drawingml/2006/chart">
@@ -13810,6 +15431,222 @@
           </a:graphicData>
         </a:graphic>
       </p:graphicFrame>
+      <p:sp>
+        <p:nvSpPr>
+          <p:cNvPr id="5" name="TextBox 4">
+            <a:extLst>
+              <a:ext uri="{FF2B5EF4-FFF2-40B4-BE49-F238E27FC236}">
+                <a16:creationId xmlns:a16="http://schemas.microsoft.com/office/drawing/2014/main" id="{25C146BB-40F2-E156-AA87-0F342957C27C}"/>
+              </a:ext>
+            </a:extLst>
+          </p:cNvPr>
+          <p:cNvSpPr txBox="1"/>
+          <p:nvPr/>
+        </p:nvSpPr>
+        <p:spPr>
+          <a:xfrm>
+            <a:off x="935162" y="4397121"/>
+            <a:ext cx="1924050" cy="523220"/>
+          </a:xfrm>
+          <a:prstGeom prst="rect">
+            <a:avLst/>
+          </a:prstGeom>
+          <a:noFill/>
+        </p:spPr>
+        <p:txBody>
+          <a:bodyPr wrap="square" rtlCol="0">
+            <a:spAutoFit/>
+          </a:bodyPr>
+          <a:lstStyle/>
+          <a:p>
+            <a:pPr algn="ctr"/>
+            <a:r>
+              <a:rPr lang="en-US" sz="1400" dirty="0"/>
+              <a:t>Strikes in Kramatorskyi : 0.0937</a:t>
+            </a:r>
+          </a:p>
+        </p:txBody>
+      </p:sp>
+      <p:sp>
+        <p:nvSpPr>
+          <p:cNvPr id="6" name="TextBox 5">
+            <a:extLst>
+              <a:ext uri="{FF2B5EF4-FFF2-40B4-BE49-F238E27FC236}">
+                <a16:creationId xmlns:a16="http://schemas.microsoft.com/office/drawing/2014/main" id="{43BA2FE3-AC0E-FFD1-80BF-14EB27E9ACA2}"/>
+              </a:ext>
+            </a:extLst>
+          </p:cNvPr>
+          <p:cNvSpPr txBox="1"/>
+          <p:nvPr/>
+        </p:nvSpPr>
+        <p:spPr>
+          <a:xfrm>
+            <a:off x="2239972" y="4941714"/>
+            <a:ext cx="2609621" cy="307777"/>
+          </a:xfrm>
+          <a:prstGeom prst="rect">
+            <a:avLst/>
+          </a:prstGeom>
+          <a:noFill/>
+        </p:spPr>
+        <p:txBody>
+          <a:bodyPr wrap="square" rtlCol="0">
+            <a:spAutoFit/>
+          </a:bodyPr>
+          <a:lstStyle/>
+          <a:p>
+            <a:pPr algn="ctr"/>
+            <a:r>
+              <a:rPr lang="en-US" sz="1400" dirty="0"/>
+              <a:t>Strikes in Nikopolskyi : 0.1020</a:t>
+            </a:r>
+          </a:p>
+        </p:txBody>
+      </p:sp>
+      <p:sp>
+        <p:nvSpPr>
+          <p:cNvPr id="7" name="TextBox 6">
+            <a:extLst>
+              <a:ext uri="{FF2B5EF4-FFF2-40B4-BE49-F238E27FC236}">
+                <a16:creationId xmlns:a16="http://schemas.microsoft.com/office/drawing/2014/main" id="{2D4E6FEB-1878-0CC5-FA8D-DCA96490DE0B}"/>
+              </a:ext>
+            </a:extLst>
+          </p:cNvPr>
+          <p:cNvSpPr txBox="1"/>
+          <p:nvPr/>
+        </p:nvSpPr>
+        <p:spPr>
+          <a:xfrm>
+            <a:off x="743863" y="2505326"/>
+            <a:ext cx="1924050" cy="523220"/>
+          </a:xfrm>
+          <a:prstGeom prst="rect">
+            <a:avLst/>
+          </a:prstGeom>
+          <a:noFill/>
+        </p:spPr>
+        <p:txBody>
+          <a:bodyPr wrap="square" rtlCol="0">
+            <a:spAutoFit/>
+          </a:bodyPr>
+          <a:lstStyle/>
+          <a:p>
+            <a:pPr algn="ctr"/>
+            <a:r>
+              <a:rPr lang="en-US" sz="1400" dirty="0"/>
+              <a:t>Strikes in “Missing”: 0.3593</a:t>
+            </a:r>
+          </a:p>
+        </p:txBody>
+      </p:sp>
+      <p:sp>
+        <p:nvSpPr>
+          <p:cNvPr id="10" name="TextBox 9">
+            <a:extLst>
+              <a:ext uri="{FF2B5EF4-FFF2-40B4-BE49-F238E27FC236}">
+                <a16:creationId xmlns:a16="http://schemas.microsoft.com/office/drawing/2014/main" id="{8EAEE1C0-7481-FB6F-D6FA-9F6DFB720A2A}"/>
+              </a:ext>
+            </a:extLst>
+          </p:cNvPr>
+          <p:cNvSpPr txBox="1"/>
+          <p:nvPr/>
+        </p:nvSpPr>
+        <p:spPr>
+          <a:xfrm>
+            <a:off x="8229714" y="4941714"/>
+            <a:ext cx="2609621" cy="307777"/>
+          </a:xfrm>
+          <a:prstGeom prst="rect">
+            <a:avLst/>
+          </a:prstGeom>
+          <a:noFill/>
+        </p:spPr>
+        <p:txBody>
+          <a:bodyPr wrap="square" rtlCol="0">
+            <a:spAutoFit/>
+          </a:bodyPr>
+          <a:lstStyle/>
+          <a:p>
+            <a:pPr algn="ctr"/>
+            <a:r>
+              <a:rPr lang="en-US" sz="1400" dirty="0"/>
+              <a:t>Strikes in Nikopolskyi: 0.1020</a:t>
+            </a:r>
+          </a:p>
+        </p:txBody>
+      </p:sp>
+      <p:sp>
+        <p:nvSpPr>
+          <p:cNvPr id="11" name="TextBox 10">
+            <a:extLst>
+              <a:ext uri="{FF2B5EF4-FFF2-40B4-BE49-F238E27FC236}">
+                <a16:creationId xmlns:a16="http://schemas.microsoft.com/office/drawing/2014/main" id="{68632DA8-C5FC-8674-DA18-8421913A523B}"/>
+              </a:ext>
+            </a:extLst>
+          </p:cNvPr>
+          <p:cNvSpPr txBox="1"/>
+          <p:nvPr/>
+        </p:nvSpPr>
+        <p:spPr>
+          <a:xfrm>
+            <a:off x="6611379" y="2496633"/>
+            <a:ext cx="2018272" cy="523220"/>
+          </a:xfrm>
+          <a:prstGeom prst="rect">
+            <a:avLst/>
+          </a:prstGeom>
+          <a:noFill/>
+        </p:spPr>
+        <p:txBody>
+          <a:bodyPr wrap="square" rtlCol="0">
+            <a:spAutoFit/>
+          </a:bodyPr>
+          <a:lstStyle/>
+          <a:p>
+            <a:pPr algn="ctr"/>
+            <a:r>
+              <a:rPr lang="en-US" sz="1400" dirty="0"/>
+              <a:t>Strikes in “Missing”: 0.3593</a:t>
+            </a:r>
+          </a:p>
+        </p:txBody>
+      </p:sp>
+      <p:sp>
+        <p:nvSpPr>
+          <p:cNvPr id="12" name="TextBox 11">
+            <a:extLst>
+              <a:ext uri="{FF2B5EF4-FFF2-40B4-BE49-F238E27FC236}">
+                <a16:creationId xmlns:a16="http://schemas.microsoft.com/office/drawing/2014/main" id="{5D11DE98-E20B-041C-EB6F-D684EBE844DC}"/>
+              </a:ext>
+            </a:extLst>
+          </p:cNvPr>
+          <p:cNvSpPr txBox="1"/>
+          <p:nvPr/>
+        </p:nvSpPr>
+        <p:spPr>
+          <a:xfrm>
+            <a:off x="6836852" y="4397121"/>
+            <a:ext cx="1933575" cy="523220"/>
+          </a:xfrm>
+          <a:prstGeom prst="rect">
+            <a:avLst/>
+          </a:prstGeom>
+          <a:noFill/>
+        </p:spPr>
+        <p:txBody>
+          <a:bodyPr wrap="square" rtlCol="0">
+            <a:spAutoFit/>
+          </a:bodyPr>
+          <a:lstStyle/>
+          <a:p>
+            <a:pPr algn="ctr"/>
+            <a:r>
+              <a:rPr lang="en-US" sz="1400" dirty="0"/>
+              <a:t>Strikes in Kramatorskyi: 0.0937</a:t>
+            </a:r>
+          </a:p>
+        </p:txBody>
+      </p:sp>
     </p:spTree>
     <p:extLst>
       <p:ext uri="{BB962C8B-B14F-4D97-AF65-F5344CB8AC3E}">
@@ -13823,7 +15660,7 @@
 </p:sld>
 </file>
 
-<file path=ppt/slides/slide11.xml><?xml version="1.0" encoding="utf-8"?>
+<file path=ppt/slides/slide9.xml><?xml version="1.0" encoding="utf-8"?>
 <p:sld xmlns:a="http://schemas.openxmlformats.org/drawingml/2006/main" xmlns:r="http://schemas.openxmlformats.org/officeDocument/2006/relationships" xmlns:p="http://schemas.openxmlformats.org/presentationml/2006/main">
   <p:cSld>
     <p:spTree>
@@ -14152,2329 +15989,6 @@
     <p:extLst>
       <p:ext uri="{BB962C8B-B14F-4D97-AF65-F5344CB8AC3E}">
         <p14:creationId xmlns:p14="http://schemas.microsoft.com/office/powerpoint/2010/main" val="1650526401"/>
-      </p:ext>
-    </p:extLst>
-  </p:cSld>
-  <p:clrMapOvr>
-    <a:masterClrMapping/>
-  </p:clrMapOvr>
-</p:sld>
-</file>
-
-<file path=ppt/slides/slide12.xml><?xml version="1.0" encoding="utf-8"?>
-<p:sld xmlns:a="http://schemas.openxmlformats.org/drawingml/2006/main" xmlns:r="http://schemas.openxmlformats.org/officeDocument/2006/relationships" xmlns:p="http://schemas.openxmlformats.org/presentationml/2006/main">
-  <p:cSld>
-    <p:spTree>
-      <p:nvGrpSpPr>
-        <p:cNvPr id="1" name="">
-          <a:extLst>
-            <a:ext uri="{FF2B5EF4-FFF2-40B4-BE49-F238E27FC236}">
-              <a16:creationId xmlns:a16="http://schemas.microsoft.com/office/drawing/2014/main" id="{421B640E-8E8B-43F5-F171-A6C95073B358}"/>
-            </a:ext>
-          </a:extLst>
-        </p:cNvPr>
-        <p:cNvGrpSpPr/>
-        <p:nvPr/>
-      </p:nvGrpSpPr>
-      <p:grpSpPr>
-        <a:xfrm>
-          <a:off x="0" y="0"/>
-          <a:ext cx="0" cy="0"/>
-          <a:chOff x="0" y="0"/>
-          <a:chExt cx="0" cy="0"/>
-        </a:xfrm>
-      </p:grpSpPr>
-      <p:sp>
-        <p:nvSpPr>
-          <p:cNvPr id="2" name="Title 1">
-            <a:extLst>
-              <a:ext uri="{FF2B5EF4-FFF2-40B4-BE49-F238E27FC236}">
-                <a16:creationId xmlns:a16="http://schemas.microsoft.com/office/drawing/2014/main" id="{979210AF-CA57-E2A9-2193-97FF0F1514DA}"/>
-              </a:ext>
-            </a:extLst>
-          </p:cNvPr>
-          <p:cNvSpPr>
-            <a:spLocks noGrp="1"/>
-          </p:cNvSpPr>
-          <p:nvPr>
-            <p:ph type="title"/>
-          </p:nvPr>
-        </p:nvSpPr>
-        <p:spPr/>
-        <p:txBody>
-          <a:bodyPr/>
-          <a:lstStyle/>
-          <a:p>
-            <a:r>
-              <a:rPr lang="en-US" dirty="0"/>
-              <a:t>Results (5) – Infrastructure, Recoded</a:t>
-            </a:r>
-          </a:p>
-        </p:txBody>
-      </p:sp>
-      <p:graphicFrame>
-        <p:nvGraphicFramePr>
-          <p:cNvPr id="3" name="Chart 2">
-            <a:extLst>
-              <a:ext uri="{FF2B5EF4-FFF2-40B4-BE49-F238E27FC236}">
-                <a16:creationId xmlns:a16="http://schemas.microsoft.com/office/drawing/2014/main" id="{FDEF4C9D-22C3-4B3D-F90C-A1D2D78FBD2F}"/>
-              </a:ext>
-            </a:extLst>
-          </p:cNvPr>
-          <p:cNvGraphicFramePr>
-            <a:graphicFrameLocks/>
-          </p:cNvGraphicFramePr>
-          <p:nvPr>
-            <p:extLst>
-              <p:ext uri="{D42A27DB-BD31-4B8C-83A1-F6EECF244321}">
-                <p14:modId xmlns:p14="http://schemas.microsoft.com/office/powerpoint/2010/main" val="1994951120"/>
-              </p:ext>
-            </p:extLst>
-          </p:nvPr>
-        </p:nvGraphicFramePr>
-        <p:xfrm>
-          <a:off x="905256" y="1307592"/>
-          <a:ext cx="10277856" cy="5276088"/>
-        </p:xfrm>
-        <a:graphic>
-          <a:graphicData uri="http://schemas.openxmlformats.org/drawingml/2006/chart">
-            <c:chart xmlns:c="http://schemas.openxmlformats.org/drawingml/2006/chart" xmlns:r="http://schemas.openxmlformats.org/officeDocument/2006/relationships" r:id="rId2"/>
-          </a:graphicData>
-        </a:graphic>
-      </p:graphicFrame>
-      <p:cxnSp>
-        <p:nvCxnSpPr>
-          <p:cNvPr id="5" name="Straight Connector 4">
-            <a:extLst>
-              <a:ext uri="{FF2B5EF4-FFF2-40B4-BE49-F238E27FC236}">
-                <a16:creationId xmlns:a16="http://schemas.microsoft.com/office/drawing/2014/main" id="{D1BACA1A-075F-A304-ECAE-DD84825181CE}"/>
-              </a:ext>
-            </a:extLst>
-          </p:cNvPr>
-          <p:cNvCxnSpPr>
-            <a:cxnSpLocks/>
-          </p:cNvCxnSpPr>
-          <p:nvPr/>
-        </p:nvCxnSpPr>
-        <p:spPr>
-          <a:xfrm flipV="1">
-            <a:off x="4166647" y="3512738"/>
-            <a:ext cx="512065" cy="1143606"/>
-          </a:xfrm>
-          <a:prstGeom prst="line">
-            <a:avLst/>
-          </a:prstGeom>
-          <a:ln w="12700">
-            <a:solidFill>
-              <a:schemeClr val="tx1"/>
-            </a:solidFill>
-          </a:ln>
-        </p:spPr>
-        <p:style>
-          <a:lnRef idx="1">
-            <a:schemeClr val="accent1"/>
-          </a:lnRef>
-          <a:fillRef idx="0">
-            <a:schemeClr val="accent1"/>
-          </a:fillRef>
-          <a:effectRef idx="0">
-            <a:schemeClr val="accent1"/>
-          </a:effectRef>
-          <a:fontRef idx="minor">
-            <a:schemeClr val="tx1"/>
-          </a:fontRef>
-        </p:style>
-      </p:cxnSp>
-      <p:cxnSp>
-        <p:nvCxnSpPr>
-          <p:cNvPr id="7" name="Straight Connector 6">
-            <a:extLst>
-              <a:ext uri="{FF2B5EF4-FFF2-40B4-BE49-F238E27FC236}">
-                <a16:creationId xmlns:a16="http://schemas.microsoft.com/office/drawing/2014/main" id="{95A97BB8-335D-D269-171B-C26666D1F3AC}"/>
-              </a:ext>
-            </a:extLst>
-          </p:cNvPr>
-          <p:cNvCxnSpPr>
-            <a:cxnSpLocks/>
-          </p:cNvCxnSpPr>
-          <p:nvPr/>
-        </p:nvCxnSpPr>
-        <p:spPr>
-          <a:xfrm flipV="1">
-            <a:off x="4119514" y="3812143"/>
-            <a:ext cx="1380224" cy="1155783"/>
-          </a:xfrm>
-          <a:prstGeom prst="line">
-            <a:avLst/>
-          </a:prstGeom>
-          <a:ln w="12700">
-            <a:solidFill>
-              <a:schemeClr val="tx1"/>
-            </a:solidFill>
-          </a:ln>
-        </p:spPr>
-        <p:style>
-          <a:lnRef idx="1">
-            <a:schemeClr val="accent1"/>
-          </a:lnRef>
-          <a:fillRef idx="0">
-            <a:schemeClr val="accent1"/>
-          </a:fillRef>
-          <a:effectRef idx="0">
-            <a:schemeClr val="accent1"/>
-          </a:effectRef>
-          <a:fontRef idx="minor">
-            <a:schemeClr val="tx1"/>
-          </a:fontRef>
-        </p:style>
-      </p:cxnSp>
-      <p:cxnSp>
-        <p:nvCxnSpPr>
-          <p:cNvPr id="9" name="Straight Connector 8">
-            <a:extLst>
-              <a:ext uri="{FF2B5EF4-FFF2-40B4-BE49-F238E27FC236}">
-                <a16:creationId xmlns:a16="http://schemas.microsoft.com/office/drawing/2014/main" id="{A4262014-84E7-F267-FE07-8B0DD3D31EF6}"/>
-              </a:ext>
-            </a:extLst>
-          </p:cNvPr>
-          <p:cNvCxnSpPr>
-            <a:cxnSpLocks/>
-          </p:cNvCxnSpPr>
-          <p:nvPr/>
-        </p:nvCxnSpPr>
-        <p:spPr>
-          <a:xfrm flipV="1">
-            <a:off x="4110087" y="4290919"/>
-            <a:ext cx="1838226" cy="798583"/>
-          </a:xfrm>
-          <a:prstGeom prst="line">
-            <a:avLst/>
-          </a:prstGeom>
-          <a:ln w="12700">
-            <a:solidFill>
-              <a:schemeClr val="tx1"/>
-            </a:solidFill>
-          </a:ln>
-        </p:spPr>
-        <p:style>
-          <a:lnRef idx="1">
-            <a:schemeClr val="accent1"/>
-          </a:lnRef>
-          <a:fillRef idx="0">
-            <a:schemeClr val="accent1"/>
-          </a:fillRef>
-          <a:effectRef idx="0">
-            <a:schemeClr val="accent1"/>
-          </a:effectRef>
-          <a:fontRef idx="minor">
-            <a:schemeClr val="tx1"/>
-          </a:fontRef>
-        </p:style>
-      </p:cxnSp>
-      <p:sp>
-        <p:nvSpPr>
-          <p:cNvPr id="14" name="TextBox 13">
-            <a:extLst>
-              <a:ext uri="{FF2B5EF4-FFF2-40B4-BE49-F238E27FC236}">
-                <a16:creationId xmlns:a16="http://schemas.microsoft.com/office/drawing/2014/main" id="{A6E14A3C-0B5B-0FB8-BB11-165D1D4DBD68}"/>
-              </a:ext>
-            </a:extLst>
-          </p:cNvPr>
-          <p:cNvSpPr txBox="1"/>
-          <p:nvPr/>
-        </p:nvSpPr>
-        <p:spPr>
-          <a:xfrm>
-            <a:off x="4295335" y="3036740"/>
-            <a:ext cx="2609621" cy="523220"/>
-          </a:xfrm>
-          <a:prstGeom prst="rect">
-            <a:avLst/>
-          </a:prstGeom>
-          <a:noFill/>
-        </p:spPr>
-        <p:txBody>
-          <a:bodyPr wrap="square" rtlCol="0">
-            <a:spAutoFit/>
-          </a:bodyPr>
-          <a:lstStyle/>
-          <a:p>
-            <a:pPr algn="ctr"/>
-            <a:r>
-              <a:rPr lang="en-US" sz="1400" dirty="0"/>
-              <a:t>After approx. 15 strikes, Civilian targets settle out to 0.3234</a:t>
-            </a:r>
-          </a:p>
-        </p:txBody>
-      </p:sp>
-      <p:sp>
-        <p:nvSpPr>
-          <p:cNvPr id="20" name="TextBox 19">
-            <a:extLst>
-              <a:ext uri="{FF2B5EF4-FFF2-40B4-BE49-F238E27FC236}">
-                <a16:creationId xmlns:a16="http://schemas.microsoft.com/office/drawing/2014/main" id="{ABA3E727-06D7-7764-F8D2-C9F35219F96C}"/>
-              </a:ext>
-            </a:extLst>
-          </p:cNvPr>
-          <p:cNvSpPr txBox="1"/>
-          <p:nvPr/>
-        </p:nvSpPr>
-        <p:spPr>
-          <a:xfrm>
-            <a:off x="4915715" y="3578421"/>
-            <a:ext cx="2934987" cy="307777"/>
-          </a:xfrm>
-          <a:prstGeom prst="rect">
-            <a:avLst/>
-          </a:prstGeom>
-          <a:noFill/>
-        </p:spPr>
-        <p:txBody>
-          <a:bodyPr wrap="square" rtlCol="0">
-            <a:spAutoFit/>
-          </a:bodyPr>
-          <a:lstStyle/>
-          <a:p>
-            <a:pPr algn="ctr"/>
-            <a:r>
-              <a:rPr lang="en-US" sz="1400" dirty="0"/>
-              <a:t>Business targets: 0.2427</a:t>
-            </a:r>
-          </a:p>
-        </p:txBody>
-      </p:sp>
-      <p:sp>
-        <p:nvSpPr>
-          <p:cNvPr id="23" name="TextBox 22">
-            <a:extLst>
-              <a:ext uri="{FF2B5EF4-FFF2-40B4-BE49-F238E27FC236}">
-                <a16:creationId xmlns:a16="http://schemas.microsoft.com/office/drawing/2014/main" id="{F3D2008E-3E91-11CF-5AF5-C785D29967BE}"/>
-              </a:ext>
-            </a:extLst>
-          </p:cNvPr>
-          <p:cNvSpPr txBox="1"/>
-          <p:nvPr/>
-        </p:nvSpPr>
-        <p:spPr>
-          <a:xfrm>
-            <a:off x="5593817" y="4035122"/>
-            <a:ext cx="2934987" cy="307777"/>
-          </a:xfrm>
-          <a:prstGeom prst="rect">
-            <a:avLst/>
-          </a:prstGeom>
-          <a:noFill/>
-        </p:spPr>
-        <p:txBody>
-          <a:bodyPr wrap="square" rtlCol="0">
-            <a:spAutoFit/>
-          </a:bodyPr>
-          <a:lstStyle/>
-          <a:p>
-            <a:pPr algn="ctr"/>
-            <a:r>
-              <a:rPr lang="en-US" sz="1400" dirty="0"/>
-              <a:t>Power &amp; Fuel targets: 0.2427</a:t>
-            </a:r>
-          </a:p>
-        </p:txBody>
-      </p:sp>
-    </p:spTree>
-    <p:extLst>
-      <p:ext uri="{BB962C8B-B14F-4D97-AF65-F5344CB8AC3E}">
-        <p14:creationId xmlns:p14="http://schemas.microsoft.com/office/powerpoint/2010/main" val="3990662772"/>
-      </p:ext>
-    </p:extLst>
-  </p:cSld>
-  <p:clrMapOvr>
-    <a:masterClrMapping/>
-  </p:clrMapOvr>
-</p:sld>
-</file>
-
-<file path=ppt/slides/slide13.xml><?xml version="1.0" encoding="utf-8"?>
-<p:sld xmlns:a="http://schemas.openxmlformats.org/drawingml/2006/main" xmlns:r="http://schemas.openxmlformats.org/officeDocument/2006/relationships" xmlns:p="http://schemas.openxmlformats.org/presentationml/2006/main">
-  <p:cSld>
-    <p:spTree>
-      <p:nvGrpSpPr>
-        <p:cNvPr id="1" name=""/>
-        <p:cNvGrpSpPr/>
-        <p:nvPr/>
-      </p:nvGrpSpPr>
-      <p:grpSpPr>
-        <a:xfrm>
-          <a:off x="0" y="0"/>
-          <a:ext cx="0" cy="0"/>
-          <a:chOff x="0" y="0"/>
-          <a:chExt cx="0" cy="0"/>
-        </a:xfrm>
-      </p:grpSpPr>
-      <p:sp>
-        <p:nvSpPr>
-          <p:cNvPr id="2" name="Title 1">
-            <a:extLst>
-              <a:ext uri="{FF2B5EF4-FFF2-40B4-BE49-F238E27FC236}">
-                <a16:creationId xmlns:a16="http://schemas.microsoft.com/office/drawing/2014/main" id="{5CF0BCC4-D731-9BFE-B53D-C5898A46AD3B}"/>
-              </a:ext>
-            </a:extLst>
-          </p:cNvPr>
-          <p:cNvSpPr>
-            <a:spLocks noGrp="1"/>
-          </p:cNvSpPr>
-          <p:nvPr>
-            <p:ph type="title"/>
-          </p:nvPr>
-        </p:nvSpPr>
-        <p:spPr/>
-        <p:txBody>
-          <a:bodyPr/>
-          <a:lstStyle/>
-          <a:p>
-            <a:r>
-              <a:rPr lang="en-US" dirty="0"/>
-              <a:t>Expansion (geo data)</a:t>
-            </a:r>
-          </a:p>
-        </p:txBody>
-      </p:sp>
-      <p:sp>
-        <p:nvSpPr>
-          <p:cNvPr id="3" name="Content Placeholder 2">
-            <a:extLst>
-              <a:ext uri="{FF2B5EF4-FFF2-40B4-BE49-F238E27FC236}">
-                <a16:creationId xmlns:a16="http://schemas.microsoft.com/office/drawing/2014/main" id="{5C7FB829-E160-ACDE-1ADB-B6AB9B3D8DA0}"/>
-              </a:ext>
-            </a:extLst>
-          </p:cNvPr>
-          <p:cNvSpPr>
-            <a:spLocks noGrp="1"/>
-          </p:cNvSpPr>
-          <p:nvPr>
-            <p:ph idx="1"/>
-          </p:nvPr>
-        </p:nvSpPr>
-        <p:spPr/>
-        <p:txBody>
-          <a:bodyPr/>
-          <a:lstStyle/>
-          <a:p>
-            <a:endParaRPr lang="en-US"/>
-          </a:p>
-        </p:txBody>
-      </p:sp>
-    </p:spTree>
-    <p:extLst>
-      <p:ext uri="{BB962C8B-B14F-4D97-AF65-F5344CB8AC3E}">
-        <p14:creationId xmlns:p14="http://schemas.microsoft.com/office/powerpoint/2010/main" val="1713706811"/>
-      </p:ext>
-    </p:extLst>
-  </p:cSld>
-  <p:clrMapOvr>
-    <a:masterClrMapping/>
-  </p:clrMapOvr>
-</p:sld>
-</file>
-
-<file path=ppt/slides/slide2.xml><?xml version="1.0" encoding="utf-8"?>
-<p:sld xmlns:a="http://schemas.openxmlformats.org/drawingml/2006/main" xmlns:r="http://schemas.openxmlformats.org/officeDocument/2006/relationships" xmlns:p="http://schemas.openxmlformats.org/presentationml/2006/main">
-  <p:cSld>
-    <p:spTree>
-      <p:nvGrpSpPr>
-        <p:cNvPr id="1" name=""/>
-        <p:cNvGrpSpPr/>
-        <p:nvPr/>
-      </p:nvGrpSpPr>
-      <p:grpSpPr>
-        <a:xfrm>
-          <a:off x="0" y="0"/>
-          <a:ext cx="0" cy="0"/>
-          <a:chOff x="0" y="0"/>
-          <a:chExt cx="0" cy="0"/>
-        </a:xfrm>
-      </p:grpSpPr>
-      <p:sp>
-        <p:nvSpPr>
-          <p:cNvPr id="2" name="Title 1">
-            <a:extLst>
-              <a:ext uri="{FF2B5EF4-FFF2-40B4-BE49-F238E27FC236}">
-                <a16:creationId xmlns:a16="http://schemas.microsoft.com/office/drawing/2014/main" id="{BEC0930C-05F1-2507-08E4-4319DE0F279E}"/>
-              </a:ext>
-            </a:extLst>
-          </p:cNvPr>
-          <p:cNvSpPr>
-            <a:spLocks noGrp="1"/>
-          </p:cNvSpPr>
-          <p:nvPr>
-            <p:ph type="title"/>
-          </p:nvPr>
-        </p:nvSpPr>
-        <p:spPr/>
-        <p:txBody>
-          <a:bodyPr/>
-          <a:lstStyle/>
-          <a:p>
-            <a:r>
-              <a:rPr lang="en-US" dirty="0"/>
-              <a:t>Notes</a:t>
-            </a:r>
-          </a:p>
-        </p:txBody>
-      </p:sp>
-      <p:sp>
-        <p:nvSpPr>
-          <p:cNvPr id="3" name="Content Placeholder 2">
-            <a:extLst>
-              <a:ext uri="{FF2B5EF4-FFF2-40B4-BE49-F238E27FC236}">
-                <a16:creationId xmlns:a16="http://schemas.microsoft.com/office/drawing/2014/main" id="{A2BD7EE3-4D24-89C5-E7D1-FE2734F58EBF}"/>
-              </a:ext>
-            </a:extLst>
-          </p:cNvPr>
-          <p:cNvSpPr>
-            <a:spLocks noGrp="1"/>
-          </p:cNvSpPr>
-          <p:nvPr>
-            <p:ph idx="1"/>
-          </p:nvPr>
-        </p:nvSpPr>
-        <p:spPr/>
-        <p:txBody>
-          <a:bodyPr>
-            <a:normAutofit/>
-          </a:bodyPr>
-          <a:lstStyle/>
-          <a:p>
-            <a:r>
-              <a:rPr lang="en-US" sz="2400" dirty="0"/>
-              <a:t>The full code, all matrices and tables, and answers to the prompted questions can be found in the accompanying </a:t>
-            </a:r>
-            <a:r>
-              <a:rPr lang="en-US" sz="2400" dirty="0" err="1"/>
-              <a:t>Jupyter</a:t>
-            </a:r>
-            <a:r>
-              <a:rPr lang="en-US" sz="2400" dirty="0"/>
-              <a:t> notebook.</a:t>
-            </a:r>
-          </a:p>
-          <a:p>
-            <a:endParaRPr lang="en-US" sz="2400" dirty="0"/>
-          </a:p>
-          <a:p>
-            <a:r>
-              <a:rPr lang="en-US" sz="2400" dirty="0"/>
-              <a:t>Claude was used to troubleshoot code, but no code written by Claude was used for the simulation (i.e., code written by Claude for troubleshooting was removed after bugs were identified).  Therefore, Claude’s only influence is the adjustment of pre-existing code originally based on Assignment 5 and course content downloaded from the course GitHub.</a:t>
-            </a:r>
-          </a:p>
-        </p:txBody>
-      </p:sp>
-    </p:spTree>
-    <p:extLst>
-      <p:ext uri="{BB962C8B-B14F-4D97-AF65-F5344CB8AC3E}">
-        <p14:creationId xmlns:p14="http://schemas.microsoft.com/office/powerpoint/2010/main" val="3747026330"/>
-      </p:ext>
-    </p:extLst>
-  </p:cSld>
-  <p:clrMapOvr>
-    <a:masterClrMapping/>
-  </p:clrMapOvr>
-</p:sld>
-</file>
-
-<file path=ppt/slides/slide3.xml><?xml version="1.0" encoding="utf-8"?>
-<p:sld xmlns:a="http://schemas.openxmlformats.org/drawingml/2006/main" xmlns:r="http://schemas.openxmlformats.org/officeDocument/2006/relationships" xmlns:p="http://schemas.openxmlformats.org/presentationml/2006/main">
-  <p:cSld>
-    <p:spTree>
-      <p:nvGrpSpPr>
-        <p:cNvPr id="1" name=""/>
-        <p:cNvGrpSpPr/>
-        <p:nvPr/>
-      </p:nvGrpSpPr>
-      <p:grpSpPr>
-        <a:xfrm>
-          <a:off x="0" y="0"/>
-          <a:ext cx="0" cy="0"/>
-          <a:chOff x="0" y="0"/>
-          <a:chExt cx="0" cy="0"/>
-        </a:xfrm>
-      </p:grpSpPr>
-      <p:sp>
-        <p:nvSpPr>
-          <p:cNvPr id="2" name="Title 1">
-            <a:extLst>
-              <a:ext uri="{FF2B5EF4-FFF2-40B4-BE49-F238E27FC236}">
-                <a16:creationId xmlns:a16="http://schemas.microsoft.com/office/drawing/2014/main" id="{99A996EA-8120-67DA-2E1B-76B42D51A930}"/>
-              </a:ext>
-            </a:extLst>
-          </p:cNvPr>
-          <p:cNvSpPr>
-            <a:spLocks noGrp="1"/>
-          </p:cNvSpPr>
-          <p:nvPr>
-            <p:ph type="title"/>
-          </p:nvPr>
-        </p:nvSpPr>
-        <p:spPr/>
-        <p:txBody>
-          <a:bodyPr/>
-          <a:lstStyle/>
-          <a:p>
-            <a:r>
-              <a:rPr lang="en-US" dirty="0"/>
-              <a:t>Data Summary</a:t>
-            </a:r>
-          </a:p>
-        </p:txBody>
-      </p:sp>
-      <p:graphicFrame>
-        <p:nvGraphicFramePr>
-          <p:cNvPr id="4" name="Content Placeholder 3">
-            <a:extLst>
-              <a:ext uri="{FF2B5EF4-FFF2-40B4-BE49-F238E27FC236}">
-                <a16:creationId xmlns:a16="http://schemas.microsoft.com/office/drawing/2014/main" id="{564F4830-C53E-C4FF-F06D-3A3A93C305F3}"/>
-              </a:ext>
-            </a:extLst>
-          </p:cNvPr>
-          <p:cNvGraphicFramePr>
-            <a:graphicFrameLocks noGrp="1"/>
-          </p:cNvGraphicFramePr>
-          <p:nvPr>
-            <p:ph idx="1"/>
-            <p:extLst>
-              <p:ext uri="{D42A27DB-BD31-4B8C-83A1-F6EECF244321}">
-                <p14:modId xmlns:p14="http://schemas.microsoft.com/office/powerpoint/2010/main" val="1872124188"/>
-              </p:ext>
-            </p:extLst>
-          </p:nvPr>
-        </p:nvGraphicFramePr>
-        <p:xfrm>
-          <a:off x="838200" y="1825625"/>
-          <a:ext cx="10515600" cy="3977640"/>
-        </p:xfrm>
-        <a:graphic>
-          <a:graphicData uri="http://schemas.openxmlformats.org/drawingml/2006/table">
-            <a:tbl>
-              <a:tblPr firstRow="1" bandRow="1">
-                <a:tableStyleId>{5C22544A-7EE6-4342-B048-85BDC9FD1C3A}</a:tableStyleId>
-              </a:tblPr>
-              <a:tblGrid>
-                <a:gridCol w="2628900">
-                  <a:extLst>
-                    <a:ext uri="{9D8B030D-6E8A-4147-A177-3AD203B41FA5}">
-                      <a16:colId xmlns:a16="http://schemas.microsoft.com/office/drawing/2014/main" val="1946558508"/>
-                    </a:ext>
-                  </a:extLst>
-                </a:gridCol>
-                <a:gridCol w="1736496">
-                  <a:extLst>
-                    <a:ext uri="{9D8B030D-6E8A-4147-A177-3AD203B41FA5}">
-                      <a16:colId xmlns:a16="http://schemas.microsoft.com/office/drawing/2014/main" val="1899274691"/>
-                    </a:ext>
-                  </a:extLst>
-                </a:gridCol>
-                <a:gridCol w="1743959">
-                  <a:extLst>
-                    <a:ext uri="{9D8B030D-6E8A-4147-A177-3AD203B41FA5}">
-                      <a16:colId xmlns:a16="http://schemas.microsoft.com/office/drawing/2014/main" val="2387179946"/>
-                    </a:ext>
-                  </a:extLst>
-                </a:gridCol>
-                <a:gridCol w="4406245">
-                  <a:extLst>
-                    <a:ext uri="{9D8B030D-6E8A-4147-A177-3AD203B41FA5}">
-                      <a16:colId xmlns:a16="http://schemas.microsoft.com/office/drawing/2014/main" val="3976735188"/>
-                    </a:ext>
-                  </a:extLst>
-                </a:gridCol>
-              </a:tblGrid>
-              <a:tr h="370840">
-                <a:tc>
-                  <a:txBody>
-                    <a:bodyPr/>
-                    <a:lstStyle/>
-                    <a:p>
-                      <a:r>
-                        <a:rPr lang="en-US" dirty="0"/>
-                        <a:t>Attribute</a:t>
-                      </a:r>
-                    </a:p>
-                  </a:txBody>
-                  <a:tcPr/>
-                </a:tc>
-                <a:tc>
-                  <a:txBody>
-                    <a:bodyPr/>
-                    <a:lstStyle/>
-                    <a:p>
-                      <a:r>
-                        <a:rPr lang="en-US" dirty="0"/>
-                        <a:t>Categorization</a:t>
-                      </a:r>
-                    </a:p>
-                  </a:txBody>
-                  <a:tcPr/>
-                </a:tc>
-                <a:tc>
-                  <a:txBody>
-                    <a:bodyPr/>
-                    <a:lstStyle/>
-                    <a:p>
-                      <a:r>
-                        <a:rPr lang="en-US" dirty="0"/>
-                        <a:t>Data Type</a:t>
-                      </a:r>
-                    </a:p>
-                  </a:txBody>
-                  <a:tcPr/>
-                </a:tc>
-                <a:tc>
-                  <a:txBody>
-                    <a:bodyPr/>
-                    <a:lstStyle/>
-                    <a:p>
-                      <a:r>
-                        <a:rPr lang="en-US" dirty="0"/>
-                        <a:t>Description/Purpose</a:t>
-                      </a:r>
-                    </a:p>
-                  </a:txBody>
-                  <a:tcPr/>
-                </a:tc>
-                <a:extLst>
-                  <a:ext uri="{0D108BD9-81ED-4DB2-BD59-A6C34878D82A}">
-                    <a16:rowId xmlns:a16="http://schemas.microsoft.com/office/drawing/2014/main" val="3851082990"/>
-                  </a:ext>
-                </a:extLst>
-              </a:tr>
-              <a:tr h="370840">
-                <a:tc>
-                  <a:txBody>
-                    <a:bodyPr/>
-                    <a:lstStyle/>
-                    <a:p>
-                      <a:endParaRPr lang="en-US" dirty="0"/>
-                    </a:p>
-                  </a:txBody>
-                  <a:tcPr/>
-                </a:tc>
-                <a:tc>
-                  <a:txBody>
-                    <a:bodyPr/>
-                    <a:lstStyle/>
-                    <a:p>
-                      <a:r>
-                        <a:rPr lang="en-US" dirty="0"/>
-                        <a:t>Continuous</a:t>
-                      </a:r>
-                    </a:p>
-                  </a:txBody>
-                  <a:tcPr/>
-                </a:tc>
-                <a:tc>
-                  <a:txBody>
-                    <a:bodyPr/>
-                    <a:lstStyle/>
-                    <a:p>
-                      <a:r>
-                        <a:rPr lang="en-US" dirty="0"/>
-                        <a:t>String</a:t>
-                      </a:r>
-                    </a:p>
-                  </a:txBody>
-                  <a:tcPr/>
-                </a:tc>
-                <a:tc>
-                  <a:txBody>
-                    <a:bodyPr/>
-                    <a:lstStyle/>
-                    <a:p>
-                      <a:endParaRPr lang="en-US" dirty="0"/>
-                    </a:p>
-                  </a:txBody>
-                  <a:tcPr/>
-                </a:tc>
-                <a:extLst>
-                  <a:ext uri="{0D108BD9-81ED-4DB2-BD59-A6C34878D82A}">
-                    <a16:rowId xmlns:a16="http://schemas.microsoft.com/office/drawing/2014/main" val="3431077986"/>
-                  </a:ext>
-                </a:extLst>
-              </a:tr>
-              <a:tr h="370840">
-                <a:tc>
-                  <a:txBody>
-                    <a:bodyPr/>
-                    <a:lstStyle/>
-                    <a:p>
-                      <a:endParaRPr lang="en-US" dirty="0"/>
-                    </a:p>
-                  </a:txBody>
-                  <a:tcPr/>
-                </a:tc>
-                <a:tc>
-                  <a:txBody>
-                    <a:bodyPr/>
-                    <a:lstStyle/>
-                    <a:p>
-                      <a:r>
-                        <a:rPr lang="en-US" dirty="0"/>
-                        <a:t>Discrete, Categorical</a:t>
-                      </a:r>
-                    </a:p>
-                  </a:txBody>
-                  <a:tcPr/>
-                </a:tc>
-                <a:tc>
-                  <a:txBody>
-                    <a:bodyPr/>
-                    <a:lstStyle/>
-                    <a:p>
-                      <a:r>
-                        <a:rPr lang="en-US" dirty="0"/>
-                        <a:t>Numeric</a:t>
-                      </a:r>
-                    </a:p>
-                  </a:txBody>
-                  <a:tcPr/>
-                </a:tc>
-                <a:tc>
-                  <a:txBody>
-                    <a:bodyPr/>
-                    <a:lstStyle/>
-                    <a:p>
-                      <a:endParaRPr lang="en-US" dirty="0"/>
-                    </a:p>
-                  </a:txBody>
-                  <a:tcPr/>
-                </a:tc>
-                <a:extLst>
-                  <a:ext uri="{0D108BD9-81ED-4DB2-BD59-A6C34878D82A}">
-                    <a16:rowId xmlns:a16="http://schemas.microsoft.com/office/drawing/2014/main" val="3254734182"/>
-                  </a:ext>
-                </a:extLst>
-              </a:tr>
-              <a:tr h="370840">
-                <a:tc>
-                  <a:txBody>
-                    <a:bodyPr/>
-                    <a:lstStyle/>
-                    <a:p>
-                      <a:endParaRPr lang="en-US" dirty="0"/>
-                    </a:p>
-                  </a:txBody>
-                  <a:tcPr/>
-                </a:tc>
-                <a:tc>
-                  <a:txBody>
-                    <a:bodyPr/>
-                    <a:lstStyle/>
-                    <a:p>
-                      <a:endParaRPr lang="en-US" dirty="0"/>
-                    </a:p>
-                  </a:txBody>
-                  <a:tcPr/>
-                </a:tc>
-                <a:tc>
-                  <a:txBody>
-                    <a:bodyPr/>
-                    <a:lstStyle/>
-                    <a:p>
-                      <a:endParaRPr lang="en-US" dirty="0"/>
-                    </a:p>
-                  </a:txBody>
-                  <a:tcPr/>
-                </a:tc>
-                <a:tc>
-                  <a:txBody>
-                    <a:bodyPr/>
-                    <a:lstStyle/>
-                    <a:p>
-                      <a:endParaRPr lang="en-US"/>
-                    </a:p>
-                  </a:txBody>
-                  <a:tcPr/>
-                </a:tc>
-                <a:extLst>
-                  <a:ext uri="{0D108BD9-81ED-4DB2-BD59-A6C34878D82A}">
-                    <a16:rowId xmlns:a16="http://schemas.microsoft.com/office/drawing/2014/main" val="2648510662"/>
-                  </a:ext>
-                </a:extLst>
-              </a:tr>
-              <a:tr h="370840">
-                <a:tc>
-                  <a:txBody>
-                    <a:bodyPr/>
-                    <a:lstStyle/>
-                    <a:p>
-                      <a:endParaRPr lang="en-US"/>
-                    </a:p>
-                  </a:txBody>
-                  <a:tcPr/>
-                </a:tc>
-                <a:tc>
-                  <a:txBody>
-                    <a:bodyPr/>
-                    <a:lstStyle/>
-                    <a:p>
-                      <a:endParaRPr lang="en-US"/>
-                    </a:p>
-                  </a:txBody>
-                  <a:tcPr/>
-                </a:tc>
-                <a:tc>
-                  <a:txBody>
-                    <a:bodyPr/>
-                    <a:lstStyle/>
-                    <a:p>
-                      <a:endParaRPr lang="en-US"/>
-                    </a:p>
-                  </a:txBody>
-                  <a:tcPr/>
-                </a:tc>
-                <a:tc>
-                  <a:txBody>
-                    <a:bodyPr/>
-                    <a:lstStyle/>
-                    <a:p>
-                      <a:endParaRPr lang="en-US"/>
-                    </a:p>
-                  </a:txBody>
-                  <a:tcPr/>
-                </a:tc>
-                <a:extLst>
-                  <a:ext uri="{0D108BD9-81ED-4DB2-BD59-A6C34878D82A}">
-                    <a16:rowId xmlns:a16="http://schemas.microsoft.com/office/drawing/2014/main" val="3332858917"/>
-                  </a:ext>
-                </a:extLst>
-              </a:tr>
-              <a:tr h="370840">
-                <a:tc>
-                  <a:txBody>
-                    <a:bodyPr/>
-                    <a:lstStyle/>
-                    <a:p>
-                      <a:endParaRPr lang="en-US"/>
-                    </a:p>
-                  </a:txBody>
-                  <a:tcPr/>
-                </a:tc>
-                <a:tc>
-                  <a:txBody>
-                    <a:bodyPr/>
-                    <a:lstStyle/>
-                    <a:p>
-                      <a:endParaRPr lang="en-US"/>
-                    </a:p>
-                  </a:txBody>
-                  <a:tcPr/>
-                </a:tc>
-                <a:tc>
-                  <a:txBody>
-                    <a:bodyPr/>
-                    <a:lstStyle/>
-                    <a:p>
-                      <a:endParaRPr lang="en-US"/>
-                    </a:p>
-                  </a:txBody>
-                  <a:tcPr/>
-                </a:tc>
-                <a:tc>
-                  <a:txBody>
-                    <a:bodyPr/>
-                    <a:lstStyle/>
-                    <a:p>
-                      <a:endParaRPr lang="en-US"/>
-                    </a:p>
-                  </a:txBody>
-                  <a:tcPr/>
-                </a:tc>
-                <a:extLst>
-                  <a:ext uri="{0D108BD9-81ED-4DB2-BD59-A6C34878D82A}">
-                    <a16:rowId xmlns:a16="http://schemas.microsoft.com/office/drawing/2014/main" val="2582443173"/>
-                  </a:ext>
-                </a:extLst>
-              </a:tr>
-              <a:tr h="370840">
-                <a:tc>
-                  <a:txBody>
-                    <a:bodyPr/>
-                    <a:lstStyle/>
-                    <a:p>
-                      <a:endParaRPr lang="en-US"/>
-                    </a:p>
-                  </a:txBody>
-                  <a:tcPr/>
-                </a:tc>
-                <a:tc>
-                  <a:txBody>
-                    <a:bodyPr/>
-                    <a:lstStyle/>
-                    <a:p>
-                      <a:endParaRPr lang="en-US"/>
-                    </a:p>
-                  </a:txBody>
-                  <a:tcPr/>
-                </a:tc>
-                <a:tc>
-                  <a:txBody>
-                    <a:bodyPr/>
-                    <a:lstStyle/>
-                    <a:p>
-                      <a:endParaRPr lang="en-US"/>
-                    </a:p>
-                  </a:txBody>
-                  <a:tcPr/>
-                </a:tc>
-                <a:tc>
-                  <a:txBody>
-                    <a:bodyPr/>
-                    <a:lstStyle/>
-                    <a:p>
-                      <a:endParaRPr lang="en-US"/>
-                    </a:p>
-                  </a:txBody>
-                  <a:tcPr/>
-                </a:tc>
-                <a:extLst>
-                  <a:ext uri="{0D108BD9-81ED-4DB2-BD59-A6C34878D82A}">
-                    <a16:rowId xmlns:a16="http://schemas.microsoft.com/office/drawing/2014/main" val="1378822194"/>
-                  </a:ext>
-                </a:extLst>
-              </a:tr>
-              <a:tr h="370840">
-                <a:tc>
-                  <a:txBody>
-                    <a:bodyPr/>
-                    <a:lstStyle/>
-                    <a:p>
-                      <a:endParaRPr lang="en-US"/>
-                    </a:p>
-                  </a:txBody>
-                  <a:tcPr/>
-                </a:tc>
-                <a:tc>
-                  <a:txBody>
-                    <a:bodyPr/>
-                    <a:lstStyle/>
-                    <a:p>
-                      <a:endParaRPr lang="en-US"/>
-                    </a:p>
-                  </a:txBody>
-                  <a:tcPr/>
-                </a:tc>
-                <a:tc>
-                  <a:txBody>
-                    <a:bodyPr/>
-                    <a:lstStyle/>
-                    <a:p>
-                      <a:endParaRPr lang="en-US"/>
-                    </a:p>
-                  </a:txBody>
-                  <a:tcPr/>
-                </a:tc>
-                <a:tc>
-                  <a:txBody>
-                    <a:bodyPr/>
-                    <a:lstStyle/>
-                    <a:p>
-                      <a:endParaRPr lang="en-US"/>
-                    </a:p>
-                  </a:txBody>
-                  <a:tcPr/>
-                </a:tc>
-                <a:extLst>
-                  <a:ext uri="{0D108BD9-81ED-4DB2-BD59-A6C34878D82A}">
-                    <a16:rowId xmlns:a16="http://schemas.microsoft.com/office/drawing/2014/main" val="1017357097"/>
-                  </a:ext>
-                </a:extLst>
-              </a:tr>
-              <a:tr h="370840">
-                <a:tc>
-                  <a:txBody>
-                    <a:bodyPr/>
-                    <a:lstStyle/>
-                    <a:p>
-                      <a:endParaRPr lang="en-US"/>
-                    </a:p>
-                  </a:txBody>
-                  <a:tcPr/>
-                </a:tc>
-                <a:tc>
-                  <a:txBody>
-                    <a:bodyPr/>
-                    <a:lstStyle/>
-                    <a:p>
-                      <a:endParaRPr lang="en-US"/>
-                    </a:p>
-                  </a:txBody>
-                  <a:tcPr/>
-                </a:tc>
-                <a:tc>
-                  <a:txBody>
-                    <a:bodyPr/>
-                    <a:lstStyle/>
-                    <a:p>
-                      <a:endParaRPr lang="en-US"/>
-                    </a:p>
-                  </a:txBody>
-                  <a:tcPr/>
-                </a:tc>
-                <a:tc>
-                  <a:txBody>
-                    <a:bodyPr/>
-                    <a:lstStyle/>
-                    <a:p>
-                      <a:endParaRPr lang="en-US"/>
-                    </a:p>
-                  </a:txBody>
-                  <a:tcPr/>
-                </a:tc>
-                <a:extLst>
-                  <a:ext uri="{0D108BD9-81ED-4DB2-BD59-A6C34878D82A}">
-                    <a16:rowId xmlns:a16="http://schemas.microsoft.com/office/drawing/2014/main" val="2344621909"/>
-                  </a:ext>
-                </a:extLst>
-              </a:tr>
-              <a:tr h="370840">
-                <a:tc>
-                  <a:txBody>
-                    <a:bodyPr/>
-                    <a:lstStyle/>
-                    <a:p>
-                      <a:endParaRPr lang="en-US" dirty="0"/>
-                    </a:p>
-                  </a:txBody>
-                  <a:tcPr/>
-                </a:tc>
-                <a:tc>
-                  <a:txBody>
-                    <a:bodyPr/>
-                    <a:lstStyle/>
-                    <a:p>
-                      <a:endParaRPr lang="en-US" dirty="0"/>
-                    </a:p>
-                  </a:txBody>
-                  <a:tcPr/>
-                </a:tc>
-                <a:tc>
-                  <a:txBody>
-                    <a:bodyPr/>
-                    <a:lstStyle/>
-                    <a:p>
-                      <a:endParaRPr lang="en-US"/>
-                    </a:p>
-                  </a:txBody>
-                  <a:tcPr/>
-                </a:tc>
-                <a:tc>
-                  <a:txBody>
-                    <a:bodyPr/>
-                    <a:lstStyle/>
-                    <a:p>
-                      <a:endParaRPr lang="en-US" dirty="0"/>
-                    </a:p>
-                  </a:txBody>
-                  <a:tcPr/>
-                </a:tc>
-                <a:extLst>
-                  <a:ext uri="{0D108BD9-81ED-4DB2-BD59-A6C34878D82A}">
-                    <a16:rowId xmlns:a16="http://schemas.microsoft.com/office/drawing/2014/main" val="3565204483"/>
-                  </a:ext>
-                </a:extLst>
-              </a:tr>
-            </a:tbl>
-          </a:graphicData>
-        </a:graphic>
-      </p:graphicFrame>
-    </p:spTree>
-    <p:extLst>
-      <p:ext uri="{BB962C8B-B14F-4D97-AF65-F5344CB8AC3E}">
-        <p14:creationId xmlns:p14="http://schemas.microsoft.com/office/powerpoint/2010/main" val="2946247808"/>
-      </p:ext>
-    </p:extLst>
-  </p:cSld>
-  <p:clrMapOvr>
-    <a:masterClrMapping/>
-  </p:clrMapOvr>
-</p:sld>
-</file>
-
-<file path=ppt/slides/slide4.xml><?xml version="1.0" encoding="utf-8"?>
-<p:sld xmlns:a="http://schemas.openxmlformats.org/drawingml/2006/main" xmlns:r="http://schemas.openxmlformats.org/officeDocument/2006/relationships" xmlns:p="http://schemas.openxmlformats.org/presentationml/2006/main">
-  <p:cSld>
-    <p:spTree>
-      <p:nvGrpSpPr>
-        <p:cNvPr id="1" name="">
-          <a:extLst>
-            <a:ext uri="{FF2B5EF4-FFF2-40B4-BE49-F238E27FC236}">
-              <a16:creationId xmlns:a16="http://schemas.microsoft.com/office/drawing/2014/main" id="{D70F8AC7-DB41-9416-B3E3-BEF058A0D21F}"/>
-            </a:ext>
-          </a:extLst>
-        </p:cNvPr>
-        <p:cNvGrpSpPr/>
-        <p:nvPr/>
-      </p:nvGrpSpPr>
-      <p:grpSpPr>
-        <a:xfrm>
-          <a:off x="0" y="0"/>
-          <a:ext cx="0" cy="0"/>
-          <a:chOff x="0" y="0"/>
-          <a:chExt cx="0" cy="0"/>
-        </a:xfrm>
-      </p:grpSpPr>
-      <p:sp>
-        <p:nvSpPr>
-          <p:cNvPr id="2" name="Title 1">
-            <a:extLst>
-              <a:ext uri="{FF2B5EF4-FFF2-40B4-BE49-F238E27FC236}">
-                <a16:creationId xmlns:a16="http://schemas.microsoft.com/office/drawing/2014/main" id="{1CA6945F-D5A4-0DE9-E6AD-242CF18A3F44}"/>
-              </a:ext>
-            </a:extLst>
-          </p:cNvPr>
-          <p:cNvSpPr>
-            <a:spLocks noGrp="1"/>
-          </p:cNvSpPr>
-          <p:nvPr>
-            <p:ph type="title"/>
-          </p:nvPr>
-        </p:nvSpPr>
-        <p:spPr/>
-        <p:txBody>
-          <a:bodyPr/>
-          <a:lstStyle/>
-          <a:p>
-            <a:r>
-              <a:rPr lang="en-US" dirty="0"/>
-              <a:t>Data Summary (2)</a:t>
-            </a:r>
-          </a:p>
-        </p:txBody>
-      </p:sp>
-      <p:graphicFrame>
-        <p:nvGraphicFramePr>
-          <p:cNvPr id="4" name="Content Placeholder 3">
-            <a:extLst>
-              <a:ext uri="{FF2B5EF4-FFF2-40B4-BE49-F238E27FC236}">
-                <a16:creationId xmlns:a16="http://schemas.microsoft.com/office/drawing/2014/main" id="{D4619C10-E193-29A0-1436-E106A8CED6D4}"/>
-              </a:ext>
-            </a:extLst>
-          </p:cNvPr>
-          <p:cNvGraphicFramePr>
-            <a:graphicFrameLocks noGrp="1"/>
-          </p:cNvGraphicFramePr>
-          <p:nvPr>
-            <p:ph idx="1"/>
-          </p:nvPr>
-        </p:nvGraphicFramePr>
-        <p:xfrm>
-          <a:off x="838200" y="1825625"/>
-          <a:ext cx="10515600" cy="3977640"/>
-        </p:xfrm>
-        <a:graphic>
-          <a:graphicData uri="http://schemas.openxmlformats.org/drawingml/2006/table">
-            <a:tbl>
-              <a:tblPr firstRow="1" bandRow="1">
-                <a:tableStyleId>{5C22544A-7EE6-4342-B048-85BDC9FD1C3A}</a:tableStyleId>
-              </a:tblPr>
-              <a:tblGrid>
-                <a:gridCol w="2628900">
-                  <a:extLst>
-                    <a:ext uri="{9D8B030D-6E8A-4147-A177-3AD203B41FA5}">
-                      <a16:colId xmlns:a16="http://schemas.microsoft.com/office/drawing/2014/main" val="1946558508"/>
-                    </a:ext>
-                  </a:extLst>
-                </a:gridCol>
-                <a:gridCol w="1736496">
-                  <a:extLst>
-                    <a:ext uri="{9D8B030D-6E8A-4147-A177-3AD203B41FA5}">
-                      <a16:colId xmlns:a16="http://schemas.microsoft.com/office/drawing/2014/main" val="1899274691"/>
-                    </a:ext>
-                  </a:extLst>
-                </a:gridCol>
-                <a:gridCol w="1743959">
-                  <a:extLst>
-                    <a:ext uri="{9D8B030D-6E8A-4147-A177-3AD203B41FA5}">
-                      <a16:colId xmlns:a16="http://schemas.microsoft.com/office/drawing/2014/main" val="2387179946"/>
-                    </a:ext>
-                  </a:extLst>
-                </a:gridCol>
-                <a:gridCol w="4406245">
-                  <a:extLst>
-                    <a:ext uri="{9D8B030D-6E8A-4147-A177-3AD203B41FA5}">
-                      <a16:colId xmlns:a16="http://schemas.microsoft.com/office/drawing/2014/main" val="3976735188"/>
-                    </a:ext>
-                  </a:extLst>
-                </a:gridCol>
-              </a:tblGrid>
-              <a:tr h="370840">
-                <a:tc>
-                  <a:txBody>
-                    <a:bodyPr/>
-                    <a:lstStyle/>
-                    <a:p>
-                      <a:r>
-                        <a:rPr lang="en-US" dirty="0"/>
-                        <a:t>Attribute</a:t>
-                      </a:r>
-                    </a:p>
-                  </a:txBody>
-                  <a:tcPr/>
-                </a:tc>
-                <a:tc>
-                  <a:txBody>
-                    <a:bodyPr/>
-                    <a:lstStyle/>
-                    <a:p>
-                      <a:r>
-                        <a:rPr lang="en-US" dirty="0"/>
-                        <a:t>Categorization</a:t>
-                      </a:r>
-                    </a:p>
-                  </a:txBody>
-                  <a:tcPr/>
-                </a:tc>
-                <a:tc>
-                  <a:txBody>
-                    <a:bodyPr/>
-                    <a:lstStyle/>
-                    <a:p>
-                      <a:r>
-                        <a:rPr lang="en-US" dirty="0"/>
-                        <a:t>Data Type</a:t>
-                      </a:r>
-                    </a:p>
-                  </a:txBody>
-                  <a:tcPr/>
-                </a:tc>
-                <a:tc>
-                  <a:txBody>
-                    <a:bodyPr/>
-                    <a:lstStyle/>
-                    <a:p>
-                      <a:r>
-                        <a:rPr lang="en-US" dirty="0"/>
-                        <a:t>Description/Purpose</a:t>
-                      </a:r>
-                    </a:p>
-                  </a:txBody>
-                  <a:tcPr/>
-                </a:tc>
-                <a:extLst>
-                  <a:ext uri="{0D108BD9-81ED-4DB2-BD59-A6C34878D82A}">
-                    <a16:rowId xmlns:a16="http://schemas.microsoft.com/office/drawing/2014/main" val="3851082990"/>
-                  </a:ext>
-                </a:extLst>
-              </a:tr>
-              <a:tr h="370840">
-                <a:tc>
-                  <a:txBody>
-                    <a:bodyPr/>
-                    <a:lstStyle/>
-                    <a:p>
-                      <a:endParaRPr lang="en-US" dirty="0"/>
-                    </a:p>
-                  </a:txBody>
-                  <a:tcPr/>
-                </a:tc>
-                <a:tc>
-                  <a:txBody>
-                    <a:bodyPr/>
-                    <a:lstStyle/>
-                    <a:p>
-                      <a:r>
-                        <a:rPr lang="en-US" dirty="0"/>
-                        <a:t>Continuous</a:t>
-                      </a:r>
-                    </a:p>
-                  </a:txBody>
-                  <a:tcPr/>
-                </a:tc>
-                <a:tc>
-                  <a:txBody>
-                    <a:bodyPr/>
-                    <a:lstStyle/>
-                    <a:p>
-                      <a:r>
-                        <a:rPr lang="en-US" dirty="0"/>
-                        <a:t>String</a:t>
-                      </a:r>
-                    </a:p>
-                  </a:txBody>
-                  <a:tcPr/>
-                </a:tc>
-                <a:tc>
-                  <a:txBody>
-                    <a:bodyPr/>
-                    <a:lstStyle/>
-                    <a:p>
-                      <a:endParaRPr lang="en-US" dirty="0"/>
-                    </a:p>
-                  </a:txBody>
-                  <a:tcPr/>
-                </a:tc>
-                <a:extLst>
-                  <a:ext uri="{0D108BD9-81ED-4DB2-BD59-A6C34878D82A}">
-                    <a16:rowId xmlns:a16="http://schemas.microsoft.com/office/drawing/2014/main" val="3431077986"/>
-                  </a:ext>
-                </a:extLst>
-              </a:tr>
-              <a:tr h="370840">
-                <a:tc>
-                  <a:txBody>
-                    <a:bodyPr/>
-                    <a:lstStyle/>
-                    <a:p>
-                      <a:endParaRPr lang="en-US" dirty="0"/>
-                    </a:p>
-                  </a:txBody>
-                  <a:tcPr/>
-                </a:tc>
-                <a:tc>
-                  <a:txBody>
-                    <a:bodyPr/>
-                    <a:lstStyle/>
-                    <a:p>
-                      <a:r>
-                        <a:rPr lang="en-US" dirty="0"/>
-                        <a:t>Discrete, Categorical</a:t>
-                      </a:r>
-                    </a:p>
-                  </a:txBody>
-                  <a:tcPr/>
-                </a:tc>
-                <a:tc>
-                  <a:txBody>
-                    <a:bodyPr/>
-                    <a:lstStyle/>
-                    <a:p>
-                      <a:r>
-                        <a:rPr lang="en-US" dirty="0"/>
-                        <a:t>Numeric</a:t>
-                      </a:r>
-                    </a:p>
-                  </a:txBody>
-                  <a:tcPr/>
-                </a:tc>
-                <a:tc>
-                  <a:txBody>
-                    <a:bodyPr/>
-                    <a:lstStyle/>
-                    <a:p>
-                      <a:endParaRPr lang="en-US" dirty="0"/>
-                    </a:p>
-                  </a:txBody>
-                  <a:tcPr/>
-                </a:tc>
-                <a:extLst>
-                  <a:ext uri="{0D108BD9-81ED-4DB2-BD59-A6C34878D82A}">
-                    <a16:rowId xmlns:a16="http://schemas.microsoft.com/office/drawing/2014/main" val="3254734182"/>
-                  </a:ext>
-                </a:extLst>
-              </a:tr>
-              <a:tr h="370840">
-                <a:tc>
-                  <a:txBody>
-                    <a:bodyPr/>
-                    <a:lstStyle/>
-                    <a:p>
-                      <a:endParaRPr lang="en-US" dirty="0"/>
-                    </a:p>
-                  </a:txBody>
-                  <a:tcPr/>
-                </a:tc>
-                <a:tc>
-                  <a:txBody>
-                    <a:bodyPr/>
-                    <a:lstStyle/>
-                    <a:p>
-                      <a:endParaRPr lang="en-US" dirty="0"/>
-                    </a:p>
-                  </a:txBody>
-                  <a:tcPr/>
-                </a:tc>
-                <a:tc>
-                  <a:txBody>
-                    <a:bodyPr/>
-                    <a:lstStyle/>
-                    <a:p>
-                      <a:endParaRPr lang="en-US" dirty="0"/>
-                    </a:p>
-                  </a:txBody>
-                  <a:tcPr/>
-                </a:tc>
-                <a:tc>
-                  <a:txBody>
-                    <a:bodyPr/>
-                    <a:lstStyle/>
-                    <a:p>
-                      <a:endParaRPr lang="en-US"/>
-                    </a:p>
-                  </a:txBody>
-                  <a:tcPr/>
-                </a:tc>
-                <a:extLst>
-                  <a:ext uri="{0D108BD9-81ED-4DB2-BD59-A6C34878D82A}">
-                    <a16:rowId xmlns:a16="http://schemas.microsoft.com/office/drawing/2014/main" val="2648510662"/>
-                  </a:ext>
-                </a:extLst>
-              </a:tr>
-              <a:tr h="370840">
-                <a:tc>
-                  <a:txBody>
-                    <a:bodyPr/>
-                    <a:lstStyle/>
-                    <a:p>
-                      <a:endParaRPr lang="en-US"/>
-                    </a:p>
-                  </a:txBody>
-                  <a:tcPr/>
-                </a:tc>
-                <a:tc>
-                  <a:txBody>
-                    <a:bodyPr/>
-                    <a:lstStyle/>
-                    <a:p>
-                      <a:endParaRPr lang="en-US"/>
-                    </a:p>
-                  </a:txBody>
-                  <a:tcPr/>
-                </a:tc>
-                <a:tc>
-                  <a:txBody>
-                    <a:bodyPr/>
-                    <a:lstStyle/>
-                    <a:p>
-                      <a:endParaRPr lang="en-US"/>
-                    </a:p>
-                  </a:txBody>
-                  <a:tcPr/>
-                </a:tc>
-                <a:tc>
-                  <a:txBody>
-                    <a:bodyPr/>
-                    <a:lstStyle/>
-                    <a:p>
-                      <a:endParaRPr lang="en-US"/>
-                    </a:p>
-                  </a:txBody>
-                  <a:tcPr/>
-                </a:tc>
-                <a:extLst>
-                  <a:ext uri="{0D108BD9-81ED-4DB2-BD59-A6C34878D82A}">
-                    <a16:rowId xmlns:a16="http://schemas.microsoft.com/office/drawing/2014/main" val="3332858917"/>
-                  </a:ext>
-                </a:extLst>
-              </a:tr>
-              <a:tr h="370840">
-                <a:tc>
-                  <a:txBody>
-                    <a:bodyPr/>
-                    <a:lstStyle/>
-                    <a:p>
-                      <a:endParaRPr lang="en-US"/>
-                    </a:p>
-                  </a:txBody>
-                  <a:tcPr/>
-                </a:tc>
-                <a:tc>
-                  <a:txBody>
-                    <a:bodyPr/>
-                    <a:lstStyle/>
-                    <a:p>
-                      <a:endParaRPr lang="en-US"/>
-                    </a:p>
-                  </a:txBody>
-                  <a:tcPr/>
-                </a:tc>
-                <a:tc>
-                  <a:txBody>
-                    <a:bodyPr/>
-                    <a:lstStyle/>
-                    <a:p>
-                      <a:endParaRPr lang="en-US"/>
-                    </a:p>
-                  </a:txBody>
-                  <a:tcPr/>
-                </a:tc>
-                <a:tc>
-                  <a:txBody>
-                    <a:bodyPr/>
-                    <a:lstStyle/>
-                    <a:p>
-                      <a:endParaRPr lang="en-US"/>
-                    </a:p>
-                  </a:txBody>
-                  <a:tcPr/>
-                </a:tc>
-                <a:extLst>
-                  <a:ext uri="{0D108BD9-81ED-4DB2-BD59-A6C34878D82A}">
-                    <a16:rowId xmlns:a16="http://schemas.microsoft.com/office/drawing/2014/main" val="2582443173"/>
-                  </a:ext>
-                </a:extLst>
-              </a:tr>
-              <a:tr h="370840">
-                <a:tc>
-                  <a:txBody>
-                    <a:bodyPr/>
-                    <a:lstStyle/>
-                    <a:p>
-                      <a:endParaRPr lang="en-US"/>
-                    </a:p>
-                  </a:txBody>
-                  <a:tcPr/>
-                </a:tc>
-                <a:tc>
-                  <a:txBody>
-                    <a:bodyPr/>
-                    <a:lstStyle/>
-                    <a:p>
-                      <a:endParaRPr lang="en-US"/>
-                    </a:p>
-                  </a:txBody>
-                  <a:tcPr/>
-                </a:tc>
-                <a:tc>
-                  <a:txBody>
-                    <a:bodyPr/>
-                    <a:lstStyle/>
-                    <a:p>
-                      <a:endParaRPr lang="en-US"/>
-                    </a:p>
-                  </a:txBody>
-                  <a:tcPr/>
-                </a:tc>
-                <a:tc>
-                  <a:txBody>
-                    <a:bodyPr/>
-                    <a:lstStyle/>
-                    <a:p>
-                      <a:endParaRPr lang="en-US"/>
-                    </a:p>
-                  </a:txBody>
-                  <a:tcPr/>
-                </a:tc>
-                <a:extLst>
-                  <a:ext uri="{0D108BD9-81ED-4DB2-BD59-A6C34878D82A}">
-                    <a16:rowId xmlns:a16="http://schemas.microsoft.com/office/drawing/2014/main" val="1378822194"/>
-                  </a:ext>
-                </a:extLst>
-              </a:tr>
-              <a:tr h="370840">
-                <a:tc>
-                  <a:txBody>
-                    <a:bodyPr/>
-                    <a:lstStyle/>
-                    <a:p>
-                      <a:endParaRPr lang="en-US"/>
-                    </a:p>
-                  </a:txBody>
-                  <a:tcPr/>
-                </a:tc>
-                <a:tc>
-                  <a:txBody>
-                    <a:bodyPr/>
-                    <a:lstStyle/>
-                    <a:p>
-                      <a:endParaRPr lang="en-US"/>
-                    </a:p>
-                  </a:txBody>
-                  <a:tcPr/>
-                </a:tc>
-                <a:tc>
-                  <a:txBody>
-                    <a:bodyPr/>
-                    <a:lstStyle/>
-                    <a:p>
-                      <a:endParaRPr lang="en-US"/>
-                    </a:p>
-                  </a:txBody>
-                  <a:tcPr/>
-                </a:tc>
-                <a:tc>
-                  <a:txBody>
-                    <a:bodyPr/>
-                    <a:lstStyle/>
-                    <a:p>
-                      <a:endParaRPr lang="en-US"/>
-                    </a:p>
-                  </a:txBody>
-                  <a:tcPr/>
-                </a:tc>
-                <a:extLst>
-                  <a:ext uri="{0D108BD9-81ED-4DB2-BD59-A6C34878D82A}">
-                    <a16:rowId xmlns:a16="http://schemas.microsoft.com/office/drawing/2014/main" val="1017357097"/>
-                  </a:ext>
-                </a:extLst>
-              </a:tr>
-              <a:tr h="370840">
-                <a:tc>
-                  <a:txBody>
-                    <a:bodyPr/>
-                    <a:lstStyle/>
-                    <a:p>
-                      <a:endParaRPr lang="en-US"/>
-                    </a:p>
-                  </a:txBody>
-                  <a:tcPr/>
-                </a:tc>
-                <a:tc>
-                  <a:txBody>
-                    <a:bodyPr/>
-                    <a:lstStyle/>
-                    <a:p>
-                      <a:endParaRPr lang="en-US"/>
-                    </a:p>
-                  </a:txBody>
-                  <a:tcPr/>
-                </a:tc>
-                <a:tc>
-                  <a:txBody>
-                    <a:bodyPr/>
-                    <a:lstStyle/>
-                    <a:p>
-                      <a:endParaRPr lang="en-US"/>
-                    </a:p>
-                  </a:txBody>
-                  <a:tcPr/>
-                </a:tc>
-                <a:tc>
-                  <a:txBody>
-                    <a:bodyPr/>
-                    <a:lstStyle/>
-                    <a:p>
-                      <a:endParaRPr lang="en-US"/>
-                    </a:p>
-                  </a:txBody>
-                  <a:tcPr/>
-                </a:tc>
-                <a:extLst>
-                  <a:ext uri="{0D108BD9-81ED-4DB2-BD59-A6C34878D82A}">
-                    <a16:rowId xmlns:a16="http://schemas.microsoft.com/office/drawing/2014/main" val="2344621909"/>
-                  </a:ext>
-                </a:extLst>
-              </a:tr>
-              <a:tr h="370840">
-                <a:tc>
-                  <a:txBody>
-                    <a:bodyPr/>
-                    <a:lstStyle/>
-                    <a:p>
-                      <a:endParaRPr lang="en-US" dirty="0"/>
-                    </a:p>
-                  </a:txBody>
-                  <a:tcPr/>
-                </a:tc>
-                <a:tc>
-                  <a:txBody>
-                    <a:bodyPr/>
-                    <a:lstStyle/>
-                    <a:p>
-                      <a:endParaRPr lang="en-US" dirty="0"/>
-                    </a:p>
-                  </a:txBody>
-                  <a:tcPr/>
-                </a:tc>
-                <a:tc>
-                  <a:txBody>
-                    <a:bodyPr/>
-                    <a:lstStyle/>
-                    <a:p>
-                      <a:endParaRPr lang="en-US"/>
-                    </a:p>
-                  </a:txBody>
-                  <a:tcPr/>
-                </a:tc>
-                <a:tc>
-                  <a:txBody>
-                    <a:bodyPr/>
-                    <a:lstStyle/>
-                    <a:p>
-                      <a:endParaRPr lang="en-US" dirty="0"/>
-                    </a:p>
-                  </a:txBody>
-                  <a:tcPr/>
-                </a:tc>
-                <a:extLst>
-                  <a:ext uri="{0D108BD9-81ED-4DB2-BD59-A6C34878D82A}">
-                    <a16:rowId xmlns:a16="http://schemas.microsoft.com/office/drawing/2014/main" val="3565204483"/>
-                  </a:ext>
-                </a:extLst>
-              </a:tr>
-            </a:tbl>
-          </a:graphicData>
-        </a:graphic>
-      </p:graphicFrame>
-    </p:spTree>
-    <p:extLst>
-      <p:ext uri="{BB962C8B-B14F-4D97-AF65-F5344CB8AC3E}">
-        <p14:creationId xmlns:p14="http://schemas.microsoft.com/office/powerpoint/2010/main" val="2312877710"/>
-      </p:ext>
-    </p:extLst>
-  </p:cSld>
-  <p:clrMapOvr>
-    <a:masterClrMapping/>
-  </p:clrMapOvr>
-</p:sld>
-</file>
-
-<file path=ppt/slides/slide5.xml><?xml version="1.0" encoding="utf-8"?>
-<p:sld xmlns:a="http://schemas.openxmlformats.org/drawingml/2006/main" xmlns:r="http://schemas.openxmlformats.org/officeDocument/2006/relationships" xmlns:p="http://schemas.openxmlformats.org/presentationml/2006/main">
-  <p:cSld>
-    <p:spTree>
-      <p:nvGrpSpPr>
-        <p:cNvPr id="1" name=""/>
-        <p:cNvGrpSpPr/>
-        <p:nvPr/>
-      </p:nvGrpSpPr>
-      <p:grpSpPr>
-        <a:xfrm>
-          <a:off x="0" y="0"/>
-          <a:ext cx="0" cy="0"/>
-          <a:chOff x="0" y="0"/>
-          <a:chExt cx="0" cy="0"/>
-        </a:xfrm>
-      </p:grpSpPr>
-      <p:sp>
-        <p:nvSpPr>
-          <p:cNvPr id="2" name="Title 1">
-            <a:extLst>
-              <a:ext uri="{FF2B5EF4-FFF2-40B4-BE49-F238E27FC236}">
-                <a16:creationId xmlns:a16="http://schemas.microsoft.com/office/drawing/2014/main" id="{B4BCC579-5CC0-A5BD-3B70-BDF1CB6BFFB8}"/>
-              </a:ext>
-            </a:extLst>
-          </p:cNvPr>
-          <p:cNvSpPr>
-            <a:spLocks noGrp="1"/>
-          </p:cNvSpPr>
-          <p:nvPr>
-            <p:ph type="title"/>
-          </p:nvPr>
-        </p:nvSpPr>
-        <p:spPr/>
-        <p:txBody>
-          <a:bodyPr/>
-          <a:lstStyle/>
-          <a:p>
-            <a:r>
-              <a:rPr lang="en-US" dirty="0"/>
-              <a:t>Target Variables</a:t>
-            </a:r>
-          </a:p>
-        </p:txBody>
-      </p:sp>
-      <p:sp>
-        <p:nvSpPr>
-          <p:cNvPr id="3" name="Content Placeholder 2">
-            <a:extLst>
-              <a:ext uri="{FF2B5EF4-FFF2-40B4-BE49-F238E27FC236}">
-                <a16:creationId xmlns:a16="http://schemas.microsoft.com/office/drawing/2014/main" id="{1FA432B6-2B47-2D08-4D66-59E0E2B0BDE3}"/>
-              </a:ext>
-            </a:extLst>
-          </p:cNvPr>
-          <p:cNvSpPr>
-            <a:spLocks noGrp="1"/>
-          </p:cNvSpPr>
-          <p:nvPr>
-            <p:ph idx="1"/>
-          </p:nvPr>
-        </p:nvSpPr>
-        <p:spPr/>
-        <p:txBody>
-          <a:bodyPr/>
-          <a:lstStyle/>
-          <a:p>
-            <a:r>
-              <a:rPr lang="en-US" dirty="0"/>
-              <a:t>oblast</a:t>
-            </a:r>
-          </a:p>
-          <a:p>
-            <a:r>
-              <a:rPr lang="en-US" dirty="0"/>
-              <a:t>rayon</a:t>
-            </a:r>
-          </a:p>
-          <a:p>
-            <a:r>
-              <a:rPr lang="en-US" dirty="0"/>
-              <a:t>type_of_infrastructure</a:t>
-            </a:r>
-          </a:p>
-        </p:txBody>
-      </p:sp>
-    </p:spTree>
-    <p:extLst>
-      <p:ext uri="{BB962C8B-B14F-4D97-AF65-F5344CB8AC3E}">
-        <p14:creationId xmlns:p14="http://schemas.microsoft.com/office/powerpoint/2010/main" val="64733370"/>
-      </p:ext>
-    </p:extLst>
-  </p:cSld>
-  <p:clrMapOvr>
-    <a:masterClrMapping/>
-  </p:clrMapOvr>
-</p:sld>
-</file>
-
-<file path=ppt/slides/slide6.xml><?xml version="1.0" encoding="utf-8"?>
-<p:sld xmlns:a="http://schemas.openxmlformats.org/drawingml/2006/main" xmlns:r="http://schemas.openxmlformats.org/officeDocument/2006/relationships" xmlns:p="http://schemas.openxmlformats.org/presentationml/2006/main">
-  <p:cSld>
-    <p:spTree>
-      <p:nvGrpSpPr>
-        <p:cNvPr id="1" name=""/>
-        <p:cNvGrpSpPr/>
-        <p:nvPr/>
-      </p:nvGrpSpPr>
-      <p:grpSpPr>
-        <a:xfrm>
-          <a:off x="0" y="0"/>
-          <a:ext cx="0" cy="0"/>
-          <a:chOff x="0" y="0"/>
-          <a:chExt cx="0" cy="0"/>
-        </a:xfrm>
-      </p:grpSpPr>
-      <p:sp>
-        <p:nvSpPr>
-          <p:cNvPr id="2" name="Title 1">
-            <a:extLst>
-              <a:ext uri="{FF2B5EF4-FFF2-40B4-BE49-F238E27FC236}">
-                <a16:creationId xmlns:a16="http://schemas.microsoft.com/office/drawing/2014/main" id="{4243B684-7610-B1D2-CEFC-8BD5C31B7DB9}"/>
-              </a:ext>
-            </a:extLst>
-          </p:cNvPr>
-          <p:cNvSpPr>
-            <a:spLocks noGrp="1"/>
-          </p:cNvSpPr>
-          <p:nvPr>
-            <p:ph type="title"/>
-          </p:nvPr>
-        </p:nvSpPr>
-        <p:spPr>
-          <a:xfrm>
-            <a:off x="838200" y="365125"/>
-            <a:ext cx="5119540" cy="1325563"/>
-          </a:xfrm>
-        </p:spPr>
-        <p:txBody>
-          <a:bodyPr/>
-          <a:lstStyle/>
-          <a:p>
-            <a:r>
-              <a:rPr lang="en-US" dirty="0"/>
-              <a:t>Markov Transition Tables</a:t>
-            </a:r>
-          </a:p>
-        </p:txBody>
-      </p:sp>
-      <p:pic>
-        <p:nvPicPr>
-          <p:cNvPr id="5" name="Content Placeholder 4">
-            <a:extLst>
-              <a:ext uri="{FF2B5EF4-FFF2-40B4-BE49-F238E27FC236}">
-                <a16:creationId xmlns:a16="http://schemas.microsoft.com/office/drawing/2014/main" id="{3E934E2D-DC50-5F05-84D7-445162EBF7EC}"/>
-              </a:ext>
-            </a:extLst>
-          </p:cNvPr>
-          <p:cNvPicPr>
-            <a:picLocks noGrp="1" noChangeAspect="1"/>
-          </p:cNvPicPr>
-          <p:nvPr>
-            <p:ph idx="1"/>
-          </p:nvPr>
-        </p:nvPicPr>
-        <p:blipFill>
-          <a:blip r:embed="rId2"/>
-          <a:stretch>
-            <a:fillRect/>
-          </a:stretch>
-        </p:blipFill>
-        <p:spPr>
-          <a:xfrm>
-            <a:off x="5147035" y="270200"/>
-            <a:ext cx="7044965" cy="6347808"/>
-          </a:xfrm>
-          <a:prstGeom prst="rect">
-            <a:avLst/>
-          </a:prstGeom>
-        </p:spPr>
-      </p:pic>
-    </p:spTree>
-    <p:extLst>
-      <p:ext uri="{BB962C8B-B14F-4D97-AF65-F5344CB8AC3E}">
-        <p14:creationId xmlns:p14="http://schemas.microsoft.com/office/powerpoint/2010/main" val="3173902929"/>
-      </p:ext>
-    </p:extLst>
-  </p:cSld>
-  <p:clrMapOvr>
-    <a:masterClrMapping/>
-  </p:clrMapOvr>
-</p:sld>
-</file>
-
-<file path=ppt/slides/slide7.xml><?xml version="1.0" encoding="utf-8"?>
-<p:sld xmlns:a="http://schemas.openxmlformats.org/drawingml/2006/main" xmlns:r="http://schemas.openxmlformats.org/officeDocument/2006/relationships" xmlns:p="http://schemas.openxmlformats.org/presentationml/2006/main">
-  <p:cSld>
-    <p:spTree>
-      <p:nvGrpSpPr>
-        <p:cNvPr id="1" name=""/>
-        <p:cNvGrpSpPr/>
-        <p:nvPr/>
-      </p:nvGrpSpPr>
-      <p:grpSpPr>
-        <a:xfrm>
-          <a:off x="0" y="0"/>
-          <a:ext cx="0" cy="0"/>
-          <a:chOff x="0" y="0"/>
-          <a:chExt cx="0" cy="0"/>
-        </a:xfrm>
-      </p:grpSpPr>
-      <p:sp>
-        <p:nvSpPr>
-          <p:cNvPr id="2" name="Title 1">
-            <a:extLst>
-              <a:ext uri="{FF2B5EF4-FFF2-40B4-BE49-F238E27FC236}">
-                <a16:creationId xmlns:a16="http://schemas.microsoft.com/office/drawing/2014/main" id="{6C807E5D-0C1A-2063-341A-4C9C6D90F632}"/>
-              </a:ext>
-            </a:extLst>
-          </p:cNvPr>
-          <p:cNvSpPr>
-            <a:spLocks noGrp="1"/>
-          </p:cNvSpPr>
-          <p:nvPr>
-            <p:ph type="title"/>
-          </p:nvPr>
-        </p:nvSpPr>
-        <p:spPr/>
-        <p:txBody>
-          <a:bodyPr/>
-          <a:lstStyle/>
-          <a:p>
-            <a:r>
-              <a:rPr lang="en-US" dirty="0"/>
-              <a:t>Markov Transition Tables (2)</a:t>
-            </a:r>
-          </a:p>
-        </p:txBody>
-      </p:sp>
-      <p:pic>
-        <p:nvPicPr>
-          <p:cNvPr id="5" name="Content Placeholder 4">
-            <a:extLst>
-              <a:ext uri="{FF2B5EF4-FFF2-40B4-BE49-F238E27FC236}">
-                <a16:creationId xmlns:a16="http://schemas.microsoft.com/office/drawing/2014/main" id="{B87C7871-B3F9-DE91-164C-259656092FF4}"/>
-              </a:ext>
-            </a:extLst>
-          </p:cNvPr>
-          <p:cNvPicPr>
-            <a:picLocks noGrp="1" noChangeAspect="1"/>
-          </p:cNvPicPr>
-          <p:nvPr>
-            <p:ph idx="1"/>
-          </p:nvPr>
-        </p:nvPicPr>
-        <p:blipFill>
-          <a:blip r:embed="rId2"/>
-          <a:stretch>
-            <a:fillRect/>
-          </a:stretch>
-        </p:blipFill>
-        <p:spPr>
-          <a:xfrm>
-            <a:off x="517234" y="1571101"/>
-            <a:ext cx="4818337" cy="4676458"/>
-          </a:xfrm>
-          <a:prstGeom prst="rect">
-            <a:avLst/>
-          </a:prstGeom>
-        </p:spPr>
-      </p:pic>
-      <p:pic>
-        <p:nvPicPr>
-          <p:cNvPr id="7" name="Picture 6">
-            <a:extLst>
-              <a:ext uri="{FF2B5EF4-FFF2-40B4-BE49-F238E27FC236}">
-                <a16:creationId xmlns:a16="http://schemas.microsoft.com/office/drawing/2014/main" id="{0C0DDD08-2D09-2B7C-C3E1-3291478D2F6F}"/>
-              </a:ext>
-            </a:extLst>
-          </p:cNvPr>
-          <p:cNvPicPr>
-            <a:picLocks noChangeAspect="1"/>
-          </p:cNvPicPr>
-          <p:nvPr/>
-        </p:nvPicPr>
-        <p:blipFill>
-          <a:blip r:embed="rId3"/>
-          <a:stretch>
-            <a:fillRect/>
-          </a:stretch>
-        </p:blipFill>
-        <p:spPr>
-          <a:xfrm>
-            <a:off x="5907464" y="1293773"/>
-            <a:ext cx="4825823" cy="4676459"/>
-          </a:xfrm>
-          <a:prstGeom prst="rect">
-            <a:avLst/>
-          </a:prstGeom>
-        </p:spPr>
-      </p:pic>
-    </p:spTree>
-    <p:extLst>
-      <p:ext uri="{BB962C8B-B14F-4D97-AF65-F5344CB8AC3E}">
-        <p14:creationId xmlns:p14="http://schemas.microsoft.com/office/powerpoint/2010/main" val="4208236196"/>
-      </p:ext>
-    </p:extLst>
-  </p:cSld>
-  <p:clrMapOvr>
-    <a:masterClrMapping/>
-  </p:clrMapOvr>
-</p:sld>
-</file>
-
-<file path=ppt/slides/slide8.xml><?xml version="1.0" encoding="utf-8"?>
-<p:sld xmlns:a="http://schemas.openxmlformats.org/drawingml/2006/main" xmlns:r="http://schemas.openxmlformats.org/officeDocument/2006/relationships" xmlns:p="http://schemas.openxmlformats.org/presentationml/2006/main">
-  <p:cSld>
-    <p:spTree>
-      <p:nvGrpSpPr>
-        <p:cNvPr id="1" name="">
-          <a:extLst>
-            <a:ext uri="{FF2B5EF4-FFF2-40B4-BE49-F238E27FC236}">
-              <a16:creationId xmlns:a16="http://schemas.microsoft.com/office/drawing/2014/main" id="{2BDFEB94-5D1E-3A75-E13F-030411C94441}"/>
-            </a:ext>
-          </a:extLst>
-        </p:cNvPr>
-        <p:cNvGrpSpPr/>
-        <p:nvPr/>
-      </p:nvGrpSpPr>
-      <p:grpSpPr>
-        <a:xfrm>
-          <a:off x="0" y="0"/>
-          <a:ext cx="0" cy="0"/>
-          <a:chOff x="0" y="0"/>
-          <a:chExt cx="0" cy="0"/>
-        </a:xfrm>
-      </p:grpSpPr>
-      <p:sp>
-        <p:nvSpPr>
-          <p:cNvPr id="2" name="Title 1">
-            <a:extLst>
-              <a:ext uri="{FF2B5EF4-FFF2-40B4-BE49-F238E27FC236}">
-                <a16:creationId xmlns:a16="http://schemas.microsoft.com/office/drawing/2014/main" id="{5E419E64-E93C-6697-672B-EBB1B7C4BDA1}"/>
-              </a:ext>
-            </a:extLst>
-          </p:cNvPr>
-          <p:cNvSpPr>
-            <a:spLocks noGrp="1"/>
-          </p:cNvSpPr>
-          <p:nvPr>
-            <p:ph type="title"/>
-          </p:nvPr>
-        </p:nvSpPr>
-        <p:spPr/>
-        <p:txBody>
-          <a:bodyPr/>
-          <a:lstStyle/>
-          <a:p>
-            <a:r>
-              <a:rPr lang="en-US" dirty="0"/>
-              <a:t>Results</a:t>
-            </a:r>
-          </a:p>
-        </p:txBody>
-      </p:sp>
-      <p:pic>
-        <p:nvPicPr>
-          <p:cNvPr id="7" name="Picture 6">
-            <a:extLst>
-              <a:ext uri="{FF2B5EF4-FFF2-40B4-BE49-F238E27FC236}">
-                <a16:creationId xmlns:a16="http://schemas.microsoft.com/office/drawing/2014/main" id="{9EEB8E65-4BC0-AC59-C502-845B9EF5D5FD}"/>
-              </a:ext>
-            </a:extLst>
-          </p:cNvPr>
-          <p:cNvPicPr>
-            <a:picLocks noChangeAspect="1"/>
-          </p:cNvPicPr>
-          <p:nvPr/>
-        </p:nvPicPr>
-        <p:blipFill>
-          <a:blip r:embed="rId2"/>
-          <a:stretch>
-            <a:fillRect/>
-          </a:stretch>
-        </p:blipFill>
-        <p:spPr>
-          <a:xfrm>
-            <a:off x="4505325" y="403783"/>
-            <a:ext cx="7454195" cy="4427628"/>
-          </a:xfrm>
-          <a:prstGeom prst="rect">
-            <a:avLst/>
-          </a:prstGeom>
-        </p:spPr>
-      </p:pic>
-      <p:sp>
-        <p:nvSpPr>
-          <p:cNvPr id="3" name="TextBox 2">
-            <a:extLst>
-              <a:ext uri="{FF2B5EF4-FFF2-40B4-BE49-F238E27FC236}">
-                <a16:creationId xmlns:a16="http://schemas.microsoft.com/office/drawing/2014/main" id="{63F63EBA-1769-C297-231A-FC16492186EB}"/>
-              </a:ext>
-            </a:extLst>
-          </p:cNvPr>
-          <p:cNvSpPr txBox="1"/>
-          <p:nvPr/>
-        </p:nvSpPr>
-        <p:spPr>
-          <a:xfrm>
-            <a:off x="586720" y="2481606"/>
-            <a:ext cx="3632855" cy="1477328"/>
-          </a:xfrm>
-          <a:prstGeom prst="rect">
-            <a:avLst/>
-          </a:prstGeom>
-          <a:noFill/>
-        </p:spPr>
-        <p:txBody>
-          <a:bodyPr wrap="square" rtlCol="0">
-            <a:spAutoFit/>
-          </a:bodyPr>
-          <a:lstStyle/>
-          <a:p>
-            <a:r>
-              <a:rPr lang="en-US" dirty="0"/>
-              <a:t>Infrastructure Markov Projection Numbers</a:t>
-            </a:r>
-          </a:p>
-          <a:p>
-            <a:endParaRPr lang="en-US" dirty="0"/>
-          </a:p>
-          <a:p>
-            <a:r>
-              <a:rPr lang="en-US" dirty="0"/>
-              <a:t>Full tables can be found in the accompanying notebook</a:t>
-            </a:r>
-          </a:p>
-        </p:txBody>
-      </p:sp>
-    </p:spTree>
-    <p:extLst>
-      <p:ext uri="{BB962C8B-B14F-4D97-AF65-F5344CB8AC3E}">
-        <p14:creationId xmlns:p14="http://schemas.microsoft.com/office/powerpoint/2010/main" val="2130951316"/>
-      </p:ext>
-    </p:extLst>
-  </p:cSld>
-  <p:clrMapOvr>
-    <a:masterClrMapping/>
-  </p:clrMapOvr>
-</p:sld>
-</file>
-
-<file path=ppt/slides/slide9.xml><?xml version="1.0" encoding="utf-8"?>
-<p:sld xmlns:a="http://schemas.openxmlformats.org/drawingml/2006/main" xmlns:r="http://schemas.openxmlformats.org/officeDocument/2006/relationships" xmlns:p="http://schemas.openxmlformats.org/presentationml/2006/main">
-  <p:cSld>
-    <p:spTree>
-      <p:nvGrpSpPr>
-        <p:cNvPr id="1" name=""/>
-        <p:cNvGrpSpPr/>
-        <p:nvPr/>
-      </p:nvGrpSpPr>
-      <p:grpSpPr>
-        <a:xfrm>
-          <a:off x="0" y="0"/>
-          <a:ext cx="0" cy="0"/>
-          <a:chOff x="0" y="0"/>
-          <a:chExt cx="0" cy="0"/>
-        </a:xfrm>
-      </p:grpSpPr>
-      <p:sp>
-        <p:nvSpPr>
-          <p:cNvPr id="2" name="Title 1">
-            <a:extLst>
-              <a:ext uri="{FF2B5EF4-FFF2-40B4-BE49-F238E27FC236}">
-                <a16:creationId xmlns:a16="http://schemas.microsoft.com/office/drawing/2014/main" id="{111F6826-3B8C-A91B-E256-36B6FCD96B29}"/>
-              </a:ext>
-            </a:extLst>
-          </p:cNvPr>
-          <p:cNvSpPr>
-            <a:spLocks noGrp="1"/>
-          </p:cNvSpPr>
-          <p:nvPr>
-            <p:ph type="title"/>
-          </p:nvPr>
-        </p:nvSpPr>
-        <p:spPr/>
-        <p:txBody>
-          <a:bodyPr/>
-          <a:lstStyle/>
-          <a:p>
-            <a:r>
-              <a:rPr lang="en-US" dirty="0"/>
-              <a:t>Results (2) - Oblasts</a:t>
-            </a:r>
-          </a:p>
-        </p:txBody>
-      </p:sp>
-      <p:graphicFrame>
-        <p:nvGraphicFramePr>
-          <p:cNvPr id="8" name="Chart 7">
-            <a:extLst>
-              <a:ext uri="{FF2B5EF4-FFF2-40B4-BE49-F238E27FC236}">
-                <a16:creationId xmlns:a16="http://schemas.microsoft.com/office/drawing/2014/main" id="{BABE3E7F-A5B9-196D-2B51-2EBCCF3C2A95}"/>
-              </a:ext>
-            </a:extLst>
-          </p:cNvPr>
-          <p:cNvGraphicFramePr>
-            <a:graphicFrameLocks/>
-          </p:cNvGraphicFramePr>
-          <p:nvPr>
-            <p:extLst>
-              <p:ext uri="{D42A27DB-BD31-4B8C-83A1-F6EECF244321}">
-                <p14:modId xmlns:p14="http://schemas.microsoft.com/office/powerpoint/2010/main" val="4074345007"/>
-              </p:ext>
-            </p:extLst>
-          </p:nvPr>
-        </p:nvGraphicFramePr>
-        <p:xfrm>
-          <a:off x="152989" y="1721168"/>
-          <a:ext cx="5154302" cy="3996690"/>
-        </p:xfrm>
-        <a:graphic>
-          <a:graphicData uri="http://schemas.openxmlformats.org/drawingml/2006/chart">
-            <c:chart xmlns:c="http://schemas.openxmlformats.org/drawingml/2006/chart" xmlns:r="http://schemas.openxmlformats.org/officeDocument/2006/relationships" r:id="rId2"/>
-          </a:graphicData>
-        </a:graphic>
-      </p:graphicFrame>
-      <p:graphicFrame>
-        <p:nvGraphicFramePr>
-          <p:cNvPr id="9" name="Chart 8">
-            <a:extLst>
-              <a:ext uri="{FF2B5EF4-FFF2-40B4-BE49-F238E27FC236}">
-                <a16:creationId xmlns:a16="http://schemas.microsoft.com/office/drawing/2014/main" id="{2B9AE74C-849B-00FF-50DA-C416037FEEB6}"/>
-              </a:ext>
-            </a:extLst>
-          </p:cNvPr>
-          <p:cNvGraphicFramePr>
-            <a:graphicFrameLocks/>
-          </p:cNvGraphicFramePr>
-          <p:nvPr>
-            <p:extLst>
-              <p:ext uri="{D42A27DB-BD31-4B8C-83A1-F6EECF244321}">
-                <p14:modId xmlns:p14="http://schemas.microsoft.com/office/powerpoint/2010/main" val="1400028188"/>
-              </p:ext>
-            </p:extLst>
-          </p:nvPr>
-        </p:nvGraphicFramePr>
-        <p:xfrm>
-          <a:off x="5538483" y="1721168"/>
-          <a:ext cx="4840428" cy="3996690"/>
-        </p:xfrm>
-        <a:graphic>
-          <a:graphicData uri="http://schemas.openxmlformats.org/drawingml/2006/chart">
-            <c:chart xmlns:c="http://schemas.openxmlformats.org/drawingml/2006/chart" xmlns:r="http://schemas.openxmlformats.org/officeDocument/2006/relationships" r:id="rId3"/>
-          </a:graphicData>
-        </a:graphic>
-      </p:graphicFrame>
-    </p:spTree>
-    <p:extLst>
-      <p:ext uri="{BB962C8B-B14F-4D97-AF65-F5344CB8AC3E}">
-        <p14:creationId xmlns:p14="http://schemas.microsoft.com/office/powerpoint/2010/main" val="378392346"/>
       </p:ext>
     </p:extLst>
   </p:cSld>

</xml_diff>